<commit_message>
Ajout de la partie des antennes planaires
</commit_message>
<xml_diff>
--- a/Présentation Finale – P3.pptx
+++ b/Présentation Finale – P3.pptx
@@ -6,13 +6,15 @@
   </p:sldMasterIdLst>
   <p:sldIdLst>
     <p:sldId id="256" r:id="rId2"/>
-    <p:sldId id="257" r:id="rId3"/>
-    <p:sldId id="258" r:id="rId4"/>
-    <p:sldId id="259" r:id="rId5"/>
-    <p:sldId id="260" r:id="rId6"/>
-    <p:sldId id="263" r:id="rId7"/>
-    <p:sldId id="264" r:id="rId8"/>
-    <p:sldId id="261" r:id="rId9"/>
+    <p:sldId id="265" r:id="rId3"/>
+    <p:sldId id="266" r:id="rId4"/>
+    <p:sldId id="257" r:id="rId5"/>
+    <p:sldId id="258" r:id="rId6"/>
+    <p:sldId id="259" r:id="rId7"/>
+    <p:sldId id="260" r:id="rId8"/>
+    <p:sldId id="263" r:id="rId9"/>
+    <p:sldId id="264" r:id="rId10"/>
+    <p:sldId id="261" r:id="rId11"/>
   </p:sldIdLst>
   <p:sldSz cx="12192000" cy="6858000"/>
   <p:notesSz cx="6858000" cy="9144000"/>
@@ -307,7 +309,7 @@
           <a:p>
             <a:fld id="{EAE94B64-FE95-4932-92D6-ED0579209990}" type="datetimeFigureOut">
               <a:rPr lang="en-CA" smtClean="0"/>
-              <a:t>2018-12-02</a:t>
+              <a:t>2018-12-03</a:t>
             </a:fld>
             <a:endParaRPr lang="en-CA"/>
           </a:p>
@@ -645,7 +647,7 @@
           <a:p>
             <a:fld id="{EAE94B64-FE95-4932-92D6-ED0579209990}" type="datetimeFigureOut">
               <a:rPr lang="en-CA" smtClean="0"/>
-              <a:t>2018-12-02</a:t>
+              <a:t>2018-12-03</a:t>
             </a:fld>
             <a:endParaRPr lang="en-CA"/>
           </a:p>
@@ -1046,7 +1048,7 @@
           <a:p>
             <a:fld id="{EAE94B64-FE95-4932-92D6-ED0579209990}" type="datetimeFigureOut">
               <a:rPr lang="en-CA" smtClean="0"/>
-              <a:t>2018-12-02</a:t>
+              <a:t>2018-12-03</a:t>
             </a:fld>
             <a:endParaRPr lang="en-CA"/>
           </a:p>
@@ -1382,7 +1384,7 @@
           <a:p>
             <a:fld id="{EAE94B64-FE95-4932-92D6-ED0579209990}" type="datetimeFigureOut">
               <a:rPr lang="en-CA" smtClean="0"/>
-              <a:t>2018-12-02</a:t>
+              <a:t>2018-12-03</a:t>
             </a:fld>
             <a:endParaRPr lang="en-CA"/>
           </a:p>
@@ -1702,7 +1704,7 @@
           <a:p>
             <a:fld id="{EAE94B64-FE95-4932-92D6-ED0579209990}" type="datetimeFigureOut">
               <a:rPr lang="en-CA" smtClean="0"/>
-              <a:t>2018-12-02</a:t>
+              <a:t>2018-12-03</a:t>
             </a:fld>
             <a:endParaRPr lang="en-CA"/>
           </a:p>
@@ -2098,7 +2100,7 @@
           <a:p>
             <a:fld id="{EAE94B64-FE95-4932-92D6-ED0579209990}" type="datetimeFigureOut">
               <a:rPr lang="en-CA" smtClean="0"/>
-              <a:t>2018-12-02</a:t>
+              <a:t>2018-12-03</a:t>
             </a:fld>
             <a:endParaRPr lang="en-CA"/>
           </a:p>
@@ -2355,7 +2357,7 @@
           <a:p>
             <a:fld id="{EAE94B64-FE95-4932-92D6-ED0579209990}" type="datetimeFigureOut">
               <a:rPr lang="en-CA" smtClean="0"/>
-              <a:t>2018-12-02</a:t>
+              <a:t>2018-12-03</a:t>
             </a:fld>
             <a:endParaRPr lang="en-CA"/>
           </a:p>
@@ -2617,7 +2619,7 @@
           <a:p>
             <a:fld id="{EAE94B64-FE95-4932-92D6-ED0579209990}" type="datetimeFigureOut">
               <a:rPr lang="en-CA" smtClean="0"/>
-              <a:t>2018-12-02</a:t>
+              <a:t>2018-12-03</a:t>
             </a:fld>
             <a:endParaRPr lang="en-CA"/>
           </a:p>
@@ -2879,7 +2881,7 @@
           <a:p>
             <a:fld id="{EAE94B64-FE95-4932-92D6-ED0579209990}" type="datetimeFigureOut">
               <a:rPr lang="en-CA" smtClean="0"/>
-              <a:t>2018-12-02</a:t>
+              <a:t>2018-12-03</a:t>
             </a:fld>
             <a:endParaRPr lang="en-CA"/>
           </a:p>
@@ -3208,7 +3210,7 @@
           <a:p>
             <a:fld id="{EAE94B64-FE95-4932-92D6-ED0579209990}" type="datetimeFigureOut">
               <a:rPr lang="en-CA" smtClean="0"/>
-              <a:t>2018-12-02</a:t>
+              <a:t>2018-12-03</a:t>
             </a:fld>
             <a:endParaRPr lang="en-CA"/>
           </a:p>
@@ -3531,7 +3533,7 @@
           <a:p>
             <a:fld id="{EAE94B64-FE95-4932-92D6-ED0579209990}" type="datetimeFigureOut">
               <a:rPr lang="en-CA" smtClean="0"/>
-              <a:t>2018-12-02</a:t>
+              <a:t>2018-12-03</a:t>
             </a:fld>
             <a:endParaRPr lang="en-CA"/>
           </a:p>
@@ -3993,7 +3995,7 @@
           <a:p>
             <a:fld id="{EAE94B64-FE95-4932-92D6-ED0579209990}" type="datetimeFigureOut">
               <a:rPr lang="en-CA" smtClean="0"/>
-              <a:t>2018-12-02</a:t>
+              <a:t>2018-12-03</a:t>
             </a:fld>
             <a:endParaRPr lang="en-CA"/>
           </a:p>
@@ -4203,7 +4205,7 @@
           <a:p>
             <a:fld id="{EAE94B64-FE95-4932-92D6-ED0579209990}" type="datetimeFigureOut">
               <a:rPr lang="en-CA" smtClean="0"/>
-              <a:t>2018-12-02</a:t>
+              <a:t>2018-12-03</a:t>
             </a:fld>
             <a:endParaRPr lang="en-CA"/>
           </a:p>
@@ -4380,7 +4382,7 @@
           <a:p>
             <a:fld id="{EAE94B64-FE95-4932-92D6-ED0579209990}" type="datetimeFigureOut">
               <a:rPr lang="en-CA" smtClean="0"/>
-              <a:t>2018-12-02</a:t>
+              <a:t>2018-12-03</a:t>
             </a:fld>
             <a:endParaRPr lang="en-CA"/>
           </a:p>
@@ -4713,7 +4715,7 @@
           <a:p>
             <a:fld id="{EAE94B64-FE95-4932-92D6-ED0579209990}" type="datetimeFigureOut">
               <a:rPr lang="en-CA" smtClean="0"/>
-              <a:t>2018-12-02</a:t>
+              <a:t>2018-12-03</a:t>
             </a:fld>
             <a:endParaRPr lang="en-CA"/>
           </a:p>
@@ -5063,7 +5065,7 @@
           <a:p>
             <a:fld id="{EAE94B64-FE95-4932-92D6-ED0579209990}" type="datetimeFigureOut">
               <a:rPr lang="en-CA" smtClean="0"/>
-              <a:t>2018-12-02</a:t>
+              <a:t>2018-12-03</a:t>
             </a:fld>
             <a:endParaRPr lang="en-CA"/>
           </a:p>
@@ -7117,7 +7119,7 @@
           <a:p>
             <a:fld id="{EAE94B64-FE95-4932-92D6-ED0579209990}" type="datetimeFigureOut">
               <a:rPr lang="en-CA" smtClean="0"/>
-              <a:t>2018-12-02</a:t>
+              <a:t>2018-12-03</a:t>
             </a:fld>
             <a:endParaRPr lang="en-CA"/>
           </a:p>
@@ -7736,6 +7738,86 @@
 </p:sld>
 </file>
 
+<file path=ppt/slides/slide10.xml><?xml version="1.0" encoding="utf-8"?>
+<p:sld xmlns:a="http://schemas.openxmlformats.org/drawingml/2006/main" xmlns:r="http://schemas.openxmlformats.org/officeDocument/2006/relationships" xmlns:p="http://schemas.openxmlformats.org/presentationml/2006/main">
+  <p:cSld>
+    <p:spTree>
+      <p:nvGrpSpPr>
+        <p:cNvPr id="1" name=""/>
+        <p:cNvGrpSpPr/>
+        <p:nvPr/>
+      </p:nvGrpSpPr>
+      <p:grpSpPr>
+        <a:xfrm>
+          <a:off x="0" y="0"/>
+          <a:ext cx="0" cy="0"/>
+          <a:chOff x="0" y="0"/>
+          <a:chExt cx="0" cy="0"/>
+        </a:xfrm>
+      </p:grpSpPr>
+      <p:sp>
+        <p:nvSpPr>
+          <p:cNvPr id="2" name="Title 1">
+            <a:extLst>
+              <a:ext uri="{FF2B5EF4-FFF2-40B4-BE49-F238E27FC236}">
+                <a16:creationId xmlns:a16="http://schemas.microsoft.com/office/drawing/2014/main" id="{E08F6E75-2A45-4CD7-A89B-35B31D4D478A}"/>
+              </a:ext>
+            </a:extLst>
+          </p:cNvPr>
+          <p:cNvSpPr>
+            <a:spLocks noGrp="1"/>
+          </p:cNvSpPr>
+          <p:nvPr>
+            <p:ph type="title"/>
+          </p:nvPr>
+        </p:nvSpPr>
+        <p:spPr/>
+        <p:txBody>
+          <a:bodyPr/>
+          <a:lstStyle/>
+          <a:p>
+            <a:endParaRPr lang="en-CA"/>
+          </a:p>
+        </p:txBody>
+      </p:sp>
+      <p:sp>
+        <p:nvSpPr>
+          <p:cNvPr id="3" name="Content Placeholder 2">
+            <a:extLst>
+              <a:ext uri="{FF2B5EF4-FFF2-40B4-BE49-F238E27FC236}">
+                <a16:creationId xmlns:a16="http://schemas.microsoft.com/office/drawing/2014/main" id="{B415ED72-9909-4FA1-907A-DAF78FD34380}"/>
+              </a:ext>
+            </a:extLst>
+          </p:cNvPr>
+          <p:cNvSpPr>
+            <a:spLocks noGrp="1"/>
+          </p:cNvSpPr>
+          <p:nvPr>
+            <p:ph idx="1"/>
+          </p:nvPr>
+        </p:nvSpPr>
+        <p:spPr/>
+        <p:txBody>
+          <a:bodyPr/>
+          <a:lstStyle/>
+          <a:p>
+            <a:endParaRPr lang="en-CA"/>
+          </a:p>
+        </p:txBody>
+      </p:sp>
+    </p:spTree>
+    <p:extLst>
+      <p:ext uri="{BB962C8B-B14F-4D97-AF65-F5344CB8AC3E}">
+        <p14:creationId xmlns:p14="http://schemas.microsoft.com/office/powerpoint/2010/main" val="816399630"/>
+      </p:ext>
+    </p:extLst>
+  </p:cSld>
+  <p:clrMapOvr>
+    <a:masterClrMapping/>
+  </p:clrMapOvr>
+</p:sld>
+</file>
+
 <file path=ppt/slides/slide2.xml><?xml version="1.0" encoding="utf-8"?>
 <p:sld xmlns:a="http://schemas.openxmlformats.org/drawingml/2006/main" xmlns:r="http://schemas.openxmlformats.org/officeDocument/2006/relationships" xmlns:p="http://schemas.openxmlformats.org/presentationml/2006/main">
   <p:cSld>
@@ -7776,7 +7858,15 @@
           <a:p>
             <a:r>
               <a:rPr lang="en-CA" dirty="0" err="1"/>
-              <a:t>Antenne</a:t>
+              <a:t>Antennes</a:t>
+            </a:r>
+            <a:r>
+              <a:rPr lang="en-CA" dirty="0"/>
+              <a:t> - </a:t>
+            </a:r>
+            <a:r>
+              <a:rPr lang="en-CA" dirty="0" err="1"/>
+              <a:t>Planaires</a:t>
             </a:r>
             <a:endParaRPr lang="en-CA" dirty="0"/>
           </a:p>
@@ -7798,19 +7888,408 @@
             <p:ph idx="1"/>
           </p:nvPr>
         </p:nvSpPr>
-        <p:spPr/>
+        <p:spPr>
+          <a:xfrm>
+            <a:off x="1466490" y="1468963"/>
+            <a:ext cx="8915400" cy="3777622"/>
+          </a:xfrm>
+        </p:spPr>
         <p:txBody>
           <a:bodyPr/>
           <a:lstStyle/>
           <a:p>
-            <a:endParaRPr lang="en-CA"/>
+            <a:r>
+              <a:rPr lang="en-CA" dirty="0"/>
+              <a:t>Temps </a:t>
+            </a:r>
+            <a:r>
+              <a:rPr lang="en-CA" dirty="0" err="1"/>
+              <a:t>d’adaptation</a:t>
+            </a:r>
+            <a:r>
+              <a:rPr lang="en-CA" dirty="0"/>
+              <a:t> avec ADS</a:t>
+            </a:r>
+          </a:p>
+          <a:p>
+            <a:r>
+              <a:rPr lang="en-CA" dirty="0"/>
+              <a:t>Deux </a:t>
+            </a:r>
+            <a:r>
+              <a:rPr lang="en-CA" dirty="0" err="1"/>
+              <a:t>modèles</a:t>
+            </a:r>
+            <a:r>
+              <a:rPr lang="en-CA" dirty="0"/>
+              <a:t> </a:t>
+            </a:r>
+            <a:r>
+              <a:rPr lang="en-CA" dirty="0" err="1"/>
+              <a:t>différents</a:t>
+            </a:r>
+            <a:r>
+              <a:rPr lang="en-CA" dirty="0"/>
+              <a:t> par </a:t>
+            </a:r>
+            <a:r>
+              <a:rPr lang="en-CA" dirty="0" err="1"/>
+              <a:t>précaution</a:t>
+            </a:r>
+            <a:endParaRPr lang="en-CA" dirty="0"/>
+          </a:p>
+        </p:txBody>
+      </p:sp>
+      <p:pic>
+        <p:nvPicPr>
+          <p:cNvPr id="5" name="Picture 4">
+            <a:extLst>
+              <a:ext uri="{FF2B5EF4-FFF2-40B4-BE49-F238E27FC236}">
+                <a16:creationId xmlns:a16="http://schemas.microsoft.com/office/drawing/2014/main" id="{CE2C18C1-C5D7-480C-8F79-59D00B690E1B}"/>
+              </a:ext>
+            </a:extLst>
+          </p:cNvPr>
+          <p:cNvPicPr>
+            <a:picLocks noChangeAspect="1"/>
+          </p:cNvPicPr>
+          <p:nvPr/>
+        </p:nvPicPr>
+        <p:blipFill>
+          <a:blip r:embed="rId2">
+            <a:extLst>
+              <a:ext uri="{28A0092B-C50C-407E-A947-70E740481C1C}">
+                <a14:useLocalDpi xmlns:a14="http://schemas.microsoft.com/office/drawing/2010/main" val="0"/>
+              </a:ext>
+            </a:extLst>
+          </a:blip>
+          <a:stretch>
+            <a:fillRect/>
+          </a:stretch>
+        </p:blipFill>
+        <p:spPr>
+          <a:xfrm>
+            <a:off x="753348" y="2733627"/>
+            <a:ext cx="2113523" cy="1406226"/>
+          </a:xfrm>
+          <a:prstGeom prst="rect">
+            <a:avLst/>
+          </a:prstGeom>
+        </p:spPr>
+      </p:pic>
+      <p:pic>
+        <p:nvPicPr>
+          <p:cNvPr id="7" name="Picture 6">
+            <a:extLst>
+              <a:ext uri="{FF2B5EF4-FFF2-40B4-BE49-F238E27FC236}">
+                <a16:creationId xmlns:a16="http://schemas.microsoft.com/office/drawing/2014/main" id="{22A885DE-18E1-40B6-BA7F-A023E434788C}"/>
+              </a:ext>
+            </a:extLst>
+          </p:cNvPr>
+          <p:cNvPicPr>
+            <a:picLocks noChangeAspect="1"/>
+          </p:cNvPicPr>
+          <p:nvPr/>
+        </p:nvPicPr>
+        <p:blipFill>
+          <a:blip r:embed="rId3">
+            <a:extLst>
+              <a:ext uri="{28A0092B-C50C-407E-A947-70E740481C1C}">
+                <a14:useLocalDpi xmlns:a14="http://schemas.microsoft.com/office/drawing/2010/main" val="0"/>
+              </a:ext>
+            </a:extLst>
+          </a:blip>
+          <a:stretch>
+            <a:fillRect/>
+          </a:stretch>
+        </p:blipFill>
+        <p:spPr>
+          <a:xfrm>
+            <a:off x="948550" y="4695165"/>
+            <a:ext cx="1723118" cy="1733117"/>
+          </a:xfrm>
+          <a:prstGeom prst="rect">
+            <a:avLst/>
+          </a:prstGeom>
+        </p:spPr>
+      </p:pic>
+      <p:pic>
+        <p:nvPicPr>
+          <p:cNvPr id="9" name="Picture 8">
+            <a:extLst>
+              <a:ext uri="{FF2B5EF4-FFF2-40B4-BE49-F238E27FC236}">
+                <a16:creationId xmlns:a16="http://schemas.microsoft.com/office/drawing/2014/main" id="{BC1B2C59-35C7-462B-A7C7-D1097122CBF2}"/>
+              </a:ext>
+            </a:extLst>
+          </p:cNvPr>
+          <p:cNvPicPr>
+            <a:picLocks noChangeAspect="1"/>
+          </p:cNvPicPr>
+          <p:nvPr/>
+        </p:nvPicPr>
+        <p:blipFill>
+          <a:blip r:embed="rId4">
+            <a:extLst>
+              <a:ext uri="{28A0092B-C50C-407E-A947-70E740481C1C}">
+                <a14:useLocalDpi xmlns:a14="http://schemas.microsoft.com/office/drawing/2010/main" val="0"/>
+              </a:ext>
+            </a:extLst>
+          </a:blip>
+          <a:stretch>
+            <a:fillRect/>
+          </a:stretch>
+        </p:blipFill>
+        <p:spPr>
+          <a:xfrm>
+            <a:off x="3054776" y="2489646"/>
+            <a:ext cx="3435221" cy="1894187"/>
+          </a:xfrm>
+          <a:prstGeom prst="rect">
+            <a:avLst/>
+          </a:prstGeom>
+        </p:spPr>
+      </p:pic>
+      <p:pic>
+        <p:nvPicPr>
+          <p:cNvPr id="11" name="Picture 10">
+            <a:extLst>
+              <a:ext uri="{FF2B5EF4-FFF2-40B4-BE49-F238E27FC236}">
+                <a16:creationId xmlns:a16="http://schemas.microsoft.com/office/drawing/2014/main" id="{17F26499-29A0-4245-B39C-683E323178C3}"/>
+              </a:ext>
+            </a:extLst>
+          </p:cNvPr>
+          <p:cNvPicPr>
+            <a:picLocks noChangeAspect="1"/>
+          </p:cNvPicPr>
+          <p:nvPr/>
+        </p:nvPicPr>
+        <p:blipFill>
+          <a:blip r:embed="rId5">
+            <a:extLst>
+              <a:ext uri="{28A0092B-C50C-407E-A947-70E740481C1C}">
+                <a14:useLocalDpi xmlns:a14="http://schemas.microsoft.com/office/drawing/2010/main" val="0"/>
+              </a:ext>
+            </a:extLst>
+          </a:blip>
+          <a:stretch>
+            <a:fillRect/>
+          </a:stretch>
+        </p:blipFill>
+        <p:spPr>
+          <a:xfrm>
+            <a:off x="3054775" y="4487396"/>
+            <a:ext cx="3435221" cy="2148654"/>
+          </a:xfrm>
+          <a:prstGeom prst="rect">
+            <a:avLst/>
+          </a:prstGeom>
+        </p:spPr>
+      </p:pic>
+      <p:pic>
+        <p:nvPicPr>
+          <p:cNvPr id="13" name="Picture 12">
+            <a:extLst>
+              <a:ext uri="{FF2B5EF4-FFF2-40B4-BE49-F238E27FC236}">
+                <a16:creationId xmlns:a16="http://schemas.microsoft.com/office/drawing/2014/main" id="{37B1D7C9-CE29-4665-B674-E6CC08883D25}"/>
+              </a:ext>
+            </a:extLst>
+          </p:cNvPr>
+          <p:cNvPicPr>
+            <a:picLocks noChangeAspect="1"/>
+          </p:cNvPicPr>
+          <p:nvPr/>
+        </p:nvPicPr>
+        <p:blipFill>
+          <a:blip r:embed="rId6">
+            <a:extLst>
+              <a:ext uri="{28A0092B-C50C-407E-A947-70E740481C1C}">
+                <a14:useLocalDpi xmlns:a14="http://schemas.microsoft.com/office/drawing/2010/main" val="0"/>
+              </a:ext>
+            </a:extLst>
+          </a:blip>
+          <a:stretch>
+            <a:fillRect/>
+          </a:stretch>
+        </p:blipFill>
+        <p:spPr>
+          <a:xfrm>
+            <a:off x="6800651" y="4568679"/>
+            <a:ext cx="2662201" cy="1986087"/>
+          </a:xfrm>
+          <a:prstGeom prst="rect">
+            <a:avLst/>
+          </a:prstGeom>
+        </p:spPr>
+      </p:pic>
+      <p:pic>
+        <p:nvPicPr>
+          <p:cNvPr id="15" name="Picture 14">
+            <a:extLst>
+              <a:ext uri="{FF2B5EF4-FFF2-40B4-BE49-F238E27FC236}">
+                <a16:creationId xmlns:a16="http://schemas.microsoft.com/office/drawing/2014/main" id="{DCE4A6C5-AE44-4CE6-9BB0-4BF14EC14772}"/>
+              </a:ext>
+            </a:extLst>
+          </p:cNvPr>
+          <p:cNvPicPr>
+            <a:picLocks noChangeAspect="1"/>
+          </p:cNvPicPr>
+          <p:nvPr/>
+        </p:nvPicPr>
+        <p:blipFill>
+          <a:blip r:embed="rId7">
+            <a:extLst>
+              <a:ext uri="{28A0092B-C50C-407E-A947-70E740481C1C}">
+                <a14:useLocalDpi xmlns:a14="http://schemas.microsoft.com/office/drawing/2010/main" val="0"/>
+              </a:ext>
+            </a:extLst>
+          </a:blip>
+          <a:stretch>
+            <a:fillRect/>
+          </a:stretch>
+        </p:blipFill>
+        <p:spPr>
+          <a:xfrm>
+            <a:off x="6800651" y="2435956"/>
+            <a:ext cx="2645753" cy="1986088"/>
+          </a:xfrm>
+          <a:prstGeom prst="rect">
+            <a:avLst/>
+          </a:prstGeom>
+        </p:spPr>
+      </p:pic>
+      <p:sp>
+        <p:nvSpPr>
+          <p:cNvPr id="16" name="TextBox 15">
+            <a:extLst>
+              <a:ext uri="{FF2B5EF4-FFF2-40B4-BE49-F238E27FC236}">
+                <a16:creationId xmlns:a16="http://schemas.microsoft.com/office/drawing/2014/main" id="{40B4E6AA-80A5-43B7-8A3B-BC40BD2FD27C}"/>
+              </a:ext>
+            </a:extLst>
+          </p:cNvPr>
+          <p:cNvSpPr txBox="1"/>
+          <p:nvPr/>
+        </p:nvSpPr>
+        <p:spPr>
+          <a:xfrm>
+            <a:off x="9446404" y="2967335"/>
+            <a:ext cx="2802783" cy="923330"/>
+          </a:xfrm>
+          <a:prstGeom prst="rect">
+            <a:avLst/>
+          </a:prstGeom>
+          <a:noFill/>
+        </p:spPr>
+        <p:txBody>
+          <a:bodyPr wrap="square" rtlCol="0">
+            <a:spAutoFit/>
+          </a:bodyPr>
+          <a:lstStyle/>
+          <a:p>
+            <a:r>
+              <a:rPr lang="en-CA" dirty="0"/>
+              <a:t>Gain </a:t>
+            </a:r>
+            <a:r>
+              <a:rPr lang="en-CA" dirty="0" err="1"/>
+              <a:t>dans</a:t>
+            </a:r>
+            <a:r>
+              <a:rPr lang="en-CA" dirty="0"/>
+              <a:t> la </a:t>
+            </a:r>
+            <a:r>
+              <a:rPr lang="en-CA" dirty="0" err="1"/>
+              <a:t>bande</a:t>
+            </a:r>
+            <a:r>
+              <a:rPr lang="en-CA" dirty="0"/>
+              <a:t> </a:t>
+            </a:r>
+            <a:r>
+              <a:rPr lang="en-CA" dirty="0" err="1"/>
+              <a:t>passante</a:t>
+            </a:r>
+            <a:r>
+              <a:rPr lang="en-CA" dirty="0"/>
+              <a:t>:</a:t>
+            </a:r>
+          </a:p>
+          <a:p>
+            <a:r>
+              <a:rPr lang="en-CA" dirty="0"/>
+              <a:t>de -3,19dB à – 8,54dB</a:t>
+            </a:r>
+          </a:p>
+        </p:txBody>
+      </p:sp>
+      <p:sp>
+        <p:nvSpPr>
+          <p:cNvPr id="17" name="TextBox 16">
+            <a:extLst>
+              <a:ext uri="{FF2B5EF4-FFF2-40B4-BE49-F238E27FC236}">
+                <a16:creationId xmlns:a16="http://schemas.microsoft.com/office/drawing/2014/main" id="{06B0E7E5-E4D4-4B77-AF54-E25BB74A7393}"/>
+              </a:ext>
+            </a:extLst>
+          </p:cNvPr>
+          <p:cNvSpPr txBox="1"/>
+          <p:nvPr/>
+        </p:nvSpPr>
+        <p:spPr>
+          <a:xfrm>
+            <a:off x="9498438" y="5100057"/>
+            <a:ext cx="2802783" cy="923330"/>
+          </a:xfrm>
+          <a:prstGeom prst="rect">
+            <a:avLst/>
+          </a:prstGeom>
+          <a:noFill/>
+        </p:spPr>
+        <p:txBody>
+          <a:bodyPr wrap="square" rtlCol="0">
+            <a:spAutoFit/>
+          </a:bodyPr>
+          <a:lstStyle/>
+          <a:p>
+            <a:r>
+              <a:rPr lang="en-CA" dirty="0"/>
+              <a:t>Gain </a:t>
+            </a:r>
+            <a:r>
+              <a:rPr lang="en-CA" dirty="0" err="1"/>
+              <a:t>dans</a:t>
+            </a:r>
+            <a:r>
+              <a:rPr lang="en-CA" dirty="0"/>
+              <a:t> la </a:t>
+            </a:r>
+            <a:r>
+              <a:rPr lang="en-CA" dirty="0" err="1"/>
+              <a:t>bande</a:t>
+            </a:r>
+            <a:r>
+              <a:rPr lang="en-CA" dirty="0"/>
+              <a:t> </a:t>
+            </a:r>
+            <a:r>
+              <a:rPr lang="en-CA" dirty="0" err="1"/>
+              <a:t>passante</a:t>
+            </a:r>
+            <a:r>
+              <a:rPr lang="en-CA" dirty="0"/>
+              <a:t>:</a:t>
+            </a:r>
+          </a:p>
+          <a:p>
+            <a:r>
+              <a:rPr lang="en-CA" dirty="0"/>
+              <a:t>de -21,69dB à -24,92dB</a:t>
+            </a:r>
           </a:p>
         </p:txBody>
       </p:sp>
     </p:spTree>
     <p:extLst>
       <p:ext uri="{BB962C8B-B14F-4D97-AF65-F5344CB8AC3E}">
-        <p14:creationId xmlns:p14="http://schemas.microsoft.com/office/powerpoint/2010/main" val="1461233970"/>
+        <p14:creationId xmlns:p14="http://schemas.microsoft.com/office/powerpoint/2010/main" val="720972098"/>
       </p:ext>
     </p:extLst>
   </p:cSld>
@@ -7842,7 +8321,7 @@
           <p:cNvPr id="2" name="Title 1">
             <a:extLst>
               <a:ext uri="{FF2B5EF4-FFF2-40B4-BE49-F238E27FC236}">
-                <a16:creationId xmlns:a16="http://schemas.microsoft.com/office/drawing/2014/main" id="{181B7A1F-D195-4CB6-AF4A-94DB2BC49CEB}"/>
+                <a16:creationId xmlns:a16="http://schemas.microsoft.com/office/drawing/2014/main" id="{E08F6E75-2A45-4CD7-A89B-35B31D4D478A}"/>
               </a:ext>
             </a:extLst>
           </p:cNvPr>
@@ -7860,12 +8339,17 @@
           <a:p>
             <a:r>
               <a:rPr lang="en-CA" dirty="0" err="1"/>
-              <a:t>Chaîne</a:t>
+              <a:t>Antennes</a:t>
             </a:r>
             <a:r>
               <a:rPr lang="en-CA" dirty="0"/>
-              <a:t> RF</a:t>
-            </a:r>
+              <a:t> - </a:t>
+            </a:r>
+            <a:r>
+              <a:rPr lang="en-CA" dirty="0" err="1"/>
+              <a:t>Planaires</a:t>
+            </a:r>
+            <a:endParaRPr lang="en-CA" dirty="0"/>
           </a:p>
         </p:txBody>
       </p:sp>
@@ -7874,7 +8358,7 @@
           <p:cNvPr id="3" name="Content Placeholder 2">
             <a:extLst>
               <a:ext uri="{FF2B5EF4-FFF2-40B4-BE49-F238E27FC236}">
-                <a16:creationId xmlns:a16="http://schemas.microsoft.com/office/drawing/2014/main" id="{86306AC8-2B44-4495-982C-29052A09B7D8}"/>
+                <a16:creationId xmlns:a16="http://schemas.microsoft.com/office/drawing/2014/main" id="{B415ED72-9909-4FA1-907A-DAF78FD34380}"/>
               </a:ext>
             </a:extLst>
           </p:cNvPr>
@@ -7890,14 +8374,90 @@
           <a:bodyPr/>
           <a:lstStyle/>
           <a:p>
-            <a:endParaRPr lang="en-CA"/>
+            <a:r>
+              <a:rPr lang="en-CA" dirty="0"/>
+              <a:t>APP 2:</a:t>
+            </a:r>
+          </a:p>
+          <a:p>
+            <a:pPr lvl="1"/>
+            <a:r>
+              <a:rPr lang="en-CA" dirty="0" err="1"/>
+              <a:t>Calculs</a:t>
+            </a:r>
+            <a:r>
+              <a:rPr lang="en-CA" dirty="0"/>
+              <a:t> des dimensions </a:t>
+            </a:r>
+            <a:r>
+              <a:rPr lang="en-CA" dirty="0" err="1"/>
+              <a:t>d’une</a:t>
+            </a:r>
+            <a:r>
+              <a:rPr lang="en-CA" dirty="0"/>
+              <a:t> </a:t>
+            </a:r>
+            <a:r>
+              <a:rPr lang="en-CA" dirty="0" err="1"/>
+              <a:t>antenne</a:t>
+            </a:r>
+            <a:r>
+              <a:rPr lang="en-CA" dirty="0"/>
+              <a:t> </a:t>
+            </a:r>
+            <a:r>
+              <a:rPr lang="en-CA" dirty="0" err="1"/>
+              <a:t>planaire</a:t>
+            </a:r>
+            <a:endParaRPr lang="en-CA" dirty="0"/>
+          </a:p>
+          <a:p>
+            <a:pPr lvl="1"/>
+            <a:r>
+              <a:rPr lang="en-CA" dirty="0"/>
+              <a:t>Utilisation </a:t>
+            </a:r>
+            <a:r>
+              <a:rPr lang="en-CA" dirty="0" err="1"/>
+              <a:t>d’ADS</a:t>
+            </a:r>
+            <a:endParaRPr lang="en-CA" dirty="0"/>
+          </a:p>
+          <a:p>
+            <a:r>
+              <a:rPr lang="en-CA" dirty="0"/>
+              <a:t>APP 3:</a:t>
+            </a:r>
+          </a:p>
+          <a:p>
+            <a:pPr lvl="1"/>
+            <a:r>
+              <a:rPr lang="en-CA" dirty="0" err="1"/>
+              <a:t>Lignes</a:t>
+            </a:r>
+            <a:r>
+              <a:rPr lang="en-CA" dirty="0"/>
+              <a:t> de transmission</a:t>
+            </a:r>
+          </a:p>
+          <a:p>
+            <a:pPr lvl="1"/>
+            <a:r>
+              <a:rPr lang="en-CA" dirty="0"/>
+              <a:t>Adaptation </a:t>
+            </a:r>
+            <a:r>
+              <a:rPr lang="en-CA" dirty="0" err="1"/>
+              <a:t>d’impédance</a:t>
+            </a:r>
+            <a:endParaRPr lang="en-CA" dirty="0"/>
           </a:p>
         </p:txBody>
       </p:sp>
     </p:spTree>
     <p:extLst>
       <p:ext uri="{BB962C8B-B14F-4D97-AF65-F5344CB8AC3E}">
-        <p14:creationId xmlns:p14="http://schemas.microsoft.com/office/powerpoint/2010/main" val="4155299707"/>
+        <p14:creationId xmlns:p14="http://schemas.microsoft.com/office/powerpoint/2010/main" val="1190730998"/>
       </p:ext>
     </p:extLst>
   </p:cSld>
@@ -7929,7 +8489,7 @@
           <p:cNvPr id="2" name="Title 1">
             <a:extLst>
               <a:ext uri="{FF2B5EF4-FFF2-40B4-BE49-F238E27FC236}">
-                <a16:creationId xmlns:a16="http://schemas.microsoft.com/office/drawing/2014/main" id="{CB092671-ACDE-4E64-B487-381F2D0C6C2D}"/>
+                <a16:creationId xmlns:a16="http://schemas.microsoft.com/office/drawing/2014/main" id="{532BB36A-66E0-4644-AB8F-8DCB79605DD1}"/>
               </a:ext>
             </a:extLst>
           </p:cNvPr>
@@ -7946,12 +8506,8 @@
           <a:lstStyle/>
           <a:p>
             <a:r>
-              <a:rPr lang="en-CA" dirty="0"/>
-              <a:t>Modem </a:t>
-            </a:r>
-            <a:r>
               <a:rPr lang="en-CA" dirty="0" err="1"/>
-              <a:t>Numérique</a:t>
+              <a:t>Antenne</a:t>
             </a:r>
             <a:endParaRPr lang="en-CA" dirty="0"/>
           </a:p>
@@ -7962,7 +8518,7 @@
           <p:cNvPr id="3" name="Content Placeholder 2">
             <a:extLst>
               <a:ext uri="{FF2B5EF4-FFF2-40B4-BE49-F238E27FC236}">
-                <a16:creationId xmlns:a16="http://schemas.microsoft.com/office/drawing/2014/main" id="{C98FDD01-A6F3-46B0-A7A5-740763964552}"/>
+                <a16:creationId xmlns:a16="http://schemas.microsoft.com/office/drawing/2014/main" id="{6E8CB243-474A-4A7D-87A0-18D4236EA148}"/>
               </a:ext>
             </a:extLst>
           </p:cNvPr>
@@ -7985,7 +8541,7 @@
     </p:spTree>
     <p:extLst>
       <p:ext uri="{BB962C8B-B14F-4D97-AF65-F5344CB8AC3E}">
-        <p14:creationId xmlns:p14="http://schemas.microsoft.com/office/powerpoint/2010/main" val="4294789758"/>
+        <p14:creationId xmlns:p14="http://schemas.microsoft.com/office/powerpoint/2010/main" val="1461233970"/>
       </p:ext>
     </p:extLst>
   </p:cSld>
@@ -8017,7 +8573,7 @@
           <p:cNvPr id="2" name="Title 1">
             <a:extLst>
               <a:ext uri="{FF2B5EF4-FFF2-40B4-BE49-F238E27FC236}">
-                <a16:creationId xmlns:a16="http://schemas.microsoft.com/office/drawing/2014/main" id="{4D96D023-FF4C-48F9-8D0D-C84356743869}"/>
+                <a16:creationId xmlns:a16="http://schemas.microsoft.com/office/drawing/2014/main" id="{181B7A1F-D195-4CB6-AF4A-94DB2BC49CEB}"/>
               </a:ext>
             </a:extLst>
           </p:cNvPr>
@@ -8035,194 +8591,44 @@
           <a:p>
             <a:r>
               <a:rPr lang="en-CA" dirty="0" err="1"/>
-              <a:t>Protocole</a:t>
-            </a:r>
-            <a:endParaRPr lang="en-CA" dirty="0"/>
-          </a:p>
-        </p:txBody>
-      </p:sp>
-      <p:sp>
-        <p:nvSpPr>
-          <p:cNvPr id="3" name="TextBox 2">
+              <a:t>Chaîne</a:t>
+            </a:r>
+            <a:r>
+              <a:rPr lang="en-CA" dirty="0"/>
+              <a:t> RF</a:t>
+            </a:r>
+          </a:p>
+        </p:txBody>
+      </p:sp>
+      <p:sp>
+        <p:nvSpPr>
+          <p:cNvPr id="3" name="Content Placeholder 2">
             <a:extLst>
               <a:ext uri="{FF2B5EF4-FFF2-40B4-BE49-F238E27FC236}">
-                <a16:creationId xmlns:a16="http://schemas.microsoft.com/office/drawing/2014/main" id="{42DA6C5E-FC75-4155-A6A5-19DC3943EF40}"/>
+                <a16:creationId xmlns:a16="http://schemas.microsoft.com/office/drawing/2014/main" id="{86306AC8-2B44-4495-982C-29052A09B7D8}"/>
               </a:ext>
             </a:extLst>
           </p:cNvPr>
-          <p:cNvSpPr txBox="1"/>
-          <p:nvPr/>
-        </p:nvSpPr>
-        <p:spPr>
-          <a:xfrm>
-            <a:off x="685800" y="1907931"/>
-            <a:ext cx="11506199" cy="461665"/>
-          </a:xfrm>
-          <a:prstGeom prst="rect">
-            <a:avLst/>
-          </a:prstGeom>
-          <a:noFill/>
-        </p:spPr>
-        <p:txBody>
-          <a:bodyPr wrap="square" rtlCol="0">
-            <a:spAutoFit/>
-          </a:bodyPr>
+          <p:cNvSpPr>
+            <a:spLocks noGrp="1"/>
+          </p:cNvSpPr>
+          <p:nvPr>
+            <p:ph idx="1"/>
+          </p:nvPr>
+        </p:nvSpPr>
+        <p:spPr/>
+        <p:txBody>
+          <a:bodyPr/>
           <a:lstStyle/>
           <a:p>
-            <a:r>
-              <a:rPr lang="en-CA" sz="2400" dirty="0" err="1"/>
-              <a:t>Défis</a:t>
-            </a:r>
-            <a:r>
-              <a:rPr lang="en-CA" sz="2400" dirty="0"/>
-              <a:t> à </a:t>
-            </a:r>
-            <a:r>
-              <a:rPr lang="en-CA" sz="2400" dirty="0" err="1"/>
-              <a:t>relever</a:t>
-            </a:r>
-            <a:r>
-              <a:rPr lang="en-CA" sz="2400" dirty="0"/>
-              <a:t>:</a:t>
-            </a:r>
-          </a:p>
-        </p:txBody>
-      </p:sp>
-      <p:sp>
-        <p:nvSpPr>
-          <p:cNvPr id="4" name="TextBox 3">
-            <a:extLst>
-              <a:ext uri="{FF2B5EF4-FFF2-40B4-BE49-F238E27FC236}">
-                <a16:creationId xmlns:a16="http://schemas.microsoft.com/office/drawing/2014/main" id="{5FEF8A14-9BCD-43CA-BA7F-8EB49C06208A}"/>
-              </a:ext>
-            </a:extLst>
-          </p:cNvPr>
-          <p:cNvSpPr txBox="1"/>
-          <p:nvPr/>
-        </p:nvSpPr>
-        <p:spPr>
-          <a:xfrm>
-            <a:off x="808892" y="2716823"/>
-            <a:ext cx="10612316" cy="1754326"/>
-          </a:xfrm>
-          <a:prstGeom prst="rect">
-            <a:avLst/>
-          </a:prstGeom>
-          <a:noFill/>
-        </p:spPr>
-        <p:txBody>
-          <a:bodyPr wrap="square" rtlCol="0">
-            <a:spAutoFit/>
-          </a:bodyPr>
-          <a:lstStyle/>
-          <a:p>
-            <a:pPr marL="285750" indent="-285750">
-              <a:buFont typeface="Arial" panose="020B0604020202020204" pitchFamily="34" charset="0"/>
-              <a:buChar char="•"/>
-            </a:pPr>
-            <a:r>
-              <a:rPr lang="en-CA" dirty="0"/>
-              <a:t>Distinction des </a:t>
-            </a:r>
-            <a:r>
-              <a:rPr lang="en-CA" dirty="0" err="1"/>
-              <a:t>signaux</a:t>
-            </a:r>
-            <a:r>
-              <a:rPr lang="en-CA" dirty="0"/>
-              <a:t> pour </a:t>
-            </a:r>
-            <a:r>
-              <a:rPr lang="en-CA" dirty="0" err="1"/>
-              <a:t>chaque</a:t>
-            </a:r>
-            <a:r>
-              <a:rPr lang="en-CA" dirty="0"/>
-              <a:t> </a:t>
-            </a:r>
-            <a:r>
-              <a:rPr lang="en-CA" dirty="0" err="1"/>
-              <a:t>ruche</a:t>
-            </a:r>
-            <a:endParaRPr lang="en-CA" dirty="0"/>
-          </a:p>
-          <a:p>
-            <a:pPr marL="285750" indent="-285750">
-              <a:buFont typeface="Arial" panose="020B0604020202020204" pitchFamily="34" charset="0"/>
-              <a:buChar char="•"/>
-            </a:pPr>
-            <a:endParaRPr lang="en-CA" dirty="0"/>
-          </a:p>
-          <a:p>
-            <a:pPr marL="285750" indent="-285750">
-              <a:buFont typeface="Arial" panose="020B0604020202020204" pitchFamily="34" charset="0"/>
-              <a:buChar char="•"/>
-            </a:pPr>
-            <a:r>
-              <a:rPr lang="en-CA" dirty="0"/>
-              <a:t>Reconnaissance des </a:t>
-            </a:r>
-            <a:r>
-              <a:rPr lang="en-CA" dirty="0" err="1"/>
-              <a:t>différentes</a:t>
-            </a:r>
-            <a:r>
-              <a:rPr lang="en-CA" dirty="0"/>
-              <a:t> </a:t>
-            </a:r>
-            <a:r>
-              <a:rPr lang="en-CA" dirty="0" err="1"/>
-              <a:t>commandes</a:t>
-            </a:r>
-            <a:endParaRPr lang="en-CA" dirty="0"/>
-          </a:p>
-          <a:p>
-            <a:pPr marL="285750" indent="-285750">
-              <a:buFont typeface="Arial" panose="020B0604020202020204" pitchFamily="34" charset="0"/>
-              <a:buChar char="•"/>
-            </a:pPr>
-            <a:endParaRPr lang="en-CA" dirty="0"/>
-          </a:p>
-          <a:p>
-            <a:pPr marL="285750" indent="-285750">
-              <a:buFont typeface="Arial" panose="020B0604020202020204" pitchFamily="34" charset="0"/>
-              <a:buChar char="•"/>
-            </a:pPr>
-            <a:r>
-              <a:rPr lang="en-CA" dirty="0" err="1"/>
-              <a:t>Vérification</a:t>
-            </a:r>
-            <a:r>
-              <a:rPr lang="en-CA" dirty="0"/>
-              <a:t> de </a:t>
-            </a:r>
-            <a:r>
-              <a:rPr lang="en-CA" dirty="0" err="1"/>
-              <a:t>l’état</a:t>
-            </a:r>
-            <a:r>
-              <a:rPr lang="en-CA" dirty="0"/>
-              <a:t> des </a:t>
-            </a:r>
-            <a:r>
-              <a:rPr lang="en-CA" dirty="0" err="1"/>
-              <a:t>ruches</a:t>
-            </a:r>
-            <a:endParaRPr lang="en-CA" dirty="0"/>
-          </a:p>
-          <a:p>
-            <a:pPr marL="285750" indent="-285750">
-              <a:buFont typeface="Arial" panose="020B0604020202020204" pitchFamily="34" charset="0"/>
-              <a:buChar char="•"/>
-            </a:pPr>
-            <a:endParaRPr lang="en-CA" dirty="0"/>
+            <a:endParaRPr lang="en-CA"/>
           </a:p>
         </p:txBody>
       </p:sp>
     </p:spTree>
     <p:extLst>
       <p:ext uri="{BB962C8B-B14F-4D97-AF65-F5344CB8AC3E}">
-        <p14:creationId xmlns:p14="http://schemas.microsoft.com/office/powerpoint/2010/main" val="1560542592"/>
+        <p14:creationId xmlns:p14="http://schemas.microsoft.com/office/powerpoint/2010/main" val="4155299707"/>
       </p:ext>
     </p:extLst>
   </p:cSld>
@@ -8254,6 +8660,331 @@
           <p:cNvPr id="2" name="Title 1">
             <a:extLst>
               <a:ext uri="{FF2B5EF4-FFF2-40B4-BE49-F238E27FC236}">
+                <a16:creationId xmlns:a16="http://schemas.microsoft.com/office/drawing/2014/main" id="{CB092671-ACDE-4E64-B487-381F2D0C6C2D}"/>
+              </a:ext>
+            </a:extLst>
+          </p:cNvPr>
+          <p:cNvSpPr>
+            <a:spLocks noGrp="1"/>
+          </p:cNvSpPr>
+          <p:nvPr>
+            <p:ph type="title"/>
+          </p:nvPr>
+        </p:nvSpPr>
+        <p:spPr/>
+        <p:txBody>
+          <a:bodyPr/>
+          <a:lstStyle/>
+          <a:p>
+            <a:r>
+              <a:rPr lang="en-CA" dirty="0"/>
+              <a:t>Modem </a:t>
+            </a:r>
+            <a:r>
+              <a:rPr lang="en-CA" dirty="0" err="1"/>
+              <a:t>Numérique</a:t>
+            </a:r>
+            <a:endParaRPr lang="en-CA" dirty="0"/>
+          </a:p>
+        </p:txBody>
+      </p:sp>
+      <p:sp>
+        <p:nvSpPr>
+          <p:cNvPr id="3" name="Content Placeholder 2">
+            <a:extLst>
+              <a:ext uri="{FF2B5EF4-FFF2-40B4-BE49-F238E27FC236}">
+                <a16:creationId xmlns:a16="http://schemas.microsoft.com/office/drawing/2014/main" id="{C98FDD01-A6F3-46B0-A7A5-740763964552}"/>
+              </a:ext>
+            </a:extLst>
+          </p:cNvPr>
+          <p:cNvSpPr>
+            <a:spLocks noGrp="1"/>
+          </p:cNvSpPr>
+          <p:nvPr>
+            <p:ph idx="1"/>
+          </p:nvPr>
+        </p:nvSpPr>
+        <p:spPr/>
+        <p:txBody>
+          <a:bodyPr/>
+          <a:lstStyle/>
+          <a:p>
+            <a:endParaRPr lang="en-CA"/>
+          </a:p>
+        </p:txBody>
+      </p:sp>
+    </p:spTree>
+    <p:extLst>
+      <p:ext uri="{BB962C8B-B14F-4D97-AF65-F5344CB8AC3E}">
+        <p14:creationId xmlns:p14="http://schemas.microsoft.com/office/powerpoint/2010/main" val="4294789758"/>
+      </p:ext>
+    </p:extLst>
+  </p:cSld>
+  <p:clrMapOvr>
+    <a:masterClrMapping/>
+  </p:clrMapOvr>
+</p:sld>
+</file>
+
+<file path=ppt/slides/slide7.xml><?xml version="1.0" encoding="utf-8"?>
+<p:sld xmlns:a="http://schemas.openxmlformats.org/drawingml/2006/main" xmlns:r="http://schemas.openxmlformats.org/officeDocument/2006/relationships" xmlns:p="http://schemas.openxmlformats.org/presentationml/2006/main">
+  <p:cSld>
+    <p:spTree>
+      <p:nvGrpSpPr>
+        <p:cNvPr id="1" name=""/>
+        <p:cNvGrpSpPr/>
+        <p:nvPr/>
+      </p:nvGrpSpPr>
+      <p:grpSpPr>
+        <a:xfrm>
+          <a:off x="0" y="0"/>
+          <a:ext cx="0" cy="0"/>
+          <a:chOff x="0" y="0"/>
+          <a:chExt cx="0" cy="0"/>
+        </a:xfrm>
+      </p:grpSpPr>
+      <p:sp>
+        <p:nvSpPr>
+          <p:cNvPr id="2" name="Title 1">
+            <a:extLst>
+              <a:ext uri="{FF2B5EF4-FFF2-40B4-BE49-F238E27FC236}">
+                <a16:creationId xmlns:a16="http://schemas.microsoft.com/office/drawing/2014/main" id="{4D96D023-FF4C-48F9-8D0D-C84356743869}"/>
+              </a:ext>
+            </a:extLst>
+          </p:cNvPr>
+          <p:cNvSpPr>
+            <a:spLocks noGrp="1"/>
+          </p:cNvSpPr>
+          <p:nvPr>
+            <p:ph type="title"/>
+          </p:nvPr>
+        </p:nvSpPr>
+        <p:spPr/>
+        <p:txBody>
+          <a:bodyPr/>
+          <a:lstStyle/>
+          <a:p>
+            <a:r>
+              <a:rPr lang="en-CA" dirty="0" err="1"/>
+              <a:t>Protocole</a:t>
+            </a:r>
+            <a:endParaRPr lang="en-CA" dirty="0"/>
+          </a:p>
+        </p:txBody>
+      </p:sp>
+      <p:sp>
+        <p:nvSpPr>
+          <p:cNvPr id="3" name="TextBox 2">
+            <a:extLst>
+              <a:ext uri="{FF2B5EF4-FFF2-40B4-BE49-F238E27FC236}">
+                <a16:creationId xmlns:a16="http://schemas.microsoft.com/office/drawing/2014/main" id="{42DA6C5E-FC75-4155-A6A5-19DC3943EF40}"/>
+              </a:ext>
+            </a:extLst>
+          </p:cNvPr>
+          <p:cNvSpPr txBox="1"/>
+          <p:nvPr/>
+        </p:nvSpPr>
+        <p:spPr>
+          <a:xfrm>
+            <a:off x="685800" y="1907931"/>
+            <a:ext cx="11506199" cy="461665"/>
+          </a:xfrm>
+          <a:prstGeom prst="rect">
+            <a:avLst/>
+          </a:prstGeom>
+          <a:noFill/>
+        </p:spPr>
+        <p:txBody>
+          <a:bodyPr wrap="square" rtlCol="0">
+            <a:spAutoFit/>
+          </a:bodyPr>
+          <a:lstStyle/>
+          <a:p>
+            <a:r>
+              <a:rPr lang="en-CA" sz="2400" dirty="0" err="1"/>
+              <a:t>Défis</a:t>
+            </a:r>
+            <a:r>
+              <a:rPr lang="en-CA" sz="2400" dirty="0"/>
+              <a:t> à </a:t>
+            </a:r>
+            <a:r>
+              <a:rPr lang="en-CA" sz="2400" dirty="0" err="1"/>
+              <a:t>relever</a:t>
+            </a:r>
+            <a:r>
+              <a:rPr lang="en-CA" sz="2400" dirty="0"/>
+              <a:t>:</a:t>
+            </a:r>
+          </a:p>
+        </p:txBody>
+      </p:sp>
+      <p:sp>
+        <p:nvSpPr>
+          <p:cNvPr id="4" name="TextBox 3">
+            <a:extLst>
+              <a:ext uri="{FF2B5EF4-FFF2-40B4-BE49-F238E27FC236}">
+                <a16:creationId xmlns:a16="http://schemas.microsoft.com/office/drawing/2014/main" id="{5FEF8A14-9BCD-43CA-BA7F-8EB49C06208A}"/>
+              </a:ext>
+            </a:extLst>
+          </p:cNvPr>
+          <p:cNvSpPr txBox="1"/>
+          <p:nvPr/>
+        </p:nvSpPr>
+        <p:spPr>
+          <a:xfrm>
+            <a:off x="808892" y="2716823"/>
+            <a:ext cx="10612316" cy="1754326"/>
+          </a:xfrm>
+          <a:prstGeom prst="rect">
+            <a:avLst/>
+          </a:prstGeom>
+          <a:noFill/>
+        </p:spPr>
+        <p:txBody>
+          <a:bodyPr wrap="square" rtlCol="0">
+            <a:spAutoFit/>
+          </a:bodyPr>
+          <a:lstStyle/>
+          <a:p>
+            <a:pPr marL="285750" indent="-285750">
+              <a:buFont typeface="Arial" panose="020B0604020202020204" pitchFamily="34" charset="0"/>
+              <a:buChar char="•"/>
+            </a:pPr>
+            <a:r>
+              <a:rPr lang="en-CA" dirty="0"/>
+              <a:t>Distinction des </a:t>
+            </a:r>
+            <a:r>
+              <a:rPr lang="en-CA" dirty="0" err="1"/>
+              <a:t>signaux</a:t>
+            </a:r>
+            <a:r>
+              <a:rPr lang="en-CA" dirty="0"/>
+              <a:t> pour </a:t>
+            </a:r>
+            <a:r>
+              <a:rPr lang="en-CA" dirty="0" err="1"/>
+              <a:t>chaque</a:t>
+            </a:r>
+            <a:r>
+              <a:rPr lang="en-CA" dirty="0"/>
+              <a:t> </a:t>
+            </a:r>
+            <a:r>
+              <a:rPr lang="en-CA" dirty="0" err="1"/>
+              <a:t>ruche</a:t>
+            </a:r>
+            <a:endParaRPr lang="en-CA" dirty="0"/>
+          </a:p>
+          <a:p>
+            <a:pPr marL="285750" indent="-285750">
+              <a:buFont typeface="Arial" panose="020B0604020202020204" pitchFamily="34" charset="0"/>
+              <a:buChar char="•"/>
+            </a:pPr>
+            <a:endParaRPr lang="en-CA" dirty="0"/>
+          </a:p>
+          <a:p>
+            <a:pPr marL="285750" indent="-285750">
+              <a:buFont typeface="Arial" panose="020B0604020202020204" pitchFamily="34" charset="0"/>
+              <a:buChar char="•"/>
+            </a:pPr>
+            <a:r>
+              <a:rPr lang="en-CA" dirty="0"/>
+              <a:t>Reconnaissance des </a:t>
+            </a:r>
+            <a:r>
+              <a:rPr lang="en-CA" dirty="0" err="1"/>
+              <a:t>différentes</a:t>
+            </a:r>
+            <a:r>
+              <a:rPr lang="en-CA" dirty="0"/>
+              <a:t> </a:t>
+            </a:r>
+            <a:r>
+              <a:rPr lang="en-CA" dirty="0" err="1"/>
+              <a:t>commandes</a:t>
+            </a:r>
+            <a:endParaRPr lang="en-CA" dirty="0"/>
+          </a:p>
+          <a:p>
+            <a:pPr marL="285750" indent="-285750">
+              <a:buFont typeface="Arial" panose="020B0604020202020204" pitchFamily="34" charset="0"/>
+              <a:buChar char="•"/>
+            </a:pPr>
+            <a:endParaRPr lang="en-CA" dirty="0"/>
+          </a:p>
+          <a:p>
+            <a:pPr marL="285750" indent="-285750">
+              <a:buFont typeface="Arial" panose="020B0604020202020204" pitchFamily="34" charset="0"/>
+              <a:buChar char="•"/>
+            </a:pPr>
+            <a:r>
+              <a:rPr lang="en-CA" dirty="0" err="1"/>
+              <a:t>Vérification</a:t>
+            </a:r>
+            <a:r>
+              <a:rPr lang="en-CA" dirty="0"/>
+              <a:t> de </a:t>
+            </a:r>
+            <a:r>
+              <a:rPr lang="en-CA" dirty="0" err="1"/>
+              <a:t>l’état</a:t>
+            </a:r>
+            <a:r>
+              <a:rPr lang="en-CA" dirty="0"/>
+              <a:t> des </a:t>
+            </a:r>
+            <a:r>
+              <a:rPr lang="en-CA" dirty="0" err="1"/>
+              <a:t>ruches</a:t>
+            </a:r>
+            <a:endParaRPr lang="en-CA" dirty="0"/>
+          </a:p>
+          <a:p>
+            <a:pPr marL="285750" indent="-285750">
+              <a:buFont typeface="Arial" panose="020B0604020202020204" pitchFamily="34" charset="0"/>
+              <a:buChar char="•"/>
+            </a:pPr>
+            <a:endParaRPr lang="en-CA" dirty="0"/>
+          </a:p>
+        </p:txBody>
+      </p:sp>
+    </p:spTree>
+    <p:extLst>
+      <p:ext uri="{BB962C8B-B14F-4D97-AF65-F5344CB8AC3E}">
+        <p14:creationId xmlns:p14="http://schemas.microsoft.com/office/powerpoint/2010/main" val="1560542592"/>
+      </p:ext>
+    </p:extLst>
+  </p:cSld>
+  <p:clrMapOvr>
+    <a:masterClrMapping/>
+  </p:clrMapOvr>
+</p:sld>
+</file>
+
+<file path=ppt/slides/slide8.xml><?xml version="1.0" encoding="utf-8"?>
+<p:sld xmlns:a="http://schemas.openxmlformats.org/drawingml/2006/main" xmlns:r="http://schemas.openxmlformats.org/officeDocument/2006/relationships" xmlns:p="http://schemas.openxmlformats.org/presentationml/2006/main">
+  <p:cSld>
+    <p:spTree>
+      <p:nvGrpSpPr>
+        <p:cNvPr id="1" name=""/>
+        <p:cNvGrpSpPr/>
+        <p:nvPr/>
+      </p:nvGrpSpPr>
+      <p:grpSpPr>
+        <a:xfrm>
+          <a:off x="0" y="0"/>
+          <a:ext cx="0" cy="0"/>
+          <a:chOff x="0" y="0"/>
+          <a:chExt cx="0" cy="0"/>
+        </a:xfrm>
+      </p:grpSpPr>
+      <p:sp>
+        <p:nvSpPr>
+          <p:cNvPr id="2" name="Title 1">
+            <a:extLst>
+              <a:ext uri="{FF2B5EF4-FFF2-40B4-BE49-F238E27FC236}">
                 <a16:creationId xmlns:a16="http://schemas.microsoft.com/office/drawing/2014/main" id="{4D96D023-FF4C-48F9-8D0D-C84356743869}"/>
               </a:ext>
             </a:extLst>
@@ -8576,7 +9307,7 @@
 </p:sld>
 </file>
 
-<file path=ppt/slides/slide7.xml><?xml version="1.0" encoding="utf-8"?>
+<file path=ppt/slides/slide9.xml><?xml version="1.0" encoding="utf-8"?>
 <p:sld xmlns:a="http://schemas.openxmlformats.org/drawingml/2006/main" xmlns:r="http://schemas.openxmlformats.org/officeDocument/2006/relationships" xmlns:p="http://schemas.openxmlformats.org/presentationml/2006/main">
   <p:cSld>
     <p:spTree>
@@ -8864,86 +9595,6 @@
     <p:extLst>
       <p:ext uri="{BB962C8B-B14F-4D97-AF65-F5344CB8AC3E}">
         <p14:creationId xmlns:p14="http://schemas.microsoft.com/office/powerpoint/2010/main" val="59767548"/>
-      </p:ext>
-    </p:extLst>
-  </p:cSld>
-  <p:clrMapOvr>
-    <a:masterClrMapping/>
-  </p:clrMapOvr>
-</p:sld>
-</file>
-
-<file path=ppt/slides/slide8.xml><?xml version="1.0" encoding="utf-8"?>
-<p:sld xmlns:a="http://schemas.openxmlformats.org/drawingml/2006/main" xmlns:r="http://schemas.openxmlformats.org/officeDocument/2006/relationships" xmlns:p="http://schemas.openxmlformats.org/presentationml/2006/main">
-  <p:cSld>
-    <p:spTree>
-      <p:nvGrpSpPr>
-        <p:cNvPr id="1" name=""/>
-        <p:cNvGrpSpPr/>
-        <p:nvPr/>
-      </p:nvGrpSpPr>
-      <p:grpSpPr>
-        <a:xfrm>
-          <a:off x="0" y="0"/>
-          <a:ext cx="0" cy="0"/>
-          <a:chOff x="0" y="0"/>
-          <a:chExt cx="0" cy="0"/>
-        </a:xfrm>
-      </p:grpSpPr>
-      <p:sp>
-        <p:nvSpPr>
-          <p:cNvPr id="2" name="Title 1">
-            <a:extLst>
-              <a:ext uri="{FF2B5EF4-FFF2-40B4-BE49-F238E27FC236}">
-                <a16:creationId xmlns:a16="http://schemas.microsoft.com/office/drawing/2014/main" id="{E08F6E75-2A45-4CD7-A89B-35B31D4D478A}"/>
-              </a:ext>
-            </a:extLst>
-          </p:cNvPr>
-          <p:cNvSpPr>
-            <a:spLocks noGrp="1"/>
-          </p:cNvSpPr>
-          <p:nvPr>
-            <p:ph type="title"/>
-          </p:nvPr>
-        </p:nvSpPr>
-        <p:spPr/>
-        <p:txBody>
-          <a:bodyPr/>
-          <a:lstStyle/>
-          <a:p>
-            <a:endParaRPr lang="en-CA"/>
-          </a:p>
-        </p:txBody>
-      </p:sp>
-      <p:sp>
-        <p:nvSpPr>
-          <p:cNvPr id="3" name="Content Placeholder 2">
-            <a:extLst>
-              <a:ext uri="{FF2B5EF4-FFF2-40B4-BE49-F238E27FC236}">
-                <a16:creationId xmlns:a16="http://schemas.microsoft.com/office/drawing/2014/main" id="{B415ED72-9909-4FA1-907A-DAF78FD34380}"/>
-              </a:ext>
-            </a:extLst>
-          </p:cNvPr>
-          <p:cNvSpPr>
-            <a:spLocks noGrp="1"/>
-          </p:cNvSpPr>
-          <p:nvPr>
-            <p:ph idx="1"/>
-          </p:nvPr>
-        </p:nvSpPr>
-        <p:spPr/>
-        <p:txBody>
-          <a:bodyPr/>
-          <a:lstStyle/>
-          <a:p>
-            <a:endParaRPr lang="en-CA"/>
-          </a:p>
-        </p:txBody>
-      </p:sp>
-    </p:spTree>
-    <p:extLst>
-      <p:ext uri="{BB962C8B-B14F-4D97-AF65-F5344CB8AC3E}">
-        <p14:creationId xmlns:p14="http://schemas.microsoft.com/office/powerpoint/2010/main" val="816399630"/>
       </p:ext>
     </p:extLst>
   </p:cSld>

</xml_diff>

<commit_message>
Ajout de certaines parties du power point
</commit_message>
<xml_diff>
--- a/Présentation Finale – P3.pptx
+++ b/Présentation Finale – P3.pptx
@@ -6,15 +6,18 @@
   </p:sldMasterIdLst>
   <p:sldIdLst>
     <p:sldId id="256" r:id="rId2"/>
-    <p:sldId id="265" r:id="rId3"/>
-    <p:sldId id="266" r:id="rId4"/>
-    <p:sldId id="257" r:id="rId5"/>
-    <p:sldId id="258" r:id="rId6"/>
-    <p:sldId id="259" r:id="rId7"/>
-    <p:sldId id="260" r:id="rId8"/>
-    <p:sldId id="263" r:id="rId9"/>
-    <p:sldId id="264" r:id="rId10"/>
-    <p:sldId id="261" r:id="rId11"/>
+    <p:sldId id="268" r:id="rId3"/>
+    <p:sldId id="269" r:id="rId4"/>
+    <p:sldId id="267" r:id="rId5"/>
+    <p:sldId id="266" r:id="rId6"/>
+    <p:sldId id="257" r:id="rId7"/>
+    <p:sldId id="258" r:id="rId8"/>
+    <p:sldId id="259" r:id="rId9"/>
+    <p:sldId id="261" r:id="rId10"/>
+    <p:sldId id="260" r:id="rId11"/>
+    <p:sldId id="263" r:id="rId12"/>
+    <p:sldId id="264" r:id="rId13"/>
+    <p:sldId id="265" r:id="rId14"/>
   </p:sldIdLst>
   <p:sldSz cx="12192000" cy="6858000"/>
   <p:notesSz cx="6858000" cy="9144000"/>
@@ -7760,7 +7763,7 @@
           <p:cNvPr id="2" name="Title 1">
             <a:extLst>
               <a:ext uri="{FF2B5EF4-FFF2-40B4-BE49-F238E27FC236}">
-                <a16:creationId xmlns:a16="http://schemas.microsoft.com/office/drawing/2014/main" id="{E08F6E75-2A45-4CD7-A89B-35B31D4D478A}"/>
+                <a16:creationId xmlns:a16="http://schemas.microsoft.com/office/drawing/2014/main" id="{4D96D023-FF4C-48F9-8D0D-C84356743869}"/>
               </a:ext>
             </a:extLst>
           </p:cNvPr>
@@ -7776,39 +7779,1078 @@
           <a:bodyPr/>
           <a:lstStyle/>
           <a:p>
-            <a:endParaRPr lang="en-CA"/>
-          </a:p>
-        </p:txBody>
-      </p:sp>
-      <p:sp>
-        <p:nvSpPr>
-          <p:cNvPr id="3" name="Content Placeholder 2">
+            <a:r>
+              <a:rPr lang="en-CA" dirty="0" err="1"/>
+              <a:t>Protocole</a:t>
+            </a:r>
+            <a:endParaRPr lang="en-CA" dirty="0"/>
+          </a:p>
+        </p:txBody>
+      </p:sp>
+      <p:sp>
+        <p:nvSpPr>
+          <p:cNvPr id="3" name="TextBox 2">
             <a:extLst>
               <a:ext uri="{FF2B5EF4-FFF2-40B4-BE49-F238E27FC236}">
-                <a16:creationId xmlns:a16="http://schemas.microsoft.com/office/drawing/2014/main" id="{B415ED72-9909-4FA1-907A-DAF78FD34380}"/>
+                <a16:creationId xmlns:a16="http://schemas.microsoft.com/office/drawing/2014/main" id="{42DA6C5E-FC75-4155-A6A5-19DC3943EF40}"/>
               </a:ext>
             </a:extLst>
           </p:cNvPr>
-          <p:cNvSpPr>
-            <a:spLocks noGrp="1"/>
-          </p:cNvSpPr>
-          <p:nvPr>
-            <p:ph idx="1"/>
-          </p:nvPr>
-        </p:nvSpPr>
-        <p:spPr/>
-        <p:txBody>
-          <a:bodyPr/>
+          <p:cNvSpPr txBox="1"/>
+          <p:nvPr/>
+        </p:nvSpPr>
+        <p:spPr>
+          <a:xfrm>
+            <a:off x="685800" y="1907931"/>
+            <a:ext cx="11506199" cy="461665"/>
+          </a:xfrm>
+          <a:prstGeom prst="rect">
+            <a:avLst/>
+          </a:prstGeom>
+          <a:noFill/>
+        </p:spPr>
+        <p:txBody>
+          <a:bodyPr wrap="square" rtlCol="0">
+            <a:spAutoFit/>
+          </a:bodyPr>
           <a:lstStyle/>
           <a:p>
-            <a:endParaRPr lang="en-CA"/>
+            <a:r>
+              <a:rPr lang="en-CA" sz="2400" dirty="0" err="1"/>
+              <a:t>Défis</a:t>
+            </a:r>
+            <a:r>
+              <a:rPr lang="en-CA" sz="2400" dirty="0"/>
+              <a:t> à </a:t>
+            </a:r>
+            <a:r>
+              <a:rPr lang="en-CA" sz="2400" dirty="0" err="1"/>
+              <a:t>relever</a:t>
+            </a:r>
+            <a:r>
+              <a:rPr lang="en-CA" sz="2400" dirty="0"/>
+              <a:t>:</a:t>
+            </a:r>
+          </a:p>
+        </p:txBody>
+      </p:sp>
+      <p:sp>
+        <p:nvSpPr>
+          <p:cNvPr id="4" name="TextBox 3">
+            <a:extLst>
+              <a:ext uri="{FF2B5EF4-FFF2-40B4-BE49-F238E27FC236}">
+                <a16:creationId xmlns:a16="http://schemas.microsoft.com/office/drawing/2014/main" id="{5FEF8A14-9BCD-43CA-BA7F-8EB49C06208A}"/>
+              </a:ext>
+            </a:extLst>
+          </p:cNvPr>
+          <p:cNvSpPr txBox="1"/>
+          <p:nvPr/>
+        </p:nvSpPr>
+        <p:spPr>
+          <a:xfrm>
+            <a:off x="808892" y="2716823"/>
+            <a:ext cx="10612316" cy="1754326"/>
+          </a:xfrm>
+          <a:prstGeom prst="rect">
+            <a:avLst/>
+          </a:prstGeom>
+          <a:noFill/>
+        </p:spPr>
+        <p:txBody>
+          <a:bodyPr wrap="square" rtlCol="0">
+            <a:spAutoFit/>
+          </a:bodyPr>
+          <a:lstStyle/>
+          <a:p>
+            <a:pPr marL="285750" indent="-285750">
+              <a:buFont typeface="Arial" panose="020B0604020202020204" pitchFamily="34" charset="0"/>
+              <a:buChar char="•"/>
+            </a:pPr>
+            <a:r>
+              <a:rPr lang="en-CA" dirty="0"/>
+              <a:t>Distinction des </a:t>
+            </a:r>
+            <a:r>
+              <a:rPr lang="en-CA" dirty="0" err="1"/>
+              <a:t>signaux</a:t>
+            </a:r>
+            <a:r>
+              <a:rPr lang="en-CA" dirty="0"/>
+              <a:t> pour </a:t>
+            </a:r>
+            <a:r>
+              <a:rPr lang="en-CA" dirty="0" err="1"/>
+              <a:t>chaque</a:t>
+            </a:r>
+            <a:r>
+              <a:rPr lang="en-CA" dirty="0"/>
+              <a:t> </a:t>
+            </a:r>
+            <a:r>
+              <a:rPr lang="en-CA" dirty="0" err="1"/>
+              <a:t>ruche</a:t>
+            </a:r>
+            <a:endParaRPr lang="en-CA" dirty="0"/>
+          </a:p>
+          <a:p>
+            <a:pPr marL="285750" indent="-285750">
+              <a:buFont typeface="Arial" panose="020B0604020202020204" pitchFamily="34" charset="0"/>
+              <a:buChar char="•"/>
+            </a:pPr>
+            <a:endParaRPr lang="en-CA" dirty="0"/>
+          </a:p>
+          <a:p>
+            <a:pPr marL="285750" indent="-285750">
+              <a:buFont typeface="Arial" panose="020B0604020202020204" pitchFamily="34" charset="0"/>
+              <a:buChar char="•"/>
+            </a:pPr>
+            <a:r>
+              <a:rPr lang="en-CA" dirty="0"/>
+              <a:t>Reconnaissance des </a:t>
+            </a:r>
+            <a:r>
+              <a:rPr lang="en-CA" dirty="0" err="1"/>
+              <a:t>différentes</a:t>
+            </a:r>
+            <a:r>
+              <a:rPr lang="en-CA" dirty="0"/>
+              <a:t> </a:t>
+            </a:r>
+            <a:r>
+              <a:rPr lang="en-CA" dirty="0" err="1"/>
+              <a:t>commandes</a:t>
+            </a:r>
+            <a:endParaRPr lang="en-CA" dirty="0"/>
+          </a:p>
+          <a:p>
+            <a:pPr marL="285750" indent="-285750">
+              <a:buFont typeface="Arial" panose="020B0604020202020204" pitchFamily="34" charset="0"/>
+              <a:buChar char="•"/>
+            </a:pPr>
+            <a:endParaRPr lang="en-CA" dirty="0"/>
+          </a:p>
+          <a:p>
+            <a:pPr marL="285750" indent="-285750">
+              <a:buFont typeface="Arial" panose="020B0604020202020204" pitchFamily="34" charset="0"/>
+              <a:buChar char="•"/>
+            </a:pPr>
+            <a:r>
+              <a:rPr lang="en-CA" dirty="0" err="1"/>
+              <a:t>Vérification</a:t>
+            </a:r>
+            <a:r>
+              <a:rPr lang="en-CA" dirty="0"/>
+              <a:t> de </a:t>
+            </a:r>
+            <a:r>
+              <a:rPr lang="en-CA" dirty="0" err="1"/>
+              <a:t>l’état</a:t>
+            </a:r>
+            <a:r>
+              <a:rPr lang="en-CA" dirty="0"/>
+              <a:t> des </a:t>
+            </a:r>
+            <a:r>
+              <a:rPr lang="en-CA" dirty="0" err="1"/>
+              <a:t>ruches</a:t>
+            </a:r>
+            <a:endParaRPr lang="en-CA" dirty="0"/>
+          </a:p>
+          <a:p>
+            <a:pPr marL="285750" indent="-285750">
+              <a:buFont typeface="Arial" panose="020B0604020202020204" pitchFamily="34" charset="0"/>
+              <a:buChar char="•"/>
+            </a:pPr>
+            <a:endParaRPr lang="en-CA" dirty="0"/>
           </a:p>
         </p:txBody>
       </p:sp>
     </p:spTree>
     <p:extLst>
       <p:ext uri="{BB962C8B-B14F-4D97-AF65-F5344CB8AC3E}">
-        <p14:creationId xmlns:p14="http://schemas.microsoft.com/office/powerpoint/2010/main" val="816399630"/>
+        <p14:creationId xmlns:p14="http://schemas.microsoft.com/office/powerpoint/2010/main" val="1560542592"/>
+      </p:ext>
+    </p:extLst>
+  </p:cSld>
+  <p:clrMapOvr>
+    <a:masterClrMapping/>
+  </p:clrMapOvr>
+</p:sld>
+</file>
+
+<file path=ppt/slides/slide11.xml><?xml version="1.0" encoding="utf-8"?>
+<p:sld xmlns:a="http://schemas.openxmlformats.org/drawingml/2006/main" xmlns:r="http://schemas.openxmlformats.org/officeDocument/2006/relationships" xmlns:p="http://schemas.openxmlformats.org/presentationml/2006/main">
+  <p:cSld>
+    <p:spTree>
+      <p:nvGrpSpPr>
+        <p:cNvPr id="1" name=""/>
+        <p:cNvGrpSpPr/>
+        <p:nvPr/>
+      </p:nvGrpSpPr>
+      <p:grpSpPr>
+        <a:xfrm>
+          <a:off x="0" y="0"/>
+          <a:ext cx="0" cy="0"/>
+          <a:chOff x="0" y="0"/>
+          <a:chExt cx="0" cy="0"/>
+        </a:xfrm>
+      </p:grpSpPr>
+      <p:sp>
+        <p:nvSpPr>
+          <p:cNvPr id="2" name="Title 1">
+            <a:extLst>
+              <a:ext uri="{FF2B5EF4-FFF2-40B4-BE49-F238E27FC236}">
+                <a16:creationId xmlns:a16="http://schemas.microsoft.com/office/drawing/2014/main" id="{4D96D023-FF4C-48F9-8D0D-C84356743869}"/>
+              </a:ext>
+            </a:extLst>
+          </p:cNvPr>
+          <p:cNvSpPr>
+            <a:spLocks noGrp="1"/>
+          </p:cNvSpPr>
+          <p:nvPr>
+            <p:ph type="title"/>
+          </p:nvPr>
+        </p:nvSpPr>
+        <p:spPr/>
+        <p:txBody>
+          <a:bodyPr/>
+          <a:lstStyle/>
+          <a:p>
+            <a:r>
+              <a:rPr lang="en-CA" dirty="0" err="1"/>
+              <a:t>Protocole</a:t>
+            </a:r>
+            <a:endParaRPr lang="en-CA" dirty="0"/>
+          </a:p>
+        </p:txBody>
+      </p:sp>
+      <p:sp>
+        <p:nvSpPr>
+          <p:cNvPr id="3" name="TextBox 2">
+            <a:extLst>
+              <a:ext uri="{FF2B5EF4-FFF2-40B4-BE49-F238E27FC236}">
+                <a16:creationId xmlns:a16="http://schemas.microsoft.com/office/drawing/2014/main" id="{42DA6C5E-FC75-4155-A6A5-19DC3943EF40}"/>
+              </a:ext>
+            </a:extLst>
+          </p:cNvPr>
+          <p:cNvSpPr txBox="1"/>
+          <p:nvPr/>
+        </p:nvSpPr>
+        <p:spPr>
+          <a:xfrm>
+            <a:off x="685800" y="1907931"/>
+            <a:ext cx="11506199" cy="461665"/>
+          </a:xfrm>
+          <a:prstGeom prst="rect">
+            <a:avLst/>
+          </a:prstGeom>
+          <a:noFill/>
+        </p:spPr>
+        <p:txBody>
+          <a:bodyPr wrap="square" rtlCol="0">
+            <a:spAutoFit/>
+          </a:bodyPr>
+          <a:lstStyle/>
+          <a:p>
+            <a:r>
+              <a:rPr lang="en-CA" sz="2400" dirty="0"/>
+              <a:t>Solutions:</a:t>
+            </a:r>
+          </a:p>
+        </p:txBody>
+      </p:sp>
+      <p:sp>
+        <p:nvSpPr>
+          <p:cNvPr id="5" name="TextBox 4">
+            <a:extLst>
+              <a:ext uri="{FF2B5EF4-FFF2-40B4-BE49-F238E27FC236}">
+                <a16:creationId xmlns:a16="http://schemas.microsoft.com/office/drawing/2014/main" id="{0F05B460-CFDE-45AB-9244-C2381F57C111}"/>
+              </a:ext>
+            </a:extLst>
+          </p:cNvPr>
+          <p:cNvSpPr txBox="1"/>
+          <p:nvPr/>
+        </p:nvSpPr>
+        <p:spPr>
+          <a:xfrm>
+            <a:off x="808892" y="2716823"/>
+            <a:ext cx="10612316" cy="2585323"/>
+          </a:xfrm>
+          <a:prstGeom prst="rect">
+            <a:avLst/>
+          </a:prstGeom>
+          <a:noFill/>
+        </p:spPr>
+        <p:txBody>
+          <a:bodyPr wrap="square" rtlCol="0">
+            <a:spAutoFit/>
+          </a:bodyPr>
+          <a:lstStyle/>
+          <a:p>
+            <a:pPr marL="285750" indent="-285750">
+              <a:buFont typeface="Arial" panose="020B0604020202020204" pitchFamily="34" charset="0"/>
+              <a:buChar char="•"/>
+            </a:pPr>
+            <a:r>
+              <a:rPr lang="en-CA" dirty="0" err="1"/>
+              <a:t>Ajout</a:t>
+            </a:r>
+            <a:r>
+              <a:rPr lang="en-CA" dirty="0"/>
+              <a:t> d’un </a:t>
+            </a:r>
+            <a:r>
+              <a:rPr lang="en-CA" dirty="0" err="1"/>
+              <a:t>numéro</a:t>
+            </a:r>
+            <a:r>
+              <a:rPr lang="en-CA" dirty="0"/>
+              <a:t> </a:t>
+            </a:r>
+            <a:r>
+              <a:rPr lang="en-CA" dirty="0" err="1"/>
+              <a:t>d’identification</a:t>
+            </a:r>
+            <a:r>
+              <a:rPr lang="en-CA" dirty="0"/>
+              <a:t> pour </a:t>
+            </a:r>
+            <a:r>
+              <a:rPr lang="en-CA" dirty="0" err="1"/>
+              <a:t>chaque</a:t>
+            </a:r>
+            <a:r>
+              <a:rPr lang="en-CA" dirty="0"/>
+              <a:t> </a:t>
+            </a:r>
+            <a:r>
+              <a:rPr lang="en-CA" dirty="0" err="1"/>
+              <a:t>ruche</a:t>
+            </a:r>
+            <a:r>
+              <a:rPr lang="en-CA" dirty="0"/>
+              <a:t>. </a:t>
+            </a:r>
+            <a:r>
+              <a:rPr lang="en-CA" dirty="0" err="1"/>
+              <a:t>Chaque</a:t>
+            </a:r>
+            <a:r>
+              <a:rPr lang="en-CA" dirty="0"/>
+              <a:t> communication entre le </a:t>
+            </a:r>
+            <a:r>
+              <a:rPr lang="en-CA" dirty="0" err="1"/>
+              <a:t>serveur</a:t>
+            </a:r>
+            <a:r>
+              <a:rPr lang="en-CA" dirty="0"/>
+              <a:t> et </a:t>
+            </a:r>
+            <a:r>
+              <a:rPr lang="en-CA" dirty="0" err="1"/>
+              <a:t>une</a:t>
+            </a:r>
+            <a:r>
+              <a:rPr lang="en-CA" dirty="0"/>
+              <a:t> </a:t>
+            </a:r>
+            <a:r>
+              <a:rPr lang="en-CA" dirty="0" err="1"/>
+              <a:t>ruche</a:t>
+            </a:r>
+            <a:r>
+              <a:rPr lang="en-CA" dirty="0"/>
+              <a:t> </a:t>
+            </a:r>
+            <a:r>
+              <a:rPr lang="en-CA" dirty="0" err="1"/>
+              <a:t>contient</a:t>
+            </a:r>
+            <a:r>
+              <a:rPr lang="en-CA" dirty="0"/>
+              <a:t> le </a:t>
+            </a:r>
+            <a:r>
+              <a:rPr lang="en-CA" dirty="0" err="1"/>
+              <a:t>numéro</a:t>
+            </a:r>
+            <a:r>
+              <a:rPr lang="en-CA" dirty="0"/>
+              <a:t> pour </a:t>
+            </a:r>
+            <a:r>
+              <a:rPr lang="en-CA" dirty="0" err="1"/>
+              <a:t>différencier</a:t>
+            </a:r>
+            <a:r>
+              <a:rPr lang="en-CA" dirty="0"/>
+              <a:t>.</a:t>
+            </a:r>
+          </a:p>
+          <a:p>
+            <a:pPr marL="285750" indent="-285750">
+              <a:buFont typeface="Arial" panose="020B0604020202020204" pitchFamily="34" charset="0"/>
+              <a:buChar char="•"/>
+            </a:pPr>
+            <a:endParaRPr lang="en-CA" dirty="0"/>
+          </a:p>
+          <a:p>
+            <a:pPr marL="285750" indent="-285750">
+              <a:buFont typeface="Arial" panose="020B0604020202020204" pitchFamily="34" charset="0"/>
+              <a:buChar char="•"/>
+            </a:pPr>
+            <a:r>
+              <a:rPr lang="en-CA" dirty="0"/>
+              <a:t>Assignation d’un </a:t>
+            </a:r>
+            <a:r>
+              <a:rPr lang="en-CA" dirty="0" err="1"/>
+              <a:t>caractère</a:t>
+            </a:r>
+            <a:r>
+              <a:rPr lang="en-CA" dirty="0"/>
+              <a:t> pour </a:t>
+            </a:r>
+            <a:r>
+              <a:rPr lang="en-CA" dirty="0" err="1"/>
+              <a:t>chaque</a:t>
+            </a:r>
+            <a:r>
+              <a:rPr lang="en-CA" dirty="0"/>
+              <a:t> </a:t>
+            </a:r>
+            <a:r>
+              <a:rPr lang="en-CA" dirty="0" err="1"/>
+              <a:t>commande</a:t>
+            </a:r>
+            <a:r>
+              <a:rPr lang="en-CA" dirty="0"/>
+              <a:t>.</a:t>
+            </a:r>
+          </a:p>
+          <a:p>
+            <a:pPr marL="285750" indent="-285750">
+              <a:buFont typeface="Arial" panose="020B0604020202020204" pitchFamily="34" charset="0"/>
+              <a:buChar char="•"/>
+            </a:pPr>
+            <a:endParaRPr lang="en-CA" dirty="0"/>
+          </a:p>
+          <a:p>
+            <a:pPr marL="285750" indent="-285750">
+              <a:buFont typeface="Arial" panose="020B0604020202020204" pitchFamily="34" charset="0"/>
+              <a:buChar char="•"/>
+            </a:pPr>
+            <a:r>
+              <a:rPr lang="en-CA" dirty="0" err="1"/>
+              <a:t>Rétroaction</a:t>
+            </a:r>
+            <a:r>
+              <a:rPr lang="en-CA" dirty="0"/>
+              <a:t> des </a:t>
+            </a:r>
+            <a:r>
+              <a:rPr lang="en-CA" dirty="0" err="1"/>
+              <a:t>ruches</a:t>
+            </a:r>
+            <a:r>
+              <a:rPr lang="en-CA" dirty="0"/>
+              <a:t> </a:t>
+            </a:r>
+            <a:r>
+              <a:rPr lang="en-CA" dirty="0" err="1"/>
+              <a:t>lorsqu’une</a:t>
+            </a:r>
+            <a:r>
+              <a:rPr lang="en-CA" dirty="0"/>
+              <a:t> </a:t>
+            </a:r>
+            <a:r>
+              <a:rPr lang="en-CA" dirty="0" err="1"/>
+              <a:t>commande</a:t>
+            </a:r>
+            <a:r>
+              <a:rPr lang="en-CA" dirty="0"/>
+              <a:t> </a:t>
+            </a:r>
+            <a:r>
+              <a:rPr lang="en-CA" dirty="0" err="1"/>
+              <a:t>est</a:t>
+            </a:r>
+            <a:r>
+              <a:rPr lang="en-CA" dirty="0"/>
+              <a:t> </a:t>
+            </a:r>
+            <a:r>
+              <a:rPr lang="en-CA" dirty="0" err="1"/>
+              <a:t>envoyé</a:t>
+            </a:r>
+            <a:r>
+              <a:rPr lang="en-CA" dirty="0"/>
+              <a:t>.</a:t>
+            </a:r>
+          </a:p>
+          <a:p>
+            <a:pPr marL="285750" indent="-285750">
+              <a:buFont typeface="Arial" panose="020B0604020202020204" pitchFamily="34" charset="0"/>
+              <a:buChar char="•"/>
+            </a:pPr>
+            <a:endParaRPr lang="en-CA" dirty="0"/>
+          </a:p>
+          <a:p>
+            <a:endParaRPr lang="en-CA" dirty="0"/>
+          </a:p>
+          <a:p>
+            <a:pPr marL="285750" indent="-285750">
+              <a:buFont typeface="Arial" panose="020B0604020202020204" pitchFamily="34" charset="0"/>
+              <a:buChar char="•"/>
+            </a:pPr>
+            <a:endParaRPr lang="en-CA" dirty="0"/>
+          </a:p>
+        </p:txBody>
+      </p:sp>
+    </p:spTree>
+    <p:extLst>
+      <p:ext uri="{BB962C8B-B14F-4D97-AF65-F5344CB8AC3E}">
+        <p14:creationId xmlns:p14="http://schemas.microsoft.com/office/powerpoint/2010/main" val="1050450600"/>
+      </p:ext>
+    </p:extLst>
+  </p:cSld>
+  <p:clrMapOvr>
+    <a:masterClrMapping/>
+  </p:clrMapOvr>
+</p:sld>
+</file>
+
+<file path=ppt/slides/slide12.xml><?xml version="1.0" encoding="utf-8"?>
+<p:sld xmlns:a="http://schemas.openxmlformats.org/drawingml/2006/main" xmlns:r="http://schemas.openxmlformats.org/officeDocument/2006/relationships" xmlns:p="http://schemas.openxmlformats.org/presentationml/2006/main">
+  <p:cSld>
+    <p:spTree>
+      <p:nvGrpSpPr>
+        <p:cNvPr id="1" name=""/>
+        <p:cNvGrpSpPr/>
+        <p:nvPr/>
+      </p:nvGrpSpPr>
+      <p:grpSpPr>
+        <a:xfrm>
+          <a:off x="0" y="0"/>
+          <a:ext cx="0" cy="0"/>
+          <a:chOff x="0" y="0"/>
+          <a:chExt cx="0" cy="0"/>
+        </a:xfrm>
+      </p:grpSpPr>
+      <p:sp>
+        <p:nvSpPr>
+          <p:cNvPr id="2" name="Title 1">
+            <a:extLst>
+              <a:ext uri="{FF2B5EF4-FFF2-40B4-BE49-F238E27FC236}">
+                <a16:creationId xmlns:a16="http://schemas.microsoft.com/office/drawing/2014/main" id="{4D96D023-FF4C-48F9-8D0D-C84356743869}"/>
+              </a:ext>
+            </a:extLst>
+          </p:cNvPr>
+          <p:cNvSpPr>
+            <a:spLocks noGrp="1"/>
+          </p:cNvSpPr>
+          <p:nvPr>
+            <p:ph type="title"/>
+          </p:nvPr>
+        </p:nvSpPr>
+        <p:spPr/>
+        <p:txBody>
+          <a:bodyPr/>
+          <a:lstStyle/>
+          <a:p>
+            <a:r>
+              <a:rPr lang="en-CA" dirty="0" err="1"/>
+              <a:t>Protocole</a:t>
+            </a:r>
+            <a:endParaRPr lang="en-CA" dirty="0"/>
+          </a:p>
+        </p:txBody>
+      </p:sp>
+      <p:sp>
+        <p:nvSpPr>
+          <p:cNvPr id="3" name="TextBox 2">
+            <a:extLst>
+              <a:ext uri="{FF2B5EF4-FFF2-40B4-BE49-F238E27FC236}">
+                <a16:creationId xmlns:a16="http://schemas.microsoft.com/office/drawing/2014/main" id="{42DA6C5E-FC75-4155-A6A5-19DC3943EF40}"/>
+              </a:ext>
+            </a:extLst>
+          </p:cNvPr>
+          <p:cNvSpPr txBox="1"/>
+          <p:nvPr/>
+        </p:nvSpPr>
+        <p:spPr>
+          <a:xfrm>
+            <a:off x="685800" y="1907931"/>
+            <a:ext cx="11506199" cy="461665"/>
+          </a:xfrm>
+          <a:prstGeom prst="rect">
+            <a:avLst/>
+          </a:prstGeom>
+          <a:noFill/>
+        </p:spPr>
+        <p:txBody>
+          <a:bodyPr wrap="square" rtlCol="0">
+            <a:spAutoFit/>
+          </a:bodyPr>
+          <a:lstStyle/>
+          <a:p>
+            <a:r>
+              <a:rPr lang="en-CA" sz="2400" dirty="0" err="1"/>
+              <a:t>Implémentation</a:t>
+            </a:r>
+            <a:r>
+              <a:rPr lang="en-CA" sz="2400" dirty="0"/>
+              <a:t>:</a:t>
+            </a:r>
+          </a:p>
+        </p:txBody>
+      </p:sp>
+      <p:sp>
+        <p:nvSpPr>
+          <p:cNvPr id="5" name="TextBox 4">
+            <a:extLst>
+              <a:ext uri="{FF2B5EF4-FFF2-40B4-BE49-F238E27FC236}">
+                <a16:creationId xmlns:a16="http://schemas.microsoft.com/office/drawing/2014/main" id="{0F05B460-CFDE-45AB-9244-C2381F57C111}"/>
+              </a:ext>
+            </a:extLst>
+          </p:cNvPr>
+          <p:cNvSpPr txBox="1"/>
+          <p:nvPr/>
+        </p:nvSpPr>
+        <p:spPr>
+          <a:xfrm>
+            <a:off x="808892" y="2635496"/>
+            <a:ext cx="10612316" cy="3416320"/>
+          </a:xfrm>
+          <a:prstGeom prst="rect">
+            <a:avLst/>
+          </a:prstGeom>
+          <a:noFill/>
+        </p:spPr>
+        <p:txBody>
+          <a:bodyPr wrap="square" rtlCol="0">
+            <a:spAutoFit/>
+          </a:bodyPr>
+          <a:lstStyle/>
+          <a:p>
+            <a:pPr marL="285750" indent="-285750">
+              <a:buFont typeface="Arial" panose="020B0604020202020204" pitchFamily="34" charset="0"/>
+              <a:buChar char="•"/>
+            </a:pPr>
+            <a:r>
+              <a:rPr lang="en-CA" dirty="0"/>
+              <a:t>Communication </a:t>
+            </a:r>
+            <a:r>
+              <a:rPr lang="en-CA" dirty="0" err="1"/>
+              <a:t>Serveur</a:t>
+            </a:r>
+            <a:r>
+              <a:rPr lang="en-CA" dirty="0"/>
+              <a:t> -&gt; Ruche:</a:t>
+            </a:r>
+          </a:p>
+          <a:p>
+            <a:pPr marL="285750" indent="-285750">
+              <a:buFont typeface="Arial" panose="020B0604020202020204" pitchFamily="34" charset="0"/>
+              <a:buChar char="•"/>
+            </a:pPr>
+            <a:endParaRPr lang="en-CA" dirty="0"/>
+          </a:p>
+          <a:p>
+            <a:pPr marL="285750" indent="-285750">
+              <a:buFont typeface="Arial" panose="020B0604020202020204" pitchFamily="34" charset="0"/>
+              <a:buChar char="•"/>
+            </a:pPr>
+            <a:endParaRPr lang="en-CA" dirty="0"/>
+          </a:p>
+          <a:p>
+            <a:pPr marL="285750" indent="-285750">
+              <a:buFont typeface="Arial" panose="020B0604020202020204" pitchFamily="34" charset="0"/>
+              <a:buChar char="•"/>
+            </a:pPr>
+            <a:endParaRPr lang="en-CA" dirty="0"/>
+          </a:p>
+          <a:p>
+            <a:pPr marL="285750" indent="-285750">
+              <a:buFont typeface="Arial" panose="020B0604020202020204" pitchFamily="34" charset="0"/>
+              <a:buChar char="•"/>
+            </a:pPr>
+            <a:endParaRPr lang="en-CA" dirty="0"/>
+          </a:p>
+          <a:p>
+            <a:pPr marL="285750" indent="-285750">
+              <a:buFont typeface="Arial" panose="020B0604020202020204" pitchFamily="34" charset="0"/>
+              <a:buChar char="•"/>
+            </a:pPr>
+            <a:endParaRPr lang="en-CA" dirty="0"/>
+          </a:p>
+          <a:p>
+            <a:endParaRPr lang="en-CA" dirty="0"/>
+          </a:p>
+          <a:p>
+            <a:pPr marL="285750" indent="-285750">
+              <a:buFont typeface="Arial" panose="020B0604020202020204" pitchFamily="34" charset="0"/>
+              <a:buChar char="•"/>
+            </a:pPr>
+            <a:endParaRPr lang="en-CA" dirty="0"/>
+          </a:p>
+          <a:p>
+            <a:pPr marL="285750" indent="-285750">
+              <a:buFont typeface="Arial" panose="020B0604020202020204" pitchFamily="34" charset="0"/>
+              <a:buChar char="•"/>
+            </a:pPr>
+            <a:r>
+              <a:rPr lang="en-CA" dirty="0"/>
+              <a:t>Communication Ruche -&gt; </a:t>
+            </a:r>
+            <a:r>
+              <a:rPr lang="en-CA" dirty="0" err="1"/>
+              <a:t>Serveur</a:t>
+            </a:r>
+            <a:r>
+              <a:rPr lang="en-CA" dirty="0"/>
+              <a:t>:</a:t>
+            </a:r>
+          </a:p>
+          <a:p>
+            <a:pPr marL="285750" indent="-285750">
+              <a:buFont typeface="Arial" panose="020B0604020202020204" pitchFamily="34" charset="0"/>
+              <a:buChar char="•"/>
+            </a:pPr>
+            <a:endParaRPr lang="en-CA" dirty="0"/>
+          </a:p>
+          <a:p>
+            <a:endParaRPr lang="en-CA" dirty="0"/>
+          </a:p>
+          <a:p>
+            <a:pPr marL="285750" indent="-285750">
+              <a:buFont typeface="Arial" panose="020B0604020202020204" pitchFamily="34" charset="0"/>
+              <a:buChar char="•"/>
+            </a:pPr>
+            <a:endParaRPr lang="en-CA" dirty="0"/>
+          </a:p>
+        </p:txBody>
+      </p:sp>
+      <p:pic>
+        <p:nvPicPr>
+          <p:cNvPr id="9" name="Picture 8">
+            <a:extLst>
+              <a:ext uri="{FF2B5EF4-FFF2-40B4-BE49-F238E27FC236}">
+                <a16:creationId xmlns:a16="http://schemas.microsoft.com/office/drawing/2014/main" id="{1F7987B6-124D-4E7D-B1AE-AF7488C590D6}"/>
+              </a:ext>
+            </a:extLst>
+          </p:cNvPr>
+          <p:cNvPicPr>
+            <a:picLocks noChangeAspect="1"/>
+          </p:cNvPicPr>
+          <p:nvPr/>
+        </p:nvPicPr>
+        <p:blipFill>
+          <a:blip r:embed="rId2">
+            <a:extLst>
+              <a:ext uri="{28A0092B-C50C-407E-A947-70E740481C1C}">
+                <a14:useLocalDpi xmlns:a14="http://schemas.microsoft.com/office/drawing/2010/main" val="0"/>
+              </a:ext>
+            </a:extLst>
+          </a:blip>
+          <a:stretch>
+            <a:fillRect/>
+          </a:stretch>
+        </p:blipFill>
+        <p:spPr>
+          <a:xfrm>
+            <a:off x="742950" y="3037014"/>
+            <a:ext cx="10706100" cy="1562100"/>
+          </a:xfrm>
+          <a:prstGeom prst="rect">
+            <a:avLst/>
+          </a:prstGeom>
+        </p:spPr>
+      </p:pic>
+      <p:pic>
+        <p:nvPicPr>
+          <p:cNvPr id="11" name="Picture 10">
+            <a:extLst>
+              <a:ext uri="{FF2B5EF4-FFF2-40B4-BE49-F238E27FC236}">
+                <a16:creationId xmlns:a16="http://schemas.microsoft.com/office/drawing/2014/main" id="{637BCD14-BC2A-494D-A73F-A1F55D6C0721}"/>
+              </a:ext>
+            </a:extLst>
+          </p:cNvPr>
+          <p:cNvPicPr>
+            <a:picLocks noChangeAspect="1"/>
+          </p:cNvPicPr>
+          <p:nvPr/>
+        </p:nvPicPr>
+        <p:blipFill>
+          <a:blip r:embed="rId3">
+            <a:extLst>
+              <a:ext uri="{28A0092B-C50C-407E-A947-70E740481C1C}">
+                <a14:useLocalDpi xmlns:a14="http://schemas.microsoft.com/office/drawing/2010/main" val="0"/>
+              </a:ext>
+            </a:extLst>
+          </a:blip>
+          <a:stretch>
+            <a:fillRect/>
+          </a:stretch>
+        </p:blipFill>
+        <p:spPr>
+          <a:xfrm>
+            <a:off x="4552950" y="5194501"/>
+            <a:ext cx="3086100" cy="1562100"/>
+          </a:xfrm>
+          <a:prstGeom prst="rect">
+            <a:avLst/>
+          </a:prstGeom>
+        </p:spPr>
+      </p:pic>
+    </p:spTree>
+    <p:extLst>
+      <p:ext uri="{BB962C8B-B14F-4D97-AF65-F5344CB8AC3E}">
+        <p14:creationId xmlns:p14="http://schemas.microsoft.com/office/powerpoint/2010/main" val="59767548"/>
+      </p:ext>
+    </p:extLst>
+  </p:cSld>
+  <p:clrMapOvr>
+    <a:masterClrMapping/>
+  </p:clrMapOvr>
+</p:sld>
+</file>
+
+<file path=ppt/slides/slide13.xml><?xml version="1.0" encoding="utf-8"?>
+<p:sld xmlns:a="http://schemas.openxmlformats.org/drawingml/2006/main" xmlns:r="http://schemas.openxmlformats.org/officeDocument/2006/relationships" xmlns:p="http://schemas.openxmlformats.org/presentationml/2006/main">
+  <p:cSld>
+    <p:spTree>
+      <p:nvGrpSpPr>
+        <p:cNvPr id="1" name=""/>
+        <p:cNvGrpSpPr/>
+        <p:nvPr/>
+      </p:nvGrpSpPr>
+      <p:grpSpPr>
+        <a:xfrm>
+          <a:off x="0" y="0"/>
+          <a:ext cx="0" cy="0"/>
+          <a:chOff x="0" y="0"/>
+          <a:chExt cx="0" cy="0"/>
+        </a:xfrm>
+      </p:grpSpPr>
+      <p:sp>
+        <p:nvSpPr>
+          <p:cNvPr id="2" name="Title 1">
+            <a:extLst>
+              <a:ext uri="{FF2B5EF4-FFF2-40B4-BE49-F238E27FC236}">
+                <a16:creationId xmlns:a16="http://schemas.microsoft.com/office/drawing/2014/main" id="{4D96D023-FF4C-48F9-8D0D-C84356743869}"/>
+              </a:ext>
+            </a:extLst>
+          </p:cNvPr>
+          <p:cNvSpPr>
+            <a:spLocks noGrp="1"/>
+          </p:cNvSpPr>
+          <p:nvPr>
+            <p:ph type="title"/>
+          </p:nvPr>
+        </p:nvSpPr>
+        <p:spPr/>
+        <p:txBody>
+          <a:bodyPr/>
+          <a:lstStyle/>
+          <a:p>
+            <a:r>
+              <a:rPr lang="en-CA" dirty="0" err="1"/>
+              <a:t>Protocole</a:t>
+            </a:r>
+            <a:endParaRPr lang="en-CA" dirty="0"/>
+          </a:p>
+        </p:txBody>
+      </p:sp>
+      <p:sp>
+        <p:nvSpPr>
+          <p:cNvPr id="3" name="TextBox 2">
+            <a:extLst>
+              <a:ext uri="{FF2B5EF4-FFF2-40B4-BE49-F238E27FC236}">
+                <a16:creationId xmlns:a16="http://schemas.microsoft.com/office/drawing/2014/main" id="{42DA6C5E-FC75-4155-A6A5-19DC3943EF40}"/>
+              </a:ext>
+            </a:extLst>
+          </p:cNvPr>
+          <p:cNvSpPr txBox="1"/>
+          <p:nvPr/>
+        </p:nvSpPr>
+        <p:spPr>
+          <a:xfrm>
+            <a:off x="685800" y="1907931"/>
+            <a:ext cx="11506199" cy="461665"/>
+          </a:xfrm>
+          <a:prstGeom prst="rect">
+            <a:avLst/>
+          </a:prstGeom>
+          <a:noFill/>
+        </p:spPr>
+        <p:txBody>
+          <a:bodyPr wrap="square" rtlCol="0">
+            <a:spAutoFit/>
+          </a:bodyPr>
+          <a:lstStyle/>
+          <a:p>
+            <a:r>
+              <a:rPr lang="en-CA" sz="2400" dirty="0" err="1"/>
+              <a:t>Implémentation</a:t>
+            </a:r>
+            <a:r>
+              <a:rPr lang="en-CA" sz="2400" dirty="0"/>
+              <a:t>:</a:t>
+            </a:r>
+          </a:p>
+        </p:txBody>
+      </p:sp>
+      <p:sp>
+        <p:nvSpPr>
+          <p:cNvPr id="5" name="TextBox 4">
+            <a:extLst>
+              <a:ext uri="{FF2B5EF4-FFF2-40B4-BE49-F238E27FC236}">
+                <a16:creationId xmlns:a16="http://schemas.microsoft.com/office/drawing/2014/main" id="{0F05B460-CFDE-45AB-9244-C2381F57C111}"/>
+              </a:ext>
+            </a:extLst>
+          </p:cNvPr>
+          <p:cNvSpPr txBox="1"/>
+          <p:nvPr/>
+        </p:nvSpPr>
+        <p:spPr>
+          <a:xfrm>
+            <a:off x="808892" y="2635496"/>
+            <a:ext cx="10612316" cy="3416320"/>
+          </a:xfrm>
+          <a:prstGeom prst="rect">
+            <a:avLst/>
+          </a:prstGeom>
+          <a:noFill/>
+        </p:spPr>
+        <p:txBody>
+          <a:bodyPr wrap="square" rtlCol="0">
+            <a:spAutoFit/>
+          </a:bodyPr>
+          <a:lstStyle/>
+          <a:p>
+            <a:pPr marL="285750" indent="-285750">
+              <a:buFont typeface="Arial" panose="020B0604020202020204" pitchFamily="34" charset="0"/>
+              <a:buChar char="•"/>
+            </a:pPr>
+            <a:r>
+              <a:rPr lang="en-CA" dirty="0"/>
+              <a:t>Communication </a:t>
+            </a:r>
+            <a:r>
+              <a:rPr lang="en-CA" dirty="0" err="1"/>
+              <a:t>Moniteur</a:t>
+            </a:r>
+            <a:r>
+              <a:rPr lang="en-CA" dirty="0"/>
+              <a:t> -&gt; </a:t>
+            </a:r>
+            <a:r>
+              <a:rPr lang="en-CA" dirty="0" err="1"/>
+              <a:t>Serveur</a:t>
+            </a:r>
+            <a:r>
+              <a:rPr lang="en-CA" dirty="0"/>
+              <a:t>:</a:t>
+            </a:r>
+          </a:p>
+          <a:p>
+            <a:pPr marL="285750" indent="-285750">
+              <a:buFont typeface="Arial" panose="020B0604020202020204" pitchFamily="34" charset="0"/>
+              <a:buChar char="•"/>
+            </a:pPr>
+            <a:endParaRPr lang="en-CA" dirty="0"/>
+          </a:p>
+          <a:p>
+            <a:pPr marL="285750" indent="-285750">
+              <a:buFont typeface="Arial" panose="020B0604020202020204" pitchFamily="34" charset="0"/>
+              <a:buChar char="•"/>
+            </a:pPr>
+            <a:endParaRPr lang="en-CA" dirty="0"/>
+          </a:p>
+          <a:p>
+            <a:pPr marL="285750" indent="-285750">
+              <a:buFont typeface="Arial" panose="020B0604020202020204" pitchFamily="34" charset="0"/>
+              <a:buChar char="•"/>
+            </a:pPr>
+            <a:endParaRPr lang="en-CA" dirty="0"/>
+          </a:p>
+          <a:p>
+            <a:pPr marL="285750" indent="-285750">
+              <a:buFont typeface="Arial" panose="020B0604020202020204" pitchFamily="34" charset="0"/>
+              <a:buChar char="•"/>
+            </a:pPr>
+            <a:endParaRPr lang="en-CA" dirty="0"/>
+          </a:p>
+          <a:p>
+            <a:pPr marL="285750" indent="-285750">
+              <a:buFont typeface="Arial" panose="020B0604020202020204" pitchFamily="34" charset="0"/>
+              <a:buChar char="•"/>
+            </a:pPr>
+            <a:endParaRPr lang="en-CA" dirty="0"/>
+          </a:p>
+          <a:p>
+            <a:endParaRPr lang="en-CA" dirty="0"/>
+          </a:p>
+          <a:p>
+            <a:pPr marL="285750" indent="-285750">
+              <a:buFont typeface="Arial" panose="020B0604020202020204" pitchFamily="34" charset="0"/>
+              <a:buChar char="•"/>
+            </a:pPr>
+            <a:endParaRPr lang="en-CA" dirty="0"/>
+          </a:p>
+          <a:p>
+            <a:pPr marL="285750" indent="-285750">
+              <a:buFont typeface="Arial" panose="020B0604020202020204" pitchFamily="34" charset="0"/>
+              <a:buChar char="•"/>
+            </a:pPr>
+            <a:r>
+              <a:rPr lang="en-CA" dirty="0"/>
+              <a:t>Communication </a:t>
+            </a:r>
+            <a:r>
+              <a:rPr lang="en-CA" dirty="0" err="1"/>
+              <a:t>Serveur</a:t>
+            </a:r>
+            <a:r>
+              <a:rPr lang="en-CA" dirty="0"/>
+              <a:t> -&gt; </a:t>
+            </a:r>
+            <a:r>
+              <a:rPr lang="en-CA" dirty="0" err="1"/>
+              <a:t>Moniteur</a:t>
+            </a:r>
+            <a:r>
+              <a:rPr lang="en-CA" dirty="0"/>
+              <a:t>:</a:t>
+            </a:r>
+          </a:p>
+          <a:p>
+            <a:pPr marL="285750" indent="-285750">
+              <a:buFont typeface="Arial" panose="020B0604020202020204" pitchFamily="34" charset="0"/>
+              <a:buChar char="•"/>
+            </a:pPr>
+            <a:endParaRPr lang="en-CA" dirty="0"/>
+          </a:p>
+          <a:p>
+            <a:endParaRPr lang="en-CA" dirty="0"/>
+          </a:p>
+          <a:p>
+            <a:pPr marL="285750" indent="-285750">
+              <a:buFont typeface="Arial" panose="020B0604020202020204" pitchFamily="34" charset="0"/>
+              <a:buChar char="•"/>
+            </a:pPr>
+            <a:endParaRPr lang="en-CA" dirty="0"/>
+          </a:p>
+        </p:txBody>
+      </p:sp>
+    </p:spTree>
+    <p:extLst>
+      <p:ext uri="{BB962C8B-B14F-4D97-AF65-F5344CB8AC3E}">
+        <p14:creationId xmlns:p14="http://schemas.microsoft.com/office/powerpoint/2010/main" val="233472135"/>
       </p:ext>
     </p:extLst>
   </p:cSld>
@@ -7819,6 +8861,384 @@
 </file>
 
 <file path=ppt/slides/slide2.xml><?xml version="1.0" encoding="utf-8"?>
+<p:sld xmlns:a="http://schemas.openxmlformats.org/drawingml/2006/main" xmlns:r="http://schemas.openxmlformats.org/officeDocument/2006/relationships" xmlns:p="http://schemas.openxmlformats.org/presentationml/2006/main">
+  <p:cSld>
+    <p:spTree>
+      <p:nvGrpSpPr>
+        <p:cNvPr id="1" name=""/>
+        <p:cNvGrpSpPr/>
+        <p:nvPr/>
+      </p:nvGrpSpPr>
+      <p:grpSpPr>
+        <a:xfrm>
+          <a:off x="0" y="0"/>
+          <a:ext cx="0" cy="0"/>
+          <a:chOff x="0" y="0"/>
+          <a:chExt cx="0" cy="0"/>
+        </a:xfrm>
+      </p:grpSpPr>
+      <p:sp>
+        <p:nvSpPr>
+          <p:cNvPr id="2" name="Title 1">
+            <a:extLst>
+              <a:ext uri="{FF2B5EF4-FFF2-40B4-BE49-F238E27FC236}">
+                <a16:creationId xmlns:a16="http://schemas.microsoft.com/office/drawing/2014/main" id="{532BB36A-66E0-4644-AB8F-8DCB79605DD1}"/>
+              </a:ext>
+            </a:extLst>
+          </p:cNvPr>
+          <p:cNvSpPr>
+            <a:spLocks noGrp="1"/>
+          </p:cNvSpPr>
+          <p:nvPr>
+            <p:ph type="title"/>
+          </p:nvPr>
+        </p:nvSpPr>
+        <p:spPr/>
+        <p:txBody>
+          <a:bodyPr/>
+          <a:lstStyle/>
+          <a:p>
+            <a:r>
+              <a:rPr lang="en-CA" dirty="0"/>
+              <a:t>Architecture </a:t>
+            </a:r>
+            <a:r>
+              <a:rPr lang="en-CA" dirty="0" err="1"/>
+              <a:t>Globale</a:t>
+            </a:r>
+            <a:endParaRPr lang="en-CA" dirty="0"/>
+          </a:p>
+        </p:txBody>
+      </p:sp>
+      <p:pic>
+        <p:nvPicPr>
+          <p:cNvPr id="5" name="Content Placeholder 4">
+            <a:extLst>
+              <a:ext uri="{FF2B5EF4-FFF2-40B4-BE49-F238E27FC236}">
+                <a16:creationId xmlns:a16="http://schemas.microsoft.com/office/drawing/2014/main" id="{660134EC-F451-4D02-B3E6-A1B9A23CE0AA}"/>
+              </a:ext>
+            </a:extLst>
+          </p:cNvPr>
+          <p:cNvPicPr>
+            <a:picLocks noGrp="1" noChangeAspect="1"/>
+          </p:cNvPicPr>
+          <p:nvPr>
+            <p:ph idx="1"/>
+          </p:nvPr>
+        </p:nvPicPr>
+        <p:blipFill>
+          <a:blip r:embed="rId2">
+            <a:extLst>
+              <a:ext uri="{28A0092B-C50C-407E-A947-70E740481C1C}">
+                <a14:useLocalDpi xmlns:a14="http://schemas.microsoft.com/office/drawing/2010/main" val="0"/>
+              </a:ext>
+            </a:extLst>
+          </a:blip>
+          <a:stretch>
+            <a:fillRect/>
+          </a:stretch>
+        </p:blipFill>
+        <p:spPr>
+          <a:xfrm>
+            <a:off x="365943" y="2714625"/>
+            <a:ext cx="11138670" cy="2180895"/>
+          </a:xfrm>
+        </p:spPr>
+      </p:pic>
+    </p:spTree>
+    <p:extLst>
+      <p:ext uri="{BB962C8B-B14F-4D97-AF65-F5344CB8AC3E}">
+        <p14:creationId xmlns:p14="http://schemas.microsoft.com/office/powerpoint/2010/main" val="1477707369"/>
+      </p:ext>
+    </p:extLst>
+  </p:cSld>
+  <p:clrMapOvr>
+    <a:masterClrMapping/>
+  </p:clrMapOvr>
+</p:sld>
+</file>
+
+<file path=ppt/slides/slide3.xml><?xml version="1.0" encoding="utf-8"?>
+<p:sld xmlns:a="http://schemas.openxmlformats.org/drawingml/2006/main" xmlns:r="http://schemas.openxmlformats.org/officeDocument/2006/relationships" xmlns:p="http://schemas.openxmlformats.org/presentationml/2006/main">
+  <p:cSld>
+    <p:spTree>
+      <p:nvGrpSpPr>
+        <p:cNvPr id="1" name=""/>
+        <p:cNvGrpSpPr/>
+        <p:nvPr/>
+      </p:nvGrpSpPr>
+      <p:grpSpPr>
+        <a:xfrm>
+          <a:off x="0" y="0"/>
+          <a:ext cx="0" cy="0"/>
+          <a:chOff x="0" y="0"/>
+          <a:chExt cx="0" cy="0"/>
+        </a:xfrm>
+      </p:grpSpPr>
+      <p:sp>
+        <p:nvSpPr>
+          <p:cNvPr id="2" name="Title 1">
+            <a:extLst>
+              <a:ext uri="{FF2B5EF4-FFF2-40B4-BE49-F238E27FC236}">
+                <a16:creationId xmlns:a16="http://schemas.microsoft.com/office/drawing/2014/main" id="{532BB36A-66E0-4644-AB8F-8DCB79605DD1}"/>
+              </a:ext>
+            </a:extLst>
+          </p:cNvPr>
+          <p:cNvSpPr>
+            <a:spLocks noGrp="1"/>
+          </p:cNvSpPr>
+          <p:nvPr>
+            <p:ph type="title"/>
+          </p:nvPr>
+        </p:nvSpPr>
+        <p:spPr/>
+        <p:txBody>
+          <a:bodyPr/>
+          <a:lstStyle/>
+          <a:p>
+            <a:r>
+              <a:rPr lang="en-CA" dirty="0"/>
+              <a:t>Architecture </a:t>
+            </a:r>
+            <a:r>
+              <a:rPr lang="en-CA" dirty="0" err="1"/>
+              <a:t>Globale</a:t>
+            </a:r>
+            <a:r>
+              <a:rPr lang="en-CA" dirty="0"/>
+              <a:t> - </a:t>
+            </a:r>
+            <a:r>
+              <a:rPr lang="en-CA" dirty="0" err="1"/>
+              <a:t>Enjeux</a:t>
+            </a:r>
+            <a:endParaRPr lang="en-CA" dirty="0"/>
+          </a:p>
+        </p:txBody>
+      </p:sp>
+      <p:sp>
+        <p:nvSpPr>
+          <p:cNvPr id="4" name="Content Placeholder 3">
+            <a:extLst>
+              <a:ext uri="{FF2B5EF4-FFF2-40B4-BE49-F238E27FC236}">
+                <a16:creationId xmlns:a16="http://schemas.microsoft.com/office/drawing/2014/main" id="{561C8BA9-4D5B-4077-A438-4CBFA09C3FD0}"/>
+              </a:ext>
+            </a:extLst>
+          </p:cNvPr>
+          <p:cNvSpPr>
+            <a:spLocks noGrp="1"/>
+          </p:cNvSpPr>
+          <p:nvPr>
+            <p:ph idx="1"/>
+          </p:nvPr>
+        </p:nvSpPr>
+        <p:spPr/>
+        <p:txBody>
+          <a:bodyPr>
+            <a:normAutofit/>
+          </a:bodyPr>
+          <a:lstStyle/>
+          <a:p>
+            <a:r>
+              <a:rPr lang="en-CA" u="sng" dirty="0" err="1"/>
+              <a:t>Ordinateur</a:t>
+            </a:r>
+            <a:r>
+              <a:rPr lang="en-CA" u="sng" dirty="0"/>
+              <a:t>:</a:t>
+            </a:r>
+          </a:p>
+          <a:p>
+            <a:pPr lvl="1"/>
+            <a:r>
+              <a:rPr lang="en-CA" dirty="0"/>
+              <a:t>Coordination des </a:t>
+            </a:r>
+            <a:r>
+              <a:rPr lang="en-CA" dirty="0" err="1"/>
+              <a:t>demandes</a:t>
+            </a:r>
+            <a:endParaRPr lang="en-CA" dirty="0"/>
+          </a:p>
+          <a:p>
+            <a:pPr lvl="1"/>
+            <a:r>
+              <a:rPr lang="en-CA" dirty="0"/>
+              <a:t>Gestion de </a:t>
+            </a:r>
+            <a:r>
+              <a:rPr lang="en-CA" dirty="0" err="1"/>
+              <a:t>l’historique</a:t>
+            </a:r>
+            <a:r>
+              <a:rPr lang="en-CA" dirty="0"/>
+              <a:t> des </a:t>
+            </a:r>
+            <a:r>
+              <a:rPr lang="en-CA" dirty="0" err="1"/>
+              <a:t>données</a:t>
+            </a:r>
+            <a:endParaRPr lang="en-CA" dirty="0"/>
+          </a:p>
+          <a:p>
+            <a:r>
+              <a:rPr lang="en-CA" u="sng" dirty="0" err="1"/>
+              <a:t>Serveur</a:t>
+            </a:r>
+            <a:r>
+              <a:rPr lang="en-CA" u="sng" dirty="0"/>
+              <a:t>:</a:t>
+            </a:r>
+          </a:p>
+          <a:p>
+            <a:pPr lvl="1"/>
+            <a:r>
+              <a:rPr lang="en-CA" dirty="0"/>
+              <a:t>Assurer le </a:t>
+            </a:r>
+            <a:r>
+              <a:rPr lang="en-CA" dirty="0" err="1"/>
+              <a:t>transfert</a:t>
+            </a:r>
+            <a:r>
+              <a:rPr lang="en-CA" dirty="0"/>
+              <a:t> de </a:t>
+            </a:r>
+            <a:r>
+              <a:rPr lang="en-CA" dirty="0" err="1"/>
+              <a:t>l’information</a:t>
+            </a:r>
+            <a:r>
+              <a:rPr lang="en-CA" dirty="0"/>
+              <a:t> </a:t>
+            </a:r>
+            <a:r>
+              <a:rPr lang="en-CA" dirty="0" err="1"/>
+              <a:t>vers</a:t>
+            </a:r>
+            <a:r>
+              <a:rPr lang="en-CA" dirty="0"/>
+              <a:t> les </a:t>
+            </a:r>
+            <a:r>
+              <a:rPr lang="en-CA" dirty="0" err="1"/>
+              <a:t>ruches</a:t>
+            </a:r>
+            <a:r>
+              <a:rPr lang="en-CA" dirty="0"/>
+              <a:t> (UART </a:t>
+            </a:r>
+            <a:r>
+              <a:rPr lang="en-CA" dirty="0" err="1"/>
+              <a:t>vers</a:t>
+            </a:r>
+            <a:r>
+              <a:rPr lang="en-CA" dirty="0"/>
+              <a:t> sans-fil)</a:t>
+            </a:r>
+          </a:p>
+          <a:p>
+            <a:pPr lvl="1"/>
+            <a:r>
+              <a:rPr lang="en-CA" dirty="0"/>
+              <a:t>Coordination des communications </a:t>
+            </a:r>
+            <a:r>
+              <a:rPr lang="en-CA" dirty="0" err="1"/>
+              <a:t>vers</a:t>
+            </a:r>
+            <a:r>
+              <a:rPr lang="en-CA" dirty="0"/>
+              <a:t> </a:t>
+            </a:r>
+            <a:r>
+              <a:rPr lang="en-CA" dirty="0" err="1"/>
+              <a:t>plusieurs</a:t>
+            </a:r>
+            <a:r>
+              <a:rPr lang="en-CA" dirty="0"/>
+              <a:t> </a:t>
+            </a:r>
+            <a:r>
+              <a:rPr lang="en-CA" dirty="0" err="1"/>
+              <a:t>ruches</a:t>
+            </a:r>
+            <a:endParaRPr lang="en-CA" dirty="0"/>
+          </a:p>
+          <a:p>
+            <a:r>
+              <a:rPr lang="en-CA" u="sng" dirty="0"/>
+              <a:t>Ruche:</a:t>
+            </a:r>
+          </a:p>
+          <a:p>
+            <a:pPr lvl="1"/>
+            <a:r>
+              <a:rPr lang="en-CA" dirty="0"/>
+              <a:t>Assurer </a:t>
+            </a:r>
+            <a:r>
+              <a:rPr lang="en-CA" dirty="0" err="1"/>
+              <a:t>réponse</a:t>
+            </a:r>
+            <a:r>
+              <a:rPr lang="en-CA" dirty="0"/>
+              <a:t> à jour des </a:t>
+            </a:r>
+            <a:r>
+              <a:rPr lang="en-CA" dirty="0" err="1"/>
+              <a:t>capteurs</a:t>
+            </a:r>
+            <a:r>
+              <a:rPr lang="en-CA" dirty="0"/>
+              <a:t> et </a:t>
+            </a:r>
+            <a:r>
+              <a:rPr lang="en-CA" dirty="0" err="1"/>
+              <a:t>actionneurs</a:t>
+            </a:r>
+            <a:endParaRPr lang="en-CA" dirty="0"/>
+          </a:p>
+          <a:p>
+            <a:pPr lvl="1"/>
+            <a:r>
+              <a:rPr lang="en-CA" dirty="0"/>
+              <a:t>Confirmer </a:t>
+            </a:r>
+            <a:r>
+              <a:rPr lang="en-CA" dirty="0" err="1"/>
+              <a:t>l’éxécution</a:t>
+            </a:r>
+            <a:r>
+              <a:rPr lang="en-CA" dirty="0"/>
+              <a:t> des </a:t>
+            </a:r>
+            <a:r>
+              <a:rPr lang="en-CA" dirty="0" err="1"/>
+              <a:t>commandes</a:t>
+            </a:r>
+            <a:endParaRPr lang="en-CA" dirty="0"/>
+          </a:p>
+          <a:p>
+            <a:pPr lvl="1"/>
+            <a:endParaRPr lang="en-CA" dirty="0"/>
+          </a:p>
+        </p:txBody>
+      </p:sp>
+    </p:spTree>
+    <p:extLst>
+      <p:ext uri="{BB962C8B-B14F-4D97-AF65-F5344CB8AC3E}">
+        <p14:creationId xmlns:p14="http://schemas.microsoft.com/office/powerpoint/2010/main" val="1402609215"/>
+      </p:ext>
+    </p:extLst>
+  </p:cSld>
+  <p:clrMapOvr>
+    <a:masterClrMapping/>
+  </p:clrMapOvr>
+</p:sld>
+</file>
+
+<file path=ppt/slides/slide4.xml><?xml version="1.0" encoding="utf-8"?>
 <p:sld xmlns:a="http://schemas.openxmlformats.org/drawingml/2006/main" xmlns:r="http://schemas.openxmlformats.org/officeDocument/2006/relationships" xmlns:p="http://schemas.openxmlformats.org/presentationml/2006/main">
   <p:cSld>
     <p:spTree>
@@ -8289,259 +9709,7 @@
     </p:spTree>
     <p:extLst>
       <p:ext uri="{BB962C8B-B14F-4D97-AF65-F5344CB8AC3E}">
-        <p14:creationId xmlns:p14="http://schemas.microsoft.com/office/powerpoint/2010/main" val="720972098"/>
-      </p:ext>
-    </p:extLst>
-  </p:cSld>
-  <p:clrMapOvr>
-    <a:masterClrMapping/>
-  </p:clrMapOvr>
-</p:sld>
-</file>
-
-<file path=ppt/slides/slide3.xml><?xml version="1.0" encoding="utf-8"?>
-<p:sld xmlns:a="http://schemas.openxmlformats.org/drawingml/2006/main" xmlns:r="http://schemas.openxmlformats.org/officeDocument/2006/relationships" xmlns:p="http://schemas.openxmlformats.org/presentationml/2006/main">
-  <p:cSld>
-    <p:spTree>
-      <p:nvGrpSpPr>
-        <p:cNvPr id="1" name=""/>
-        <p:cNvGrpSpPr/>
-        <p:nvPr/>
-      </p:nvGrpSpPr>
-      <p:grpSpPr>
-        <a:xfrm>
-          <a:off x="0" y="0"/>
-          <a:ext cx="0" cy="0"/>
-          <a:chOff x="0" y="0"/>
-          <a:chExt cx="0" cy="0"/>
-        </a:xfrm>
-      </p:grpSpPr>
-      <p:sp>
-        <p:nvSpPr>
-          <p:cNvPr id="2" name="Title 1">
-            <a:extLst>
-              <a:ext uri="{FF2B5EF4-FFF2-40B4-BE49-F238E27FC236}">
-                <a16:creationId xmlns:a16="http://schemas.microsoft.com/office/drawing/2014/main" id="{E08F6E75-2A45-4CD7-A89B-35B31D4D478A}"/>
-              </a:ext>
-            </a:extLst>
-          </p:cNvPr>
-          <p:cNvSpPr>
-            <a:spLocks noGrp="1"/>
-          </p:cNvSpPr>
-          <p:nvPr>
-            <p:ph type="title"/>
-          </p:nvPr>
-        </p:nvSpPr>
-        <p:spPr/>
-        <p:txBody>
-          <a:bodyPr/>
-          <a:lstStyle/>
-          <a:p>
-            <a:r>
-              <a:rPr lang="en-CA" dirty="0" err="1"/>
-              <a:t>Antennes</a:t>
-            </a:r>
-            <a:r>
-              <a:rPr lang="en-CA" dirty="0"/>
-              <a:t> - </a:t>
-            </a:r>
-            <a:r>
-              <a:rPr lang="en-CA" dirty="0" err="1"/>
-              <a:t>Planaires</a:t>
-            </a:r>
-            <a:endParaRPr lang="en-CA" dirty="0"/>
-          </a:p>
-        </p:txBody>
-      </p:sp>
-      <p:sp>
-        <p:nvSpPr>
-          <p:cNvPr id="3" name="Content Placeholder 2">
-            <a:extLst>
-              <a:ext uri="{FF2B5EF4-FFF2-40B4-BE49-F238E27FC236}">
-                <a16:creationId xmlns:a16="http://schemas.microsoft.com/office/drawing/2014/main" id="{B415ED72-9909-4FA1-907A-DAF78FD34380}"/>
-              </a:ext>
-            </a:extLst>
-          </p:cNvPr>
-          <p:cNvSpPr>
-            <a:spLocks noGrp="1"/>
-          </p:cNvSpPr>
-          <p:nvPr>
-            <p:ph idx="1"/>
-          </p:nvPr>
-        </p:nvSpPr>
-        <p:spPr/>
-        <p:txBody>
-          <a:bodyPr/>
-          <a:lstStyle/>
-          <a:p>
-            <a:r>
-              <a:rPr lang="en-CA" dirty="0"/>
-              <a:t>APP 2:</a:t>
-            </a:r>
-          </a:p>
-          <a:p>
-            <a:pPr lvl="1"/>
-            <a:r>
-              <a:rPr lang="en-CA" dirty="0" err="1"/>
-              <a:t>Calculs</a:t>
-            </a:r>
-            <a:r>
-              <a:rPr lang="en-CA" dirty="0"/>
-              <a:t> des dimensions </a:t>
-            </a:r>
-            <a:r>
-              <a:rPr lang="en-CA" dirty="0" err="1"/>
-              <a:t>d’une</a:t>
-            </a:r>
-            <a:r>
-              <a:rPr lang="en-CA" dirty="0"/>
-              <a:t> </a:t>
-            </a:r>
-            <a:r>
-              <a:rPr lang="en-CA" dirty="0" err="1"/>
-              <a:t>antenne</a:t>
-            </a:r>
-            <a:r>
-              <a:rPr lang="en-CA" dirty="0"/>
-              <a:t> </a:t>
-            </a:r>
-            <a:r>
-              <a:rPr lang="en-CA" dirty="0" err="1"/>
-              <a:t>planaire</a:t>
-            </a:r>
-            <a:endParaRPr lang="en-CA" dirty="0"/>
-          </a:p>
-          <a:p>
-            <a:pPr lvl="1"/>
-            <a:r>
-              <a:rPr lang="en-CA" dirty="0"/>
-              <a:t>Utilisation </a:t>
-            </a:r>
-            <a:r>
-              <a:rPr lang="en-CA" dirty="0" err="1"/>
-              <a:t>d’ADS</a:t>
-            </a:r>
-            <a:endParaRPr lang="en-CA" dirty="0"/>
-          </a:p>
-          <a:p>
-            <a:r>
-              <a:rPr lang="en-CA" dirty="0"/>
-              <a:t>APP 3:</a:t>
-            </a:r>
-          </a:p>
-          <a:p>
-            <a:pPr lvl="1"/>
-            <a:r>
-              <a:rPr lang="en-CA" dirty="0" err="1"/>
-              <a:t>Lignes</a:t>
-            </a:r>
-            <a:r>
-              <a:rPr lang="en-CA" dirty="0"/>
-              <a:t> de transmission</a:t>
-            </a:r>
-          </a:p>
-          <a:p>
-            <a:pPr lvl="1"/>
-            <a:r>
-              <a:rPr lang="en-CA" dirty="0"/>
-              <a:t>Adaptation </a:t>
-            </a:r>
-            <a:r>
-              <a:rPr lang="en-CA" dirty="0" err="1"/>
-              <a:t>d’impédance</a:t>
-            </a:r>
-            <a:endParaRPr lang="en-CA" dirty="0"/>
-          </a:p>
-        </p:txBody>
-      </p:sp>
-    </p:spTree>
-    <p:extLst>
-      <p:ext uri="{BB962C8B-B14F-4D97-AF65-F5344CB8AC3E}">
-        <p14:creationId xmlns:p14="http://schemas.microsoft.com/office/powerpoint/2010/main" val="1190730998"/>
-      </p:ext>
-    </p:extLst>
-  </p:cSld>
-  <p:clrMapOvr>
-    <a:masterClrMapping/>
-  </p:clrMapOvr>
-</p:sld>
-</file>
-
-<file path=ppt/slides/slide4.xml><?xml version="1.0" encoding="utf-8"?>
-<p:sld xmlns:a="http://schemas.openxmlformats.org/drawingml/2006/main" xmlns:r="http://schemas.openxmlformats.org/officeDocument/2006/relationships" xmlns:p="http://schemas.openxmlformats.org/presentationml/2006/main">
-  <p:cSld>
-    <p:spTree>
-      <p:nvGrpSpPr>
-        <p:cNvPr id="1" name=""/>
-        <p:cNvGrpSpPr/>
-        <p:nvPr/>
-      </p:nvGrpSpPr>
-      <p:grpSpPr>
-        <a:xfrm>
-          <a:off x="0" y="0"/>
-          <a:ext cx="0" cy="0"/>
-          <a:chOff x="0" y="0"/>
-          <a:chExt cx="0" cy="0"/>
-        </a:xfrm>
-      </p:grpSpPr>
-      <p:sp>
-        <p:nvSpPr>
-          <p:cNvPr id="2" name="Title 1">
-            <a:extLst>
-              <a:ext uri="{FF2B5EF4-FFF2-40B4-BE49-F238E27FC236}">
-                <a16:creationId xmlns:a16="http://schemas.microsoft.com/office/drawing/2014/main" id="{532BB36A-66E0-4644-AB8F-8DCB79605DD1}"/>
-              </a:ext>
-            </a:extLst>
-          </p:cNvPr>
-          <p:cNvSpPr>
-            <a:spLocks noGrp="1"/>
-          </p:cNvSpPr>
-          <p:nvPr>
-            <p:ph type="title"/>
-          </p:nvPr>
-        </p:nvSpPr>
-        <p:spPr/>
-        <p:txBody>
-          <a:bodyPr/>
-          <a:lstStyle/>
-          <a:p>
-            <a:r>
-              <a:rPr lang="en-CA" dirty="0" err="1"/>
-              <a:t>Antenne</a:t>
-            </a:r>
-            <a:endParaRPr lang="en-CA" dirty="0"/>
-          </a:p>
-        </p:txBody>
-      </p:sp>
-      <p:sp>
-        <p:nvSpPr>
-          <p:cNvPr id="3" name="Content Placeholder 2">
-            <a:extLst>
-              <a:ext uri="{FF2B5EF4-FFF2-40B4-BE49-F238E27FC236}">
-                <a16:creationId xmlns:a16="http://schemas.microsoft.com/office/drawing/2014/main" id="{6E8CB243-474A-4A7D-87A0-18D4236EA148}"/>
-              </a:ext>
-            </a:extLst>
-          </p:cNvPr>
-          <p:cNvSpPr>
-            <a:spLocks noGrp="1"/>
-          </p:cNvSpPr>
-          <p:nvPr>
-            <p:ph idx="1"/>
-          </p:nvPr>
-        </p:nvSpPr>
-        <p:spPr/>
-        <p:txBody>
-          <a:bodyPr/>
-          <a:lstStyle/>
-          <a:p>
-            <a:endParaRPr lang="en-CA"/>
-          </a:p>
-        </p:txBody>
-      </p:sp>
-    </p:spTree>
-    <p:extLst>
-      <p:ext uri="{BB962C8B-B14F-4D97-AF65-F5344CB8AC3E}">
-        <p14:creationId xmlns:p14="http://schemas.microsoft.com/office/powerpoint/2010/main" val="1461233970"/>
+        <p14:creationId xmlns:p14="http://schemas.microsoft.com/office/powerpoint/2010/main" val="2543157408"/>
       </p:ext>
     </p:extLst>
   </p:cSld>
@@ -8573,7 +9741,7 @@
           <p:cNvPr id="2" name="Title 1">
             <a:extLst>
               <a:ext uri="{FF2B5EF4-FFF2-40B4-BE49-F238E27FC236}">
-                <a16:creationId xmlns:a16="http://schemas.microsoft.com/office/drawing/2014/main" id="{181B7A1F-D195-4CB6-AF4A-94DB2BC49CEB}"/>
+                <a16:creationId xmlns:a16="http://schemas.microsoft.com/office/drawing/2014/main" id="{E08F6E75-2A45-4CD7-A89B-35B31D4D478A}"/>
               </a:ext>
             </a:extLst>
           </p:cNvPr>
@@ -8591,12 +9759,17 @@
           <a:p>
             <a:r>
               <a:rPr lang="en-CA" dirty="0" err="1"/>
-              <a:t>Chaîne</a:t>
+              <a:t>Antennes</a:t>
             </a:r>
             <a:r>
               <a:rPr lang="en-CA" dirty="0"/>
-              <a:t> RF</a:t>
-            </a:r>
+              <a:t> - </a:t>
+            </a:r>
+            <a:r>
+              <a:rPr lang="en-CA" dirty="0" err="1"/>
+              <a:t>Planaires</a:t>
+            </a:r>
+            <a:endParaRPr lang="en-CA" dirty="0"/>
           </a:p>
         </p:txBody>
       </p:sp>
@@ -8605,7 +9778,7 @@
           <p:cNvPr id="3" name="Content Placeholder 2">
             <a:extLst>
               <a:ext uri="{FF2B5EF4-FFF2-40B4-BE49-F238E27FC236}">
-                <a16:creationId xmlns:a16="http://schemas.microsoft.com/office/drawing/2014/main" id="{86306AC8-2B44-4495-982C-29052A09B7D8}"/>
+                <a16:creationId xmlns:a16="http://schemas.microsoft.com/office/drawing/2014/main" id="{B415ED72-9909-4FA1-907A-DAF78FD34380}"/>
               </a:ext>
             </a:extLst>
           </p:cNvPr>
@@ -8621,14 +9794,90 @@
           <a:bodyPr/>
           <a:lstStyle/>
           <a:p>
-            <a:endParaRPr lang="en-CA"/>
+            <a:r>
+              <a:rPr lang="en-CA" dirty="0"/>
+              <a:t>APP 2:</a:t>
+            </a:r>
+          </a:p>
+          <a:p>
+            <a:pPr lvl="1"/>
+            <a:r>
+              <a:rPr lang="en-CA" dirty="0" err="1"/>
+              <a:t>Calculs</a:t>
+            </a:r>
+            <a:r>
+              <a:rPr lang="en-CA" dirty="0"/>
+              <a:t> des dimensions </a:t>
+            </a:r>
+            <a:r>
+              <a:rPr lang="en-CA" dirty="0" err="1"/>
+              <a:t>d’une</a:t>
+            </a:r>
+            <a:r>
+              <a:rPr lang="en-CA" dirty="0"/>
+              <a:t> </a:t>
+            </a:r>
+            <a:r>
+              <a:rPr lang="en-CA" dirty="0" err="1"/>
+              <a:t>antenne</a:t>
+            </a:r>
+            <a:r>
+              <a:rPr lang="en-CA" dirty="0"/>
+              <a:t> </a:t>
+            </a:r>
+            <a:r>
+              <a:rPr lang="en-CA" dirty="0" err="1"/>
+              <a:t>planaire</a:t>
+            </a:r>
+            <a:endParaRPr lang="en-CA" dirty="0"/>
+          </a:p>
+          <a:p>
+            <a:pPr lvl="1"/>
+            <a:r>
+              <a:rPr lang="en-CA" dirty="0"/>
+              <a:t>Utilisation </a:t>
+            </a:r>
+            <a:r>
+              <a:rPr lang="en-CA" dirty="0" err="1"/>
+              <a:t>d’ADS</a:t>
+            </a:r>
+            <a:endParaRPr lang="en-CA" dirty="0"/>
+          </a:p>
+          <a:p>
+            <a:r>
+              <a:rPr lang="en-CA" dirty="0"/>
+              <a:t>APP 3:</a:t>
+            </a:r>
+          </a:p>
+          <a:p>
+            <a:pPr lvl="1"/>
+            <a:r>
+              <a:rPr lang="en-CA" dirty="0" err="1"/>
+              <a:t>Lignes</a:t>
+            </a:r>
+            <a:r>
+              <a:rPr lang="en-CA" dirty="0"/>
+              <a:t> de transmission</a:t>
+            </a:r>
+          </a:p>
+          <a:p>
+            <a:pPr lvl="1"/>
+            <a:r>
+              <a:rPr lang="en-CA" dirty="0"/>
+              <a:t>Adaptation </a:t>
+            </a:r>
+            <a:r>
+              <a:rPr lang="en-CA" dirty="0" err="1"/>
+              <a:t>d’impédance</a:t>
+            </a:r>
+            <a:endParaRPr lang="en-CA" dirty="0"/>
           </a:p>
         </p:txBody>
       </p:sp>
     </p:spTree>
     <p:extLst>
       <p:ext uri="{BB962C8B-B14F-4D97-AF65-F5344CB8AC3E}">
-        <p14:creationId xmlns:p14="http://schemas.microsoft.com/office/powerpoint/2010/main" val="4155299707"/>
+        <p14:creationId xmlns:p14="http://schemas.microsoft.com/office/powerpoint/2010/main" val="1190730998"/>
       </p:ext>
     </p:extLst>
   </p:cSld>
@@ -8660,7 +9909,7 @@
           <p:cNvPr id="2" name="Title 1">
             <a:extLst>
               <a:ext uri="{FF2B5EF4-FFF2-40B4-BE49-F238E27FC236}">
-                <a16:creationId xmlns:a16="http://schemas.microsoft.com/office/drawing/2014/main" id="{CB092671-ACDE-4E64-B487-381F2D0C6C2D}"/>
+                <a16:creationId xmlns:a16="http://schemas.microsoft.com/office/drawing/2014/main" id="{532BB36A-66E0-4644-AB8F-8DCB79605DD1}"/>
               </a:ext>
             </a:extLst>
           </p:cNvPr>
@@ -8677,12 +9926,8 @@
           <a:lstStyle/>
           <a:p>
             <a:r>
-              <a:rPr lang="en-CA" dirty="0"/>
-              <a:t>Modem </a:t>
-            </a:r>
-            <a:r>
               <a:rPr lang="en-CA" dirty="0" err="1"/>
-              <a:t>Numérique</a:t>
+              <a:t>Antenne</a:t>
             </a:r>
             <a:endParaRPr lang="en-CA" dirty="0"/>
           </a:p>
@@ -8693,7 +9938,7 @@
           <p:cNvPr id="3" name="Content Placeholder 2">
             <a:extLst>
               <a:ext uri="{FF2B5EF4-FFF2-40B4-BE49-F238E27FC236}">
-                <a16:creationId xmlns:a16="http://schemas.microsoft.com/office/drawing/2014/main" id="{C98FDD01-A6F3-46B0-A7A5-740763964552}"/>
+                <a16:creationId xmlns:a16="http://schemas.microsoft.com/office/drawing/2014/main" id="{6E8CB243-474A-4A7D-87A0-18D4236EA148}"/>
               </a:ext>
             </a:extLst>
           </p:cNvPr>
@@ -8716,7 +9961,7 @@
     </p:spTree>
     <p:extLst>
       <p:ext uri="{BB962C8B-B14F-4D97-AF65-F5344CB8AC3E}">
-        <p14:creationId xmlns:p14="http://schemas.microsoft.com/office/powerpoint/2010/main" val="4294789758"/>
+        <p14:creationId xmlns:p14="http://schemas.microsoft.com/office/powerpoint/2010/main" val="1461233970"/>
       </p:ext>
     </p:extLst>
   </p:cSld>
@@ -8748,7 +9993,7 @@
           <p:cNvPr id="2" name="Title 1">
             <a:extLst>
               <a:ext uri="{FF2B5EF4-FFF2-40B4-BE49-F238E27FC236}">
-                <a16:creationId xmlns:a16="http://schemas.microsoft.com/office/drawing/2014/main" id="{4D96D023-FF4C-48F9-8D0D-C84356743869}"/>
+                <a16:creationId xmlns:a16="http://schemas.microsoft.com/office/drawing/2014/main" id="{181B7A1F-D195-4CB6-AF4A-94DB2BC49CEB}"/>
               </a:ext>
             </a:extLst>
           </p:cNvPr>
@@ -8766,194 +10011,44 @@
           <a:p>
             <a:r>
               <a:rPr lang="en-CA" dirty="0" err="1"/>
-              <a:t>Protocole</a:t>
-            </a:r>
-            <a:endParaRPr lang="en-CA" dirty="0"/>
-          </a:p>
-        </p:txBody>
-      </p:sp>
-      <p:sp>
-        <p:nvSpPr>
-          <p:cNvPr id="3" name="TextBox 2">
+              <a:t>Chaîne</a:t>
+            </a:r>
+            <a:r>
+              <a:rPr lang="en-CA" dirty="0"/>
+              <a:t> RF</a:t>
+            </a:r>
+          </a:p>
+        </p:txBody>
+      </p:sp>
+      <p:sp>
+        <p:nvSpPr>
+          <p:cNvPr id="3" name="Content Placeholder 2">
             <a:extLst>
               <a:ext uri="{FF2B5EF4-FFF2-40B4-BE49-F238E27FC236}">
-                <a16:creationId xmlns:a16="http://schemas.microsoft.com/office/drawing/2014/main" id="{42DA6C5E-FC75-4155-A6A5-19DC3943EF40}"/>
+                <a16:creationId xmlns:a16="http://schemas.microsoft.com/office/drawing/2014/main" id="{86306AC8-2B44-4495-982C-29052A09B7D8}"/>
               </a:ext>
             </a:extLst>
           </p:cNvPr>
-          <p:cNvSpPr txBox="1"/>
-          <p:nvPr/>
-        </p:nvSpPr>
-        <p:spPr>
-          <a:xfrm>
-            <a:off x="685800" y="1907931"/>
-            <a:ext cx="11506199" cy="461665"/>
-          </a:xfrm>
-          <a:prstGeom prst="rect">
-            <a:avLst/>
-          </a:prstGeom>
-          <a:noFill/>
-        </p:spPr>
-        <p:txBody>
-          <a:bodyPr wrap="square" rtlCol="0">
-            <a:spAutoFit/>
-          </a:bodyPr>
+          <p:cNvSpPr>
+            <a:spLocks noGrp="1"/>
+          </p:cNvSpPr>
+          <p:nvPr>
+            <p:ph idx="1"/>
+          </p:nvPr>
+        </p:nvSpPr>
+        <p:spPr/>
+        <p:txBody>
+          <a:bodyPr/>
           <a:lstStyle/>
           <a:p>
-            <a:r>
-              <a:rPr lang="en-CA" sz="2400" dirty="0" err="1"/>
-              <a:t>Défis</a:t>
-            </a:r>
-            <a:r>
-              <a:rPr lang="en-CA" sz="2400" dirty="0"/>
-              <a:t> à </a:t>
-            </a:r>
-            <a:r>
-              <a:rPr lang="en-CA" sz="2400" dirty="0" err="1"/>
-              <a:t>relever</a:t>
-            </a:r>
-            <a:r>
-              <a:rPr lang="en-CA" sz="2400" dirty="0"/>
-              <a:t>:</a:t>
-            </a:r>
-          </a:p>
-        </p:txBody>
-      </p:sp>
-      <p:sp>
-        <p:nvSpPr>
-          <p:cNvPr id="4" name="TextBox 3">
-            <a:extLst>
-              <a:ext uri="{FF2B5EF4-FFF2-40B4-BE49-F238E27FC236}">
-                <a16:creationId xmlns:a16="http://schemas.microsoft.com/office/drawing/2014/main" id="{5FEF8A14-9BCD-43CA-BA7F-8EB49C06208A}"/>
-              </a:ext>
-            </a:extLst>
-          </p:cNvPr>
-          <p:cNvSpPr txBox="1"/>
-          <p:nvPr/>
-        </p:nvSpPr>
-        <p:spPr>
-          <a:xfrm>
-            <a:off x="808892" y="2716823"/>
-            <a:ext cx="10612316" cy="1754326"/>
-          </a:xfrm>
-          <a:prstGeom prst="rect">
-            <a:avLst/>
-          </a:prstGeom>
-          <a:noFill/>
-        </p:spPr>
-        <p:txBody>
-          <a:bodyPr wrap="square" rtlCol="0">
-            <a:spAutoFit/>
-          </a:bodyPr>
-          <a:lstStyle/>
-          <a:p>
-            <a:pPr marL="285750" indent="-285750">
-              <a:buFont typeface="Arial" panose="020B0604020202020204" pitchFamily="34" charset="0"/>
-              <a:buChar char="•"/>
-            </a:pPr>
-            <a:r>
-              <a:rPr lang="en-CA" dirty="0"/>
-              <a:t>Distinction des </a:t>
-            </a:r>
-            <a:r>
-              <a:rPr lang="en-CA" dirty="0" err="1"/>
-              <a:t>signaux</a:t>
-            </a:r>
-            <a:r>
-              <a:rPr lang="en-CA" dirty="0"/>
-              <a:t> pour </a:t>
-            </a:r>
-            <a:r>
-              <a:rPr lang="en-CA" dirty="0" err="1"/>
-              <a:t>chaque</a:t>
-            </a:r>
-            <a:r>
-              <a:rPr lang="en-CA" dirty="0"/>
-              <a:t> </a:t>
-            </a:r>
-            <a:r>
-              <a:rPr lang="en-CA" dirty="0" err="1"/>
-              <a:t>ruche</a:t>
-            </a:r>
-            <a:endParaRPr lang="en-CA" dirty="0"/>
-          </a:p>
-          <a:p>
-            <a:pPr marL="285750" indent="-285750">
-              <a:buFont typeface="Arial" panose="020B0604020202020204" pitchFamily="34" charset="0"/>
-              <a:buChar char="•"/>
-            </a:pPr>
-            <a:endParaRPr lang="en-CA" dirty="0"/>
-          </a:p>
-          <a:p>
-            <a:pPr marL="285750" indent="-285750">
-              <a:buFont typeface="Arial" panose="020B0604020202020204" pitchFamily="34" charset="0"/>
-              <a:buChar char="•"/>
-            </a:pPr>
-            <a:r>
-              <a:rPr lang="en-CA" dirty="0"/>
-              <a:t>Reconnaissance des </a:t>
-            </a:r>
-            <a:r>
-              <a:rPr lang="en-CA" dirty="0" err="1"/>
-              <a:t>différentes</a:t>
-            </a:r>
-            <a:r>
-              <a:rPr lang="en-CA" dirty="0"/>
-              <a:t> </a:t>
-            </a:r>
-            <a:r>
-              <a:rPr lang="en-CA" dirty="0" err="1"/>
-              <a:t>commandes</a:t>
-            </a:r>
-            <a:endParaRPr lang="en-CA" dirty="0"/>
-          </a:p>
-          <a:p>
-            <a:pPr marL="285750" indent="-285750">
-              <a:buFont typeface="Arial" panose="020B0604020202020204" pitchFamily="34" charset="0"/>
-              <a:buChar char="•"/>
-            </a:pPr>
-            <a:endParaRPr lang="en-CA" dirty="0"/>
-          </a:p>
-          <a:p>
-            <a:pPr marL="285750" indent="-285750">
-              <a:buFont typeface="Arial" panose="020B0604020202020204" pitchFamily="34" charset="0"/>
-              <a:buChar char="•"/>
-            </a:pPr>
-            <a:r>
-              <a:rPr lang="en-CA" dirty="0" err="1"/>
-              <a:t>Vérification</a:t>
-            </a:r>
-            <a:r>
-              <a:rPr lang="en-CA" dirty="0"/>
-              <a:t> de </a:t>
-            </a:r>
-            <a:r>
-              <a:rPr lang="en-CA" dirty="0" err="1"/>
-              <a:t>l’état</a:t>
-            </a:r>
-            <a:r>
-              <a:rPr lang="en-CA" dirty="0"/>
-              <a:t> des </a:t>
-            </a:r>
-            <a:r>
-              <a:rPr lang="en-CA" dirty="0" err="1"/>
-              <a:t>ruches</a:t>
-            </a:r>
-            <a:endParaRPr lang="en-CA" dirty="0"/>
-          </a:p>
-          <a:p>
-            <a:pPr marL="285750" indent="-285750">
-              <a:buFont typeface="Arial" panose="020B0604020202020204" pitchFamily="34" charset="0"/>
-              <a:buChar char="•"/>
-            </a:pPr>
-            <a:endParaRPr lang="en-CA" dirty="0"/>
+            <a:endParaRPr lang="en-CA"/>
           </a:p>
         </p:txBody>
       </p:sp>
     </p:spTree>
     <p:extLst>
       <p:ext uri="{BB962C8B-B14F-4D97-AF65-F5344CB8AC3E}">
-        <p14:creationId xmlns:p14="http://schemas.microsoft.com/office/powerpoint/2010/main" val="1560542592"/>
+        <p14:creationId xmlns:p14="http://schemas.microsoft.com/office/powerpoint/2010/main" val="4155299707"/>
       </p:ext>
     </p:extLst>
   </p:cSld>
@@ -8985,7 +10080,7 @@
           <p:cNvPr id="2" name="Title 1">
             <a:extLst>
               <a:ext uri="{FF2B5EF4-FFF2-40B4-BE49-F238E27FC236}">
-                <a16:creationId xmlns:a16="http://schemas.microsoft.com/office/drawing/2014/main" id="{4D96D023-FF4C-48F9-8D0D-C84356743869}"/>
+                <a16:creationId xmlns:a16="http://schemas.microsoft.com/office/drawing/2014/main" id="{CB092671-ACDE-4E64-B487-381F2D0C6C2D}"/>
               </a:ext>
             </a:extLst>
           </p:cNvPr>
@@ -9002,8 +10097,12 @@
           <a:lstStyle/>
           <a:p>
             <a:r>
+              <a:rPr lang="en-CA" dirty="0"/>
+              <a:t>Modem </a:t>
+            </a:r>
+            <a:r>
               <a:rPr lang="en-CA" dirty="0" err="1"/>
-              <a:t>Protocole</a:t>
+              <a:t>Numérique</a:t>
             </a:r>
             <a:endParaRPr lang="en-CA" dirty="0"/>
           </a:p>
@@ -9011,293 +10110,33 @@
       </p:sp>
       <p:sp>
         <p:nvSpPr>
-          <p:cNvPr id="3" name="TextBox 2">
+          <p:cNvPr id="3" name="Content Placeholder 2">
             <a:extLst>
               <a:ext uri="{FF2B5EF4-FFF2-40B4-BE49-F238E27FC236}">
-                <a16:creationId xmlns:a16="http://schemas.microsoft.com/office/drawing/2014/main" id="{42DA6C5E-FC75-4155-A6A5-19DC3943EF40}"/>
+                <a16:creationId xmlns:a16="http://schemas.microsoft.com/office/drawing/2014/main" id="{C98FDD01-A6F3-46B0-A7A5-740763964552}"/>
               </a:ext>
             </a:extLst>
           </p:cNvPr>
-          <p:cNvSpPr txBox="1"/>
-          <p:nvPr/>
-        </p:nvSpPr>
-        <p:spPr>
-          <a:xfrm>
-            <a:off x="685800" y="1907931"/>
-            <a:ext cx="11506199" cy="461665"/>
-          </a:xfrm>
-          <a:prstGeom prst="rect">
-            <a:avLst/>
-          </a:prstGeom>
-          <a:noFill/>
-        </p:spPr>
-        <p:txBody>
-          <a:bodyPr wrap="square" rtlCol="0">
-            <a:spAutoFit/>
-          </a:bodyPr>
+          <p:cNvSpPr>
+            <a:spLocks noGrp="1"/>
+          </p:cNvSpPr>
+          <p:nvPr>
+            <p:ph idx="1"/>
+          </p:nvPr>
+        </p:nvSpPr>
+        <p:spPr/>
+        <p:txBody>
+          <a:bodyPr/>
           <a:lstStyle/>
           <a:p>
-            <a:r>
-              <a:rPr lang="en-CA" sz="2400" dirty="0"/>
-              <a:t>Solutions:</a:t>
-            </a:r>
-          </a:p>
-        </p:txBody>
-      </p:sp>
-      <p:sp>
-        <p:nvSpPr>
-          <p:cNvPr id="5" name="TextBox 4">
-            <a:extLst>
-              <a:ext uri="{FF2B5EF4-FFF2-40B4-BE49-F238E27FC236}">
-                <a16:creationId xmlns:a16="http://schemas.microsoft.com/office/drawing/2014/main" id="{0F05B460-CFDE-45AB-9244-C2381F57C111}"/>
-              </a:ext>
-            </a:extLst>
-          </p:cNvPr>
-          <p:cNvSpPr txBox="1"/>
-          <p:nvPr/>
-        </p:nvSpPr>
-        <p:spPr>
-          <a:xfrm>
-            <a:off x="808892" y="2716823"/>
-            <a:ext cx="10612316" cy="2585323"/>
-          </a:xfrm>
-          <a:prstGeom prst="rect">
-            <a:avLst/>
-          </a:prstGeom>
-          <a:noFill/>
-        </p:spPr>
-        <p:txBody>
-          <a:bodyPr wrap="square" rtlCol="0">
-            <a:spAutoFit/>
-          </a:bodyPr>
-          <a:lstStyle/>
-          <a:p>
-            <a:pPr marL="285750" indent="-285750">
-              <a:buFont typeface="Arial" panose="020B0604020202020204" pitchFamily="34" charset="0"/>
-              <a:buChar char="•"/>
-            </a:pPr>
-            <a:r>
-              <a:rPr lang="en-CA" dirty="0" err="1"/>
-              <a:t>Ajout</a:t>
-            </a:r>
-            <a:r>
-              <a:rPr lang="en-CA" dirty="0"/>
-              <a:t> d’un </a:t>
-            </a:r>
-            <a:r>
-              <a:rPr lang="en-CA" dirty="0" err="1"/>
-              <a:t>numéro</a:t>
-            </a:r>
-            <a:r>
-              <a:rPr lang="en-CA" dirty="0"/>
-              <a:t> </a:t>
-            </a:r>
-            <a:r>
-              <a:rPr lang="en-CA" dirty="0" err="1"/>
-              <a:t>d’identification</a:t>
-            </a:r>
-            <a:r>
-              <a:rPr lang="en-CA" dirty="0"/>
-              <a:t> pour </a:t>
-            </a:r>
-            <a:r>
-              <a:rPr lang="en-CA" dirty="0" err="1"/>
-              <a:t>chaque</a:t>
-            </a:r>
-            <a:r>
-              <a:rPr lang="en-CA" dirty="0"/>
-              <a:t> </a:t>
-            </a:r>
-            <a:r>
-              <a:rPr lang="en-CA" dirty="0" err="1"/>
-              <a:t>ruche</a:t>
-            </a:r>
-            <a:r>
-              <a:rPr lang="en-CA" dirty="0"/>
-              <a:t>. </a:t>
-            </a:r>
-            <a:r>
-              <a:rPr lang="en-CA" dirty="0" err="1"/>
-              <a:t>Chaque</a:t>
-            </a:r>
-            <a:r>
-              <a:rPr lang="en-CA" dirty="0"/>
-              <a:t> communication entre le </a:t>
-            </a:r>
-            <a:r>
-              <a:rPr lang="en-CA" dirty="0" err="1"/>
-              <a:t>serveur</a:t>
-            </a:r>
-            <a:r>
-              <a:rPr lang="en-CA" dirty="0"/>
-              <a:t> et </a:t>
-            </a:r>
-            <a:r>
-              <a:rPr lang="en-CA" dirty="0" err="1"/>
-              <a:t>une</a:t>
-            </a:r>
-            <a:r>
-              <a:rPr lang="en-CA" dirty="0"/>
-              <a:t> </a:t>
-            </a:r>
-            <a:r>
-              <a:rPr lang="en-CA" dirty="0" err="1"/>
-              <a:t>ruche</a:t>
-            </a:r>
-            <a:r>
-              <a:rPr lang="en-CA" dirty="0"/>
-              <a:t> </a:t>
-            </a:r>
-            <a:r>
-              <a:rPr lang="en-CA" dirty="0" err="1"/>
-              <a:t>contient</a:t>
-            </a:r>
-            <a:r>
-              <a:rPr lang="en-CA" dirty="0"/>
-              <a:t> le </a:t>
-            </a:r>
-            <a:r>
-              <a:rPr lang="en-CA" dirty="0" err="1"/>
-              <a:t>numéro</a:t>
-            </a:r>
-            <a:r>
-              <a:rPr lang="en-CA" dirty="0"/>
-              <a:t> pour </a:t>
-            </a:r>
-            <a:r>
-              <a:rPr lang="en-CA" dirty="0" err="1"/>
-              <a:t>différencier</a:t>
-            </a:r>
-            <a:r>
-              <a:rPr lang="en-CA" dirty="0"/>
-              <a:t>.</a:t>
-            </a:r>
-          </a:p>
-          <a:p>
-            <a:pPr marL="285750" indent="-285750">
-              <a:buFont typeface="Arial" panose="020B0604020202020204" pitchFamily="34" charset="0"/>
-              <a:buChar char="•"/>
-            </a:pPr>
-            <a:endParaRPr lang="en-CA" dirty="0"/>
-          </a:p>
-          <a:p>
-            <a:pPr marL="285750" indent="-285750">
-              <a:buFont typeface="Arial" panose="020B0604020202020204" pitchFamily="34" charset="0"/>
-              <a:buChar char="•"/>
-            </a:pPr>
-            <a:r>
-              <a:rPr lang="en-CA" dirty="0"/>
-              <a:t>Assignation d’un </a:t>
-            </a:r>
-            <a:r>
-              <a:rPr lang="en-CA" dirty="0" err="1"/>
-              <a:t>caractère</a:t>
-            </a:r>
-            <a:r>
-              <a:rPr lang="en-CA" dirty="0"/>
-              <a:t> pour </a:t>
-            </a:r>
-            <a:r>
-              <a:rPr lang="en-CA" dirty="0" err="1"/>
-              <a:t>chaque</a:t>
-            </a:r>
-            <a:r>
-              <a:rPr lang="en-CA" dirty="0"/>
-              <a:t> </a:t>
-            </a:r>
-            <a:r>
-              <a:rPr lang="en-CA" dirty="0" err="1"/>
-              <a:t>commande</a:t>
-            </a:r>
-            <a:r>
-              <a:rPr lang="en-CA" dirty="0"/>
-              <a:t>.</a:t>
-            </a:r>
-          </a:p>
-          <a:p>
-            <a:pPr marL="285750" indent="-285750">
-              <a:buFont typeface="Arial" panose="020B0604020202020204" pitchFamily="34" charset="0"/>
-              <a:buChar char="•"/>
-            </a:pPr>
-            <a:endParaRPr lang="en-CA" dirty="0"/>
-          </a:p>
-          <a:p>
-            <a:pPr marL="285750" indent="-285750">
-              <a:buFont typeface="Arial" panose="020B0604020202020204" pitchFamily="34" charset="0"/>
-              <a:buChar char="•"/>
-            </a:pPr>
-            <a:r>
-              <a:rPr lang="en-CA" dirty="0" err="1"/>
-              <a:t>Rétroaction</a:t>
-            </a:r>
-            <a:r>
-              <a:rPr lang="en-CA" dirty="0"/>
-              <a:t> des </a:t>
-            </a:r>
-            <a:r>
-              <a:rPr lang="en-CA" dirty="0" err="1"/>
-              <a:t>ruches</a:t>
-            </a:r>
-            <a:r>
-              <a:rPr lang="en-CA" dirty="0"/>
-              <a:t> </a:t>
-            </a:r>
-            <a:r>
-              <a:rPr lang="en-CA" dirty="0" err="1"/>
-              <a:t>lorsqu’une</a:t>
-            </a:r>
-            <a:r>
-              <a:rPr lang="en-CA" dirty="0"/>
-              <a:t> </a:t>
-            </a:r>
-            <a:r>
-              <a:rPr lang="en-CA" dirty="0" err="1"/>
-              <a:t>commande</a:t>
-            </a:r>
-            <a:r>
-              <a:rPr lang="en-CA" dirty="0"/>
-              <a:t> </a:t>
-            </a:r>
-            <a:r>
-              <a:rPr lang="en-CA" dirty="0" err="1"/>
-              <a:t>est</a:t>
-            </a:r>
-            <a:r>
-              <a:rPr lang="en-CA" dirty="0"/>
-              <a:t> </a:t>
-            </a:r>
-            <a:r>
-              <a:rPr lang="en-CA" dirty="0" err="1"/>
-              <a:t>envoyé</a:t>
-            </a:r>
-            <a:r>
-              <a:rPr lang="en-CA" dirty="0"/>
-              <a:t>.</a:t>
-            </a:r>
-          </a:p>
-          <a:p>
-            <a:pPr marL="285750" indent="-285750">
-              <a:buFont typeface="Arial" panose="020B0604020202020204" pitchFamily="34" charset="0"/>
-              <a:buChar char="•"/>
-            </a:pPr>
-            <a:endParaRPr lang="en-CA" dirty="0"/>
-          </a:p>
-          <a:p>
-            <a:endParaRPr lang="en-CA" dirty="0"/>
-          </a:p>
-          <a:p>
-            <a:pPr marL="285750" indent="-285750">
-              <a:buFont typeface="Arial" panose="020B0604020202020204" pitchFamily="34" charset="0"/>
-              <a:buChar char="•"/>
-            </a:pPr>
-            <a:endParaRPr lang="en-CA" dirty="0"/>
+            <a:endParaRPr lang="en-CA"/>
           </a:p>
         </p:txBody>
       </p:sp>
     </p:spTree>
     <p:extLst>
       <p:ext uri="{BB962C8B-B14F-4D97-AF65-F5344CB8AC3E}">
-        <p14:creationId xmlns:p14="http://schemas.microsoft.com/office/powerpoint/2010/main" val="1050450600"/>
+        <p14:creationId xmlns:p14="http://schemas.microsoft.com/office/powerpoint/2010/main" val="4294789758"/>
       </p:ext>
     </p:extLst>
   </p:cSld>
@@ -9329,7 +10168,7 @@
           <p:cNvPr id="2" name="Title 1">
             <a:extLst>
               <a:ext uri="{FF2B5EF4-FFF2-40B4-BE49-F238E27FC236}">
-                <a16:creationId xmlns:a16="http://schemas.microsoft.com/office/drawing/2014/main" id="{4D96D023-FF4C-48F9-8D0D-C84356743869}"/>
+                <a16:creationId xmlns:a16="http://schemas.microsoft.com/office/drawing/2014/main" id="{E08F6E75-2A45-4CD7-A89B-35B31D4D478A}"/>
               </a:ext>
             </a:extLst>
           </p:cNvPr>
@@ -9345,256 +10184,39 @@
           <a:bodyPr/>
           <a:lstStyle/>
           <a:p>
-            <a:r>
-              <a:rPr lang="en-CA" dirty="0" err="1"/>
-              <a:t>Protocole</a:t>
-            </a:r>
-            <a:endParaRPr lang="en-CA" dirty="0"/>
-          </a:p>
-        </p:txBody>
-      </p:sp>
-      <p:sp>
-        <p:nvSpPr>
-          <p:cNvPr id="3" name="TextBox 2">
+            <a:endParaRPr lang="en-CA"/>
+          </a:p>
+        </p:txBody>
+      </p:sp>
+      <p:sp>
+        <p:nvSpPr>
+          <p:cNvPr id="3" name="Content Placeholder 2">
             <a:extLst>
               <a:ext uri="{FF2B5EF4-FFF2-40B4-BE49-F238E27FC236}">
-                <a16:creationId xmlns:a16="http://schemas.microsoft.com/office/drawing/2014/main" id="{42DA6C5E-FC75-4155-A6A5-19DC3943EF40}"/>
+                <a16:creationId xmlns:a16="http://schemas.microsoft.com/office/drawing/2014/main" id="{B415ED72-9909-4FA1-907A-DAF78FD34380}"/>
               </a:ext>
             </a:extLst>
           </p:cNvPr>
-          <p:cNvSpPr txBox="1"/>
-          <p:nvPr/>
-        </p:nvSpPr>
-        <p:spPr>
-          <a:xfrm>
-            <a:off x="685800" y="1907931"/>
-            <a:ext cx="11506199" cy="461665"/>
-          </a:xfrm>
-          <a:prstGeom prst="rect">
-            <a:avLst/>
-          </a:prstGeom>
-          <a:noFill/>
-        </p:spPr>
-        <p:txBody>
-          <a:bodyPr wrap="square" rtlCol="0">
-            <a:spAutoFit/>
-          </a:bodyPr>
+          <p:cNvSpPr>
+            <a:spLocks noGrp="1"/>
+          </p:cNvSpPr>
+          <p:nvPr>
+            <p:ph idx="1"/>
+          </p:nvPr>
+        </p:nvSpPr>
+        <p:spPr/>
+        <p:txBody>
+          <a:bodyPr/>
           <a:lstStyle/>
           <a:p>
-            <a:r>
-              <a:rPr lang="en-CA" sz="2400" dirty="0" err="1"/>
-              <a:t>Implémentation</a:t>
-            </a:r>
-            <a:r>
-              <a:rPr lang="en-CA" sz="2400" dirty="0"/>
-              <a:t>:</a:t>
-            </a:r>
-          </a:p>
-        </p:txBody>
-      </p:sp>
-      <p:sp>
-        <p:nvSpPr>
-          <p:cNvPr id="5" name="TextBox 4">
-            <a:extLst>
-              <a:ext uri="{FF2B5EF4-FFF2-40B4-BE49-F238E27FC236}">
-                <a16:creationId xmlns:a16="http://schemas.microsoft.com/office/drawing/2014/main" id="{0F05B460-CFDE-45AB-9244-C2381F57C111}"/>
-              </a:ext>
-            </a:extLst>
-          </p:cNvPr>
-          <p:cNvSpPr txBox="1"/>
-          <p:nvPr/>
-        </p:nvSpPr>
-        <p:spPr>
-          <a:xfrm>
-            <a:off x="808892" y="2635496"/>
-            <a:ext cx="10612316" cy="3416320"/>
-          </a:xfrm>
-          <a:prstGeom prst="rect">
-            <a:avLst/>
-          </a:prstGeom>
-          <a:noFill/>
-        </p:spPr>
-        <p:txBody>
-          <a:bodyPr wrap="square" rtlCol="0">
-            <a:spAutoFit/>
-          </a:bodyPr>
-          <a:lstStyle/>
-          <a:p>
-            <a:pPr marL="285750" indent="-285750">
-              <a:buFont typeface="Arial" panose="020B0604020202020204" pitchFamily="34" charset="0"/>
-              <a:buChar char="•"/>
-            </a:pPr>
-            <a:r>
-              <a:rPr lang="en-CA" dirty="0"/>
-              <a:t>Communication </a:t>
-            </a:r>
-            <a:r>
-              <a:rPr lang="en-CA" dirty="0" err="1"/>
-              <a:t>Serveur</a:t>
-            </a:r>
-            <a:r>
-              <a:rPr lang="en-CA" dirty="0"/>
-              <a:t> -&gt; Ruche:</a:t>
-            </a:r>
-          </a:p>
-          <a:p>
-            <a:pPr marL="285750" indent="-285750">
-              <a:buFont typeface="Arial" panose="020B0604020202020204" pitchFamily="34" charset="0"/>
-              <a:buChar char="•"/>
-            </a:pPr>
-            <a:endParaRPr lang="en-CA" dirty="0"/>
-          </a:p>
-          <a:p>
-            <a:pPr marL="285750" indent="-285750">
-              <a:buFont typeface="Arial" panose="020B0604020202020204" pitchFamily="34" charset="0"/>
-              <a:buChar char="•"/>
-            </a:pPr>
-            <a:endParaRPr lang="en-CA" dirty="0"/>
-          </a:p>
-          <a:p>
-            <a:pPr marL="285750" indent="-285750">
-              <a:buFont typeface="Arial" panose="020B0604020202020204" pitchFamily="34" charset="0"/>
-              <a:buChar char="•"/>
-            </a:pPr>
-            <a:endParaRPr lang="en-CA" dirty="0"/>
-          </a:p>
-          <a:p>
-            <a:pPr marL="285750" indent="-285750">
-              <a:buFont typeface="Arial" panose="020B0604020202020204" pitchFamily="34" charset="0"/>
-              <a:buChar char="•"/>
-            </a:pPr>
-            <a:endParaRPr lang="en-CA" dirty="0"/>
-          </a:p>
-          <a:p>
-            <a:pPr marL="285750" indent="-285750">
-              <a:buFont typeface="Arial" panose="020B0604020202020204" pitchFamily="34" charset="0"/>
-              <a:buChar char="•"/>
-            </a:pPr>
-            <a:endParaRPr lang="en-CA" dirty="0"/>
-          </a:p>
-          <a:p>
-            <a:endParaRPr lang="en-CA" dirty="0"/>
-          </a:p>
-          <a:p>
-            <a:pPr marL="285750" indent="-285750">
-              <a:buFont typeface="Arial" panose="020B0604020202020204" pitchFamily="34" charset="0"/>
-              <a:buChar char="•"/>
-            </a:pPr>
-            <a:endParaRPr lang="en-CA" dirty="0"/>
-          </a:p>
-          <a:p>
-            <a:pPr marL="285750" indent="-285750">
-              <a:buFont typeface="Arial" panose="020B0604020202020204" pitchFamily="34" charset="0"/>
-              <a:buChar char="•"/>
-            </a:pPr>
-            <a:r>
-              <a:rPr lang="en-CA" dirty="0"/>
-              <a:t>Communication Ruche -&gt; </a:t>
-            </a:r>
-            <a:r>
-              <a:rPr lang="en-CA" dirty="0" err="1"/>
-              <a:t>Serveur</a:t>
-            </a:r>
-            <a:r>
-              <a:rPr lang="en-CA" dirty="0"/>
-              <a:t>:</a:t>
-            </a:r>
-          </a:p>
-          <a:p>
-            <a:pPr marL="285750" indent="-285750">
-              <a:buFont typeface="Arial" panose="020B0604020202020204" pitchFamily="34" charset="0"/>
-              <a:buChar char="•"/>
-            </a:pPr>
-            <a:endParaRPr lang="en-CA" dirty="0"/>
-          </a:p>
-          <a:p>
-            <a:endParaRPr lang="en-CA" dirty="0"/>
-          </a:p>
-          <a:p>
-            <a:pPr marL="285750" indent="-285750">
-              <a:buFont typeface="Arial" panose="020B0604020202020204" pitchFamily="34" charset="0"/>
-              <a:buChar char="•"/>
-            </a:pPr>
-            <a:endParaRPr lang="en-CA" dirty="0"/>
-          </a:p>
-        </p:txBody>
-      </p:sp>
-      <p:pic>
-        <p:nvPicPr>
-          <p:cNvPr id="9" name="Picture 8">
-            <a:extLst>
-              <a:ext uri="{FF2B5EF4-FFF2-40B4-BE49-F238E27FC236}">
-                <a16:creationId xmlns:a16="http://schemas.microsoft.com/office/drawing/2014/main" id="{1F7987B6-124D-4E7D-B1AE-AF7488C590D6}"/>
-              </a:ext>
-            </a:extLst>
-          </p:cNvPr>
-          <p:cNvPicPr>
-            <a:picLocks noChangeAspect="1"/>
-          </p:cNvPicPr>
-          <p:nvPr/>
-        </p:nvPicPr>
-        <p:blipFill>
-          <a:blip r:embed="rId2">
-            <a:extLst>
-              <a:ext uri="{28A0092B-C50C-407E-A947-70E740481C1C}">
-                <a14:useLocalDpi xmlns:a14="http://schemas.microsoft.com/office/drawing/2010/main" val="0"/>
-              </a:ext>
-            </a:extLst>
-          </a:blip>
-          <a:stretch>
-            <a:fillRect/>
-          </a:stretch>
-        </p:blipFill>
-        <p:spPr>
-          <a:xfrm>
-            <a:off x="742950" y="3037014"/>
-            <a:ext cx="10706100" cy="1562100"/>
-          </a:xfrm>
-          <a:prstGeom prst="rect">
-            <a:avLst/>
-          </a:prstGeom>
-        </p:spPr>
-      </p:pic>
-      <p:pic>
-        <p:nvPicPr>
-          <p:cNvPr id="11" name="Picture 10">
-            <a:extLst>
-              <a:ext uri="{FF2B5EF4-FFF2-40B4-BE49-F238E27FC236}">
-                <a16:creationId xmlns:a16="http://schemas.microsoft.com/office/drawing/2014/main" id="{637BCD14-BC2A-494D-A73F-A1F55D6C0721}"/>
-              </a:ext>
-            </a:extLst>
-          </p:cNvPr>
-          <p:cNvPicPr>
-            <a:picLocks noChangeAspect="1"/>
-          </p:cNvPicPr>
-          <p:nvPr/>
-        </p:nvPicPr>
-        <p:blipFill>
-          <a:blip r:embed="rId3">
-            <a:extLst>
-              <a:ext uri="{28A0092B-C50C-407E-A947-70E740481C1C}">
-                <a14:useLocalDpi xmlns:a14="http://schemas.microsoft.com/office/drawing/2010/main" val="0"/>
-              </a:ext>
-            </a:extLst>
-          </a:blip>
-          <a:stretch>
-            <a:fillRect/>
-          </a:stretch>
-        </p:blipFill>
-        <p:spPr>
-          <a:xfrm>
-            <a:off x="4552950" y="5194501"/>
-            <a:ext cx="3086100" cy="1562100"/>
-          </a:xfrm>
-          <a:prstGeom prst="rect">
-            <a:avLst/>
-          </a:prstGeom>
-        </p:spPr>
-      </p:pic>
+            <a:endParaRPr lang="en-CA"/>
+          </a:p>
+        </p:txBody>
+      </p:sp>
     </p:spTree>
     <p:extLst>
       <p:ext uri="{BB962C8B-B14F-4D97-AF65-F5344CB8AC3E}">
-        <p14:creationId xmlns:p14="http://schemas.microsoft.com/office/powerpoint/2010/main" val="59767548"/>
+        <p14:creationId xmlns:p14="http://schemas.microsoft.com/office/powerpoint/2010/main" val="816399630"/>
       </p:ext>
     </p:extLst>
   </p:cSld>

</xml_diff>

<commit_message>
Modification de la partie Protocole et Architecture Globale et ajout de l'antenne 3D
</commit_message>
<xml_diff>
--- a/Présentation Finale – P3.pptx
+++ b/Présentation Finale – P3.pptx
@@ -9,15 +9,15 @@
     <p:sldId id="268" r:id="rId3"/>
     <p:sldId id="269" r:id="rId4"/>
     <p:sldId id="267" r:id="rId5"/>
-    <p:sldId id="266" r:id="rId6"/>
-    <p:sldId id="257" r:id="rId7"/>
-    <p:sldId id="258" r:id="rId8"/>
-    <p:sldId id="259" r:id="rId9"/>
-    <p:sldId id="261" r:id="rId10"/>
-    <p:sldId id="260" r:id="rId11"/>
-    <p:sldId id="263" r:id="rId12"/>
+    <p:sldId id="270" r:id="rId6"/>
+    <p:sldId id="266" r:id="rId7"/>
+    <p:sldId id="257" r:id="rId8"/>
+    <p:sldId id="258" r:id="rId9"/>
+    <p:sldId id="259" r:id="rId10"/>
+    <p:sldId id="261" r:id="rId11"/>
+    <p:sldId id="271" r:id="rId12"/>
     <p:sldId id="264" r:id="rId13"/>
-    <p:sldId id="265" r:id="rId14"/>
+    <p:sldId id="272" r:id="rId14"/>
   </p:sldIdLst>
   <p:sldSz cx="12192000" cy="6858000"/>
   <p:notesSz cx="6858000" cy="9144000"/>
@@ -7763,7 +7763,7 @@
           <p:cNvPr id="2" name="Title 1">
             <a:extLst>
               <a:ext uri="{FF2B5EF4-FFF2-40B4-BE49-F238E27FC236}">
-                <a16:creationId xmlns:a16="http://schemas.microsoft.com/office/drawing/2014/main" id="{4D96D023-FF4C-48F9-8D0D-C84356743869}"/>
+                <a16:creationId xmlns:a16="http://schemas.microsoft.com/office/drawing/2014/main" id="{E08F6E75-2A45-4CD7-A89B-35B31D4D478A}"/>
               </a:ext>
             </a:extLst>
           </p:cNvPr>
@@ -7783,90 +7783,40 @@
               <a:rPr lang="en-CA" dirty="0" err="1"/>
               <a:t>Protocole</a:t>
             </a:r>
+            <a:r>
+              <a:rPr lang="en-CA" dirty="0"/>
+              <a:t> - </a:t>
+            </a:r>
+            <a:r>
+              <a:rPr lang="en-CA" dirty="0" err="1"/>
+              <a:t>Défis</a:t>
+            </a:r>
             <a:endParaRPr lang="en-CA" dirty="0"/>
           </a:p>
         </p:txBody>
       </p:sp>
       <p:sp>
         <p:nvSpPr>
-          <p:cNvPr id="3" name="TextBox 2">
+          <p:cNvPr id="3" name="Content Placeholder 2">
             <a:extLst>
               <a:ext uri="{FF2B5EF4-FFF2-40B4-BE49-F238E27FC236}">
-                <a16:creationId xmlns:a16="http://schemas.microsoft.com/office/drawing/2014/main" id="{42DA6C5E-FC75-4155-A6A5-19DC3943EF40}"/>
+                <a16:creationId xmlns:a16="http://schemas.microsoft.com/office/drawing/2014/main" id="{B415ED72-9909-4FA1-907A-DAF78FD34380}"/>
               </a:ext>
             </a:extLst>
           </p:cNvPr>
-          <p:cNvSpPr txBox="1"/>
-          <p:nvPr/>
-        </p:nvSpPr>
-        <p:spPr>
-          <a:xfrm>
-            <a:off x="685800" y="1907931"/>
-            <a:ext cx="11506199" cy="461665"/>
-          </a:xfrm>
-          <a:prstGeom prst="rect">
-            <a:avLst/>
-          </a:prstGeom>
-          <a:noFill/>
-        </p:spPr>
-        <p:txBody>
-          <a:bodyPr wrap="square" rtlCol="0">
-            <a:spAutoFit/>
-          </a:bodyPr>
+          <p:cNvSpPr>
+            <a:spLocks noGrp="1"/>
+          </p:cNvSpPr>
+          <p:nvPr>
+            <p:ph idx="1"/>
+          </p:nvPr>
+        </p:nvSpPr>
+        <p:spPr/>
+        <p:txBody>
+          <a:bodyPr/>
           <a:lstStyle/>
           <a:p>
             <a:r>
-              <a:rPr lang="en-CA" sz="2400" dirty="0" err="1"/>
-              <a:t>Défis</a:t>
-            </a:r>
-            <a:r>
-              <a:rPr lang="en-CA" sz="2400" dirty="0"/>
-              <a:t> à </a:t>
-            </a:r>
-            <a:r>
-              <a:rPr lang="en-CA" sz="2400" dirty="0" err="1"/>
-              <a:t>relever</a:t>
-            </a:r>
-            <a:r>
-              <a:rPr lang="en-CA" sz="2400" dirty="0"/>
-              <a:t>:</a:t>
-            </a:r>
-          </a:p>
-        </p:txBody>
-      </p:sp>
-      <p:sp>
-        <p:nvSpPr>
-          <p:cNvPr id="4" name="TextBox 3">
-            <a:extLst>
-              <a:ext uri="{FF2B5EF4-FFF2-40B4-BE49-F238E27FC236}">
-                <a16:creationId xmlns:a16="http://schemas.microsoft.com/office/drawing/2014/main" id="{5FEF8A14-9BCD-43CA-BA7F-8EB49C06208A}"/>
-              </a:ext>
-            </a:extLst>
-          </p:cNvPr>
-          <p:cNvSpPr txBox="1"/>
-          <p:nvPr/>
-        </p:nvSpPr>
-        <p:spPr>
-          <a:xfrm>
-            <a:off x="808892" y="2716823"/>
-            <a:ext cx="10612316" cy="1754326"/>
-          </a:xfrm>
-          <a:prstGeom prst="rect">
-            <a:avLst/>
-          </a:prstGeom>
-          <a:noFill/>
-        </p:spPr>
-        <p:txBody>
-          <a:bodyPr wrap="square" rtlCol="0">
-            <a:spAutoFit/>
-          </a:bodyPr>
-          <a:lstStyle/>
-          <a:p>
-            <a:pPr marL="285750" indent="-285750">
-              <a:buFont typeface="Arial" panose="020B0604020202020204" pitchFamily="34" charset="0"/>
-              <a:buChar char="•"/>
-            </a:pPr>
-            <a:r>
               <a:rPr lang="en-CA" dirty="0"/>
               <a:t>Distinction des </a:t>
             </a:r>
@@ -7893,20 +7843,12 @@
             <a:endParaRPr lang="en-CA" dirty="0"/>
           </a:p>
           <a:p>
-            <a:pPr marL="285750" indent="-285750">
-              <a:buFont typeface="Arial" panose="020B0604020202020204" pitchFamily="34" charset="0"/>
-              <a:buChar char="•"/>
-            </a:pPr>
             <a:endParaRPr lang="en-CA" dirty="0"/>
           </a:p>
           <a:p>
-            <a:pPr marL="285750" indent="-285750">
-              <a:buFont typeface="Arial" panose="020B0604020202020204" pitchFamily="34" charset="0"/>
-              <a:buChar char="•"/>
-            </a:pPr>
-            <a:r>
-              <a:rPr lang="en-CA" dirty="0"/>
-              <a:t>Reconnaissance des </a:t>
+            <a:r>
+              <a:rPr lang="en-CA" dirty="0"/>
+              <a:t> Reconnaissance des </a:t>
             </a:r>
             <a:r>
               <a:rPr lang="en-CA" dirty="0" err="1"/>
@@ -7923,17 +7865,9 @@
             <a:endParaRPr lang="en-CA" dirty="0"/>
           </a:p>
           <a:p>
-            <a:pPr marL="285750" indent="-285750">
-              <a:buFont typeface="Arial" panose="020B0604020202020204" pitchFamily="34" charset="0"/>
-              <a:buChar char="•"/>
-            </a:pPr>
             <a:endParaRPr lang="en-CA" dirty="0"/>
           </a:p>
           <a:p>
-            <a:pPr marL="285750" indent="-285750">
-              <a:buFont typeface="Arial" panose="020B0604020202020204" pitchFamily="34" charset="0"/>
-              <a:buChar char="•"/>
-            </a:pPr>
             <a:r>
               <a:rPr lang="en-CA" dirty="0" err="1"/>
               <a:t>Vérification</a:t>
@@ -7957,10 +7891,6 @@
             <a:endParaRPr lang="en-CA" dirty="0"/>
           </a:p>
           <a:p>
-            <a:pPr marL="285750" indent="-285750">
-              <a:buFont typeface="Arial" panose="020B0604020202020204" pitchFamily="34" charset="0"/>
-              <a:buChar char="•"/>
-            </a:pPr>
             <a:endParaRPr lang="en-CA" dirty="0"/>
           </a:p>
         </p:txBody>
@@ -7968,7 +7898,7 @@
     </p:spTree>
     <p:extLst>
       <p:ext uri="{BB962C8B-B14F-4D97-AF65-F5344CB8AC3E}">
-        <p14:creationId xmlns:p14="http://schemas.microsoft.com/office/powerpoint/2010/main" val="1560542592"/>
+        <p14:creationId xmlns:p14="http://schemas.microsoft.com/office/powerpoint/2010/main" val="816399630"/>
       </p:ext>
     </p:extLst>
   </p:cSld>
@@ -8000,7 +7930,7 @@
           <p:cNvPr id="2" name="Title 1">
             <a:extLst>
               <a:ext uri="{FF2B5EF4-FFF2-40B4-BE49-F238E27FC236}">
-                <a16:creationId xmlns:a16="http://schemas.microsoft.com/office/drawing/2014/main" id="{4D96D023-FF4C-48F9-8D0D-C84356743869}"/>
+                <a16:creationId xmlns:a16="http://schemas.microsoft.com/office/drawing/2014/main" id="{E08F6E75-2A45-4CD7-A89B-35B31D4D478A}"/>
               </a:ext>
             </a:extLst>
           </p:cNvPr>
@@ -8020,78 +7950,35 @@
               <a:rPr lang="en-CA" dirty="0" err="1"/>
               <a:t>Protocole</a:t>
             </a:r>
-            <a:endParaRPr lang="en-CA" dirty="0"/>
-          </a:p>
-        </p:txBody>
-      </p:sp>
-      <p:sp>
-        <p:nvSpPr>
-          <p:cNvPr id="3" name="TextBox 2">
+            <a:r>
+              <a:rPr lang="en-CA" dirty="0"/>
+              <a:t> - Solutions</a:t>
+            </a:r>
+          </a:p>
+        </p:txBody>
+      </p:sp>
+      <p:sp>
+        <p:nvSpPr>
+          <p:cNvPr id="3" name="Content Placeholder 2">
             <a:extLst>
               <a:ext uri="{FF2B5EF4-FFF2-40B4-BE49-F238E27FC236}">
-                <a16:creationId xmlns:a16="http://schemas.microsoft.com/office/drawing/2014/main" id="{42DA6C5E-FC75-4155-A6A5-19DC3943EF40}"/>
+                <a16:creationId xmlns:a16="http://schemas.microsoft.com/office/drawing/2014/main" id="{B415ED72-9909-4FA1-907A-DAF78FD34380}"/>
               </a:ext>
             </a:extLst>
           </p:cNvPr>
-          <p:cNvSpPr txBox="1"/>
-          <p:nvPr/>
-        </p:nvSpPr>
-        <p:spPr>
-          <a:xfrm>
-            <a:off x="685800" y="1907931"/>
-            <a:ext cx="11506199" cy="461665"/>
-          </a:xfrm>
-          <a:prstGeom prst="rect">
-            <a:avLst/>
-          </a:prstGeom>
-          <a:noFill/>
-        </p:spPr>
-        <p:txBody>
-          <a:bodyPr wrap="square" rtlCol="0">
-            <a:spAutoFit/>
-          </a:bodyPr>
+          <p:cNvSpPr>
+            <a:spLocks noGrp="1"/>
+          </p:cNvSpPr>
+          <p:nvPr>
+            <p:ph idx="1"/>
+          </p:nvPr>
+        </p:nvSpPr>
+        <p:spPr/>
+        <p:txBody>
+          <a:bodyPr/>
           <a:lstStyle/>
           <a:p>
             <a:r>
-              <a:rPr lang="en-CA" sz="2400" dirty="0"/>
-              <a:t>Solutions:</a:t>
-            </a:r>
-          </a:p>
-        </p:txBody>
-      </p:sp>
-      <p:sp>
-        <p:nvSpPr>
-          <p:cNvPr id="5" name="TextBox 4">
-            <a:extLst>
-              <a:ext uri="{FF2B5EF4-FFF2-40B4-BE49-F238E27FC236}">
-                <a16:creationId xmlns:a16="http://schemas.microsoft.com/office/drawing/2014/main" id="{0F05B460-CFDE-45AB-9244-C2381F57C111}"/>
-              </a:ext>
-            </a:extLst>
-          </p:cNvPr>
-          <p:cNvSpPr txBox="1"/>
-          <p:nvPr/>
-        </p:nvSpPr>
-        <p:spPr>
-          <a:xfrm>
-            <a:off x="808892" y="2716823"/>
-            <a:ext cx="10612316" cy="2585323"/>
-          </a:xfrm>
-          <a:prstGeom prst="rect">
-            <a:avLst/>
-          </a:prstGeom>
-          <a:noFill/>
-        </p:spPr>
-        <p:txBody>
-          <a:bodyPr wrap="square" rtlCol="0">
-            <a:spAutoFit/>
-          </a:bodyPr>
-          <a:lstStyle/>
-          <a:p>
-            <a:pPr marL="285750" indent="-285750">
-              <a:buFont typeface="Arial" panose="020B0604020202020204" pitchFamily="34" charset="0"/>
-              <a:buChar char="•"/>
-            </a:pPr>
-            <a:r>
               <a:rPr lang="en-CA" dirty="0" err="1"/>
               <a:t>Ajout</a:t>
             </a:r>
@@ -8183,26 +8070,15 @@
               <a:rPr lang="en-CA" dirty="0" err="1"/>
               <a:t>différencier</a:t>
             </a:r>
-            <a:r>
-              <a:rPr lang="en-CA" dirty="0"/>
-              <a:t>.</a:t>
-            </a:r>
-          </a:p>
-          <a:p>
-            <a:pPr marL="285750" indent="-285750">
-              <a:buFont typeface="Arial" panose="020B0604020202020204" pitchFamily="34" charset="0"/>
-              <a:buChar char="•"/>
-            </a:pPr>
             <a:endParaRPr lang="en-CA" dirty="0"/>
           </a:p>
           <a:p>
-            <a:pPr marL="285750" indent="-285750">
-              <a:buFont typeface="Arial" panose="020B0604020202020204" pitchFamily="34" charset="0"/>
-              <a:buChar char="•"/>
-            </a:pPr>
-            <a:r>
-              <a:rPr lang="en-CA" dirty="0"/>
-              <a:t>Assignation d’un </a:t>
+            <a:endParaRPr lang="en-CA" dirty="0"/>
+          </a:p>
+          <a:p>
+            <a:r>
+              <a:rPr lang="en-CA" dirty="0"/>
+              <a:t> Assignation d’un </a:t>
             </a:r>
             <a:r>
               <a:rPr lang="en-CA" dirty="0" err="1"/>
@@ -8224,23 +8100,12 @@
               <a:rPr lang="en-CA" dirty="0" err="1"/>
               <a:t>commande</a:t>
             </a:r>
-            <a:r>
-              <a:rPr lang="en-CA" dirty="0"/>
-              <a:t>.</a:t>
-            </a:r>
-          </a:p>
-          <a:p>
-            <a:pPr marL="285750" indent="-285750">
-              <a:buFont typeface="Arial" panose="020B0604020202020204" pitchFamily="34" charset="0"/>
-              <a:buChar char="•"/>
-            </a:pPr>
             <a:endParaRPr lang="en-CA" dirty="0"/>
           </a:p>
           <a:p>
-            <a:pPr marL="285750" indent="-285750">
-              <a:buFont typeface="Arial" panose="020B0604020202020204" pitchFamily="34" charset="0"/>
-              <a:buChar char="•"/>
-            </a:pPr>
+            <a:endParaRPr lang="en-CA" dirty="0"/>
+          </a:p>
+          <a:p>
             <a:r>
               <a:rPr lang="en-CA" dirty="0" err="1"/>
               <a:t>Rétroaction</a:t>
@@ -8285,26 +8150,6 @@
               <a:rPr lang="en-CA" dirty="0" err="1"/>
               <a:t>envoyé</a:t>
             </a:r>
-            <a:r>
-              <a:rPr lang="en-CA" dirty="0"/>
-              <a:t>.</a:t>
-            </a:r>
-          </a:p>
-          <a:p>
-            <a:pPr marL="285750" indent="-285750">
-              <a:buFont typeface="Arial" panose="020B0604020202020204" pitchFamily="34" charset="0"/>
-              <a:buChar char="•"/>
-            </a:pPr>
-            <a:endParaRPr lang="en-CA" dirty="0"/>
-          </a:p>
-          <a:p>
-            <a:endParaRPr lang="en-CA" dirty="0"/>
-          </a:p>
-          <a:p>
-            <a:pPr marL="285750" indent="-285750">
-              <a:buFont typeface="Arial" panose="020B0604020202020204" pitchFamily="34" charset="0"/>
-              <a:buChar char="•"/>
-            </a:pPr>
             <a:endParaRPr lang="en-CA" dirty="0"/>
           </a:p>
         </p:txBody>
@@ -8312,7 +8157,7 @@
     </p:spTree>
     <p:extLst>
       <p:ext uri="{BB962C8B-B14F-4D97-AF65-F5344CB8AC3E}">
-        <p14:creationId xmlns:p14="http://schemas.microsoft.com/office/powerpoint/2010/main" val="1050450600"/>
+        <p14:creationId xmlns:p14="http://schemas.microsoft.com/office/powerpoint/2010/main" val="3295757666"/>
       </p:ext>
     </p:extLst>
   </p:cSld>
@@ -8364,172 +8209,14 @@
               <a:rPr lang="en-CA" dirty="0" err="1"/>
               <a:t>Protocole</a:t>
             </a:r>
-            <a:endParaRPr lang="en-CA" dirty="0"/>
-          </a:p>
-        </p:txBody>
-      </p:sp>
-      <p:sp>
-        <p:nvSpPr>
-          <p:cNvPr id="3" name="TextBox 2">
-            <a:extLst>
-              <a:ext uri="{FF2B5EF4-FFF2-40B4-BE49-F238E27FC236}">
-                <a16:creationId xmlns:a16="http://schemas.microsoft.com/office/drawing/2014/main" id="{42DA6C5E-FC75-4155-A6A5-19DC3943EF40}"/>
-              </a:ext>
-            </a:extLst>
-          </p:cNvPr>
-          <p:cNvSpPr txBox="1"/>
-          <p:nvPr/>
-        </p:nvSpPr>
-        <p:spPr>
-          <a:xfrm>
-            <a:off x="685800" y="1907931"/>
-            <a:ext cx="11506199" cy="461665"/>
-          </a:xfrm>
-          <a:prstGeom prst="rect">
-            <a:avLst/>
-          </a:prstGeom>
-          <a:noFill/>
-        </p:spPr>
-        <p:txBody>
-          <a:bodyPr wrap="square" rtlCol="0">
-            <a:spAutoFit/>
-          </a:bodyPr>
-          <a:lstStyle/>
-          <a:p>
-            <a:r>
-              <a:rPr lang="en-CA" sz="2400" dirty="0" err="1"/>
+            <a:r>
+              <a:rPr lang="en-CA" dirty="0"/>
+              <a:t> - </a:t>
+            </a:r>
+            <a:r>
+              <a:rPr lang="en-CA" dirty="0" err="1"/>
               <a:t>Implémentation</a:t>
             </a:r>
-            <a:r>
-              <a:rPr lang="en-CA" sz="2400" dirty="0"/>
-              <a:t>:</a:t>
-            </a:r>
-          </a:p>
-        </p:txBody>
-      </p:sp>
-      <p:sp>
-        <p:nvSpPr>
-          <p:cNvPr id="5" name="TextBox 4">
-            <a:extLst>
-              <a:ext uri="{FF2B5EF4-FFF2-40B4-BE49-F238E27FC236}">
-                <a16:creationId xmlns:a16="http://schemas.microsoft.com/office/drawing/2014/main" id="{0F05B460-CFDE-45AB-9244-C2381F57C111}"/>
-              </a:ext>
-            </a:extLst>
-          </p:cNvPr>
-          <p:cNvSpPr txBox="1"/>
-          <p:nvPr/>
-        </p:nvSpPr>
-        <p:spPr>
-          <a:xfrm>
-            <a:off x="808892" y="2635496"/>
-            <a:ext cx="10612316" cy="3416320"/>
-          </a:xfrm>
-          <a:prstGeom prst="rect">
-            <a:avLst/>
-          </a:prstGeom>
-          <a:noFill/>
-        </p:spPr>
-        <p:txBody>
-          <a:bodyPr wrap="square" rtlCol="0">
-            <a:spAutoFit/>
-          </a:bodyPr>
-          <a:lstStyle/>
-          <a:p>
-            <a:pPr marL="285750" indent="-285750">
-              <a:buFont typeface="Arial" panose="020B0604020202020204" pitchFamily="34" charset="0"/>
-              <a:buChar char="•"/>
-            </a:pPr>
-            <a:r>
-              <a:rPr lang="en-CA" dirty="0"/>
-              <a:t>Communication </a:t>
-            </a:r>
-            <a:r>
-              <a:rPr lang="en-CA" dirty="0" err="1"/>
-              <a:t>Serveur</a:t>
-            </a:r>
-            <a:r>
-              <a:rPr lang="en-CA" dirty="0"/>
-              <a:t> -&gt; Ruche:</a:t>
-            </a:r>
-          </a:p>
-          <a:p>
-            <a:pPr marL="285750" indent="-285750">
-              <a:buFont typeface="Arial" panose="020B0604020202020204" pitchFamily="34" charset="0"/>
-              <a:buChar char="•"/>
-            </a:pPr>
-            <a:endParaRPr lang="en-CA" dirty="0"/>
-          </a:p>
-          <a:p>
-            <a:pPr marL="285750" indent="-285750">
-              <a:buFont typeface="Arial" panose="020B0604020202020204" pitchFamily="34" charset="0"/>
-              <a:buChar char="•"/>
-            </a:pPr>
-            <a:endParaRPr lang="en-CA" dirty="0"/>
-          </a:p>
-          <a:p>
-            <a:pPr marL="285750" indent="-285750">
-              <a:buFont typeface="Arial" panose="020B0604020202020204" pitchFamily="34" charset="0"/>
-              <a:buChar char="•"/>
-            </a:pPr>
-            <a:endParaRPr lang="en-CA" dirty="0"/>
-          </a:p>
-          <a:p>
-            <a:pPr marL="285750" indent="-285750">
-              <a:buFont typeface="Arial" panose="020B0604020202020204" pitchFamily="34" charset="0"/>
-              <a:buChar char="•"/>
-            </a:pPr>
-            <a:endParaRPr lang="en-CA" dirty="0"/>
-          </a:p>
-          <a:p>
-            <a:pPr marL="285750" indent="-285750">
-              <a:buFont typeface="Arial" panose="020B0604020202020204" pitchFamily="34" charset="0"/>
-              <a:buChar char="•"/>
-            </a:pPr>
-            <a:endParaRPr lang="en-CA" dirty="0"/>
-          </a:p>
-          <a:p>
-            <a:endParaRPr lang="en-CA" dirty="0"/>
-          </a:p>
-          <a:p>
-            <a:pPr marL="285750" indent="-285750">
-              <a:buFont typeface="Arial" panose="020B0604020202020204" pitchFamily="34" charset="0"/>
-              <a:buChar char="•"/>
-            </a:pPr>
-            <a:endParaRPr lang="en-CA" dirty="0"/>
-          </a:p>
-          <a:p>
-            <a:pPr marL="285750" indent="-285750">
-              <a:buFont typeface="Arial" panose="020B0604020202020204" pitchFamily="34" charset="0"/>
-              <a:buChar char="•"/>
-            </a:pPr>
-            <a:r>
-              <a:rPr lang="en-CA" dirty="0"/>
-              <a:t>Communication Ruche -&gt; </a:t>
-            </a:r>
-            <a:r>
-              <a:rPr lang="en-CA" dirty="0" err="1"/>
-              <a:t>Serveur</a:t>
-            </a:r>
-            <a:r>
-              <a:rPr lang="en-CA" dirty="0"/>
-              <a:t>:</a:t>
-            </a:r>
-          </a:p>
-          <a:p>
-            <a:pPr marL="285750" indent="-285750">
-              <a:buFont typeface="Arial" panose="020B0604020202020204" pitchFamily="34" charset="0"/>
-              <a:buChar char="•"/>
-            </a:pPr>
-            <a:endParaRPr lang="en-CA" dirty="0"/>
-          </a:p>
-          <a:p>
-            <a:endParaRPr lang="en-CA" dirty="0"/>
-          </a:p>
-          <a:p>
-            <a:pPr marL="285750" indent="-285750">
-              <a:buFont typeface="Arial" panose="020B0604020202020204" pitchFamily="34" charset="0"/>
-              <a:buChar char="•"/>
-            </a:pPr>
             <a:endParaRPr lang="en-CA" dirty="0"/>
           </a:p>
         </p:txBody>
@@ -8562,7 +8249,7 @@
         </p:blipFill>
         <p:spPr>
           <a:xfrm>
-            <a:off x="742950" y="3037014"/>
+            <a:off x="868851" y="4953001"/>
             <a:ext cx="10706100" cy="1562100"/>
           </a:xfrm>
           <a:prstGeom prst="rect">
@@ -8598,7 +8285,7 @@
         </p:blipFill>
         <p:spPr>
           <a:xfrm>
-            <a:off x="4552950" y="5194501"/>
+            <a:off x="4678851" y="2637621"/>
             <a:ext cx="3086100" cy="1562100"/>
           </a:xfrm>
           <a:prstGeom prst="rect">
@@ -8606,6 +8293,92 @@
           </a:prstGeom>
         </p:spPr>
       </p:pic>
+      <p:sp>
+        <p:nvSpPr>
+          <p:cNvPr id="7" name="Content Placeholder 2">
+            <a:extLst>
+              <a:ext uri="{FF2B5EF4-FFF2-40B4-BE49-F238E27FC236}">
+                <a16:creationId xmlns:a16="http://schemas.microsoft.com/office/drawing/2014/main" id="{D0FB56EB-FCFA-416B-9DAC-D19F345A911E}"/>
+              </a:ext>
+            </a:extLst>
+          </p:cNvPr>
+          <p:cNvSpPr>
+            <a:spLocks noGrp="1"/>
+          </p:cNvSpPr>
+          <p:nvPr>
+            <p:ph idx="1"/>
+          </p:nvPr>
+        </p:nvSpPr>
+        <p:spPr>
+          <a:xfrm>
+            <a:off x="2589212" y="2133600"/>
+            <a:ext cx="8915400" cy="3777622"/>
+          </a:xfrm>
+        </p:spPr>
+        <p:txBody>
+          <a:bodyPr/>
+          <a:lstStyle/>
+          <a:p>
+            <a:r>
+              <a:rPr lang="en-CA" dirty="0"/>
+              <a:t>Communication </a:t>
+            </a:r>
+            <a:r>
+              <a:rPr lang="en-CA" dirty="0" err="1"/>
+              <a:t>Ordinateur</a:t>
+            </a:r>
+            <a:r>
+              <a:rPr lang="en-CA" dirty="0"/>
+              <a:t> -&gt; </a:t>
+            </a:r>
+            <a:r>
+              <a:rPr lang="en-CA" dirty="0" err="1"/>
+              <a:t>Serveur</a:t>
+            </a:r>
+            <a:r>
+              <a:rPr lang="en-CA" dirty="0"/>
+              <a:t> –&gt; Ruche:</a:t>
+            </a:r>
+          </a:p>
+          <a:p>
+            <a:endParaRPr lang="en-CA" dirty="0"/>
+          </a:p>
+          <a:p>
+            <a:endParaRPr lang="en-CA" dirty="0"/>
+          </a:p>
+          <a:p>
+            <a:endParaRPr lang="en-CA" dirty="0"/>
+          </a:p>
+          <a:p>
+            <a:endParaRPr lang="en-CA" dirty="0"/>
+          </a:p>
+          <a:p>
+            <a:endParaRPr lang="en-CA" dirty="0"/>
+          </a:p>
+          <a:p>
+            <a:r>
+              <a:rPr lang="en-CA" dirty="0"/>
+              <a:t>Communication Ruche -&gt; </a:t>
+            </a:r>
+            <a:r>
+              <a:rPr lang="en-CA" dirty="0" err="1"/>
+              <a:t>Serveur</a:t>
+            </a:r>
+            <a:r>
+              <a:rPr lang="en-CA" dirty="0"/>
+              <a:t> -&gt; </a:t>
+            </a:r>
+            <a:r>
+              <a:rPr lang="en-CA" dirty="0" err="1"/>
+              <a:t>Ordinateur</a:t>
+            </a:r>
+            <a:r>
+              <a:rPr lang="en-CA" dirty="0"/>
+              <a:t>:</a:t>
+            </a:r>
+          </a:p>
+        </p:txBody>
+      </p:sp>
     </p:spTree>
     <p:extLst>
       <p:ext uri="{BB962C8B-B14F-4D97-AF65-F5344CB8AC3E}">
@@ -8661,188 +8434,227 @@
               <a:rPr lang="en-CA" dirty="0" err="1"/>
               <a:t>Protocole</a:t>
             </a:r>
-            <a:endParaRPr lang="en-CA" dirty="0"/>
-          </a:p>
-        </p:txBody>
-      </p:sp>
-      <p:sp>
-        <p:nvSpPr>
-          <p:cNvPr id="3" name="TextBox 2">
+            <a:r>
+              <a:rPr lang="en-CA" dirty="0"/>
+              <a:t> - APP</a:t>
+            </a:r>
+          </a:p>
+        </p:txBody>
+      </p:sp>
+      <p:sp>
+        <p:nvSpPr>
+          <p:cNvPr id="7" name="Content Placeholder 2">
             <a:extLst>
               <a:ext uri="{FF2B5EF4-FFF2-40B4-BE49-F238E27FC236}">
-                <a16:creationId xmlns:a16="http://schemas.microsoft.com/office/drawing/2014/main" id="{42DA6C5E-FC75-4155-A6A5-19DC3943EF40}"/>
+                <a16:creationId xmlns:a16="http://schemas.microsoft.com/office/drawing/2014/main" id="{D0FB56EB-FCFA-416B-9DAC-D19F345A911E}"/>
               </a:ext>
             </a:extLst>
           </p:cNvPr>
-          <p:cNvSpPr txBox="1"/>
-          <p:nvPr/>
+          <p:cNvSpPr>
+            <a:spLocks noGrp="1"/>
+          </p:cNvSpPr>
+          <p:nvPr>
+            <p:ph idx="1"/>
+          </p:nvPr>
         </p:nvSpPr>
         <p:spPr>
           <a:xfrm>
-            <a:off x="685800" y="1907931"/>
-            <a:ext cx="11506199" cy="461665"/>
+            <a:off x="2589212" y="2133600"/>
+            <a:ext cx="8915400" cy="3777622"/>
           </a:xfrm>
-          <a:prstGeom prst="rect">
-            <a:avLst/>
-          </a:prstGeom>
-          <a:noFill/>
         </p:spPr>
         <p:txBody>
-          <a:bodyPr wrap="square" rtlCol="0">
-            <a:spAutoFit/>
-          </a:bodyPr>
+          <a:bodyPr/>
           <a:lstStyle/>
           <a:p>
             <a:r>
-              <a:rPr lang="en-CA" sz="2400" dirty="0" err="1"/>
-              <a:t>Implémentation</a:t>
-            </a:r>
-            <a:r>
-              <a:rPr lang="en-CA" sz="2400" dirty="0"/>
+              <a:rPr lang="en-CA" dirty="0"/>
+              <a:t>APP 6:</a:t>
+            </a:r>
+          </a:p>
+          <a:p>
+            <a:pPr lvl="1"/>
+            <a:r>
+              <a:rPr lang="en-CA" dirty="0" err="1"/>
+              <a:t>Ajout</a:t>
+            </a:r>
+            <a:r>
+              <a:rPr lang="en-CA" dirty="0"/>
+              <a:t> </a:t>
+            </a:r>
+            <a:r>
+              <a:rPr lang="en-CA" dirty="0" err="1"/>
+              <a:t>d’une</a:t>
+            </a:r>
+            <a:r>
+              <a:rPr lang="en-CA" dirty="0"/>
+              <a:t> </a:t>
+            </a:r>
+            <a:r>
+              <a:rPr lang="en-CA" dirty="0" err="1"/>
+              <a:t>entête</a:t>
+            </a:r>
+            <a:r>
+              <a:rPr lang="en-CA" dirty="0"/>
+              <a:t> et </a:t>
+            </a:r>
+            <a:r>
+              <a:rPr lang="en-CA" dirty="0" err="1"/>
+              <a:t>d’une</a:t>
+            </a:r>
+            <a:r>
+              <a:rPr lang="en-CA" dirty="0"/>
+              <a:t> queue aux </a:t>
+            </a:r>
+            <a:r>
+              <a:rPr lang="en-CA" dirty="0" err="1"/>
+              <a:t>paquets</a:t>
+            </a:r>
+            <a:r>
+              <a:rPr lang="en-CA" dirty="0"/>
+              <a:t> </a:t>
+            </a:r>
+            <a:r>
+              <a:rPr lang="en-CA" dirty="0" err="1"/>
+              <a:t>transmis</a:t>
+            </a:r>
+            <a:endParaRPr lang="en-CA" dirty="0"/>
+          </a:p>
+          <a:p>
+            <a:endParaRPr lang="en-CA" dirty="0"/>
+          </a:p>
+          <a:p>
+            <a:r>
+              <a:rPr lang="en-CA" dirty="0" err="1"/>
+              <a:t>Toutefois</a:t>
+            </a:r>
+            <a:r>
+              <a:rPr lang="en-CA" dirty="0"/>
+              <a:t>, le </a:t>
+            </a:r>
+            <a:r>
+              <a:rPr lang="en-CA" dirty="0" err="1"/>
+              <a:t>protocole</a:t>
+            </a:r>
+            <a:r>
+              <a:rPr lang="en-CA" dirty="0"/>
+              <a:t> a </a:t>
+            </a:r>
+            <a:r>
+              <a:rPr lang="en-CA" dirty="0" err="1"/>
+              <a:t>été</a:t>
+            </a:r>
+            <a:r>
+              <a:rPr lang="en-CA" dirty="0"/>
+              <a:t> </a:t>
+            </a:r>
+            <a:r>
+              <a:rPr lang="en-CA" dirty="0" err="1"/>
+              <a:t>implémenté</a:t>
+            </a:r>
+            <a:r>
+              <a:rPr lang="en-CA" dirty="0"/>
+              <a:t> </a:t>
+            </a:r>
+            <a:r>
+              <a:rPr lang="en-CA" dirty="0" err="1"/>
+              <a:t>avant</a:t>
+            </a:r>
+            <a:r>
+              <a:rPr lang="en-CA" dirty="0"/>
+              <a:t> de faire </a:t>
+            </a:r>
+            <a:r>
+              <a:rPr lang="en-CA" dirty="0" err="1"/>
+              <a:t>l’APP</a:t>
+            </a:r>
+            <a:r>
+              <a:rPr lang="en-CA" dirty="0"/>
+              <a:t> 6, </a:t>
+            </a:r>
+            <a:r>
+              <a:rPr lang="en-CA" dirty="0" err="1"/>
+              <a:t>donc</a:t>
+            </a:r>
+            <a:r>
+              <a:rPr lang="en-CA" dirty="0"/>
+              <a:t> </a:t>
+            </a:r>
+            <a:r>
+              <a:rPr lang="en-CA" dirty="0" err="1"/>
+              <a:t>certaines</a:t>
+            </a:r>
+            <a:r>
+              <a:rPr lang="en-CA" dirty="0"/>
+              <a:t> </a:t>
+            </a:r>
+            <a:r>
+              <a:rPr lang="en-CA" dirty="0" err="1"/>
+              <a:t>fonctionnalités</a:t>
+            </a:r>
+            <a:r>
+              <a:rPr lang="en-CA" dirty="0"/>
+              <a:t> </a:t>
+            </a:r>
+            <a:r>
+              <a:rPr lang="en-CA" dirty="0" err="1"/>
+              <a:t>auraient</a:t>
+            </a:r>
+            <a:r>
+              <a:rPr lang="en-CA" dirty="0"/>
+              <a:t> </a:t>
+            </a:r>
+            <a:r>
+              <a:rPr lang="en-CA" dirty="0" err="1"/>
+              <a:t>été</a:t>
+            </a:r>
+            <a:r>
+              <a:rPr lang="en-CA" dirty="0"/>
+              <a:t> </a:t>
+            </a:r>
+            <a:r>
+              <a:rPr lang="en-CA" dirty="0" err="1"/>
+              <a:t>différentes</a:t>
+            </a:r>
+            <a:r>
+              <a:rPr lang="en-CA" dirty="0"/>
+              <a:t> </a:t>
+            </a:r>
+            <a:r>
+              <a:rPr lang="en-CA" dirty="0" err="1"/>
+              <a:t>dont</a:t>
+            </a:r>
+            <a:r>
+              <a:rPr lang="en-CA" dirty="0"/>
               <a:t>:</a:t>
             </a:r>
           </a:p>
-        </p:txBody>
-      </p:sp>
-      <p:sp>
-        <p:nvSpPr>
-          <p:cNvPr id="5" name="TextBox 4">
-            <a:extLst>
-              <a:ext uri="{FF2B5EF4-FFF2-40B4-BE49-F238E27FC236}">
-                <a16:creationId xmlns:a16="http://schemas.microsoft.com/office/drawing/2014/main" id="{0F05B460-CFDE-45AB-9244-C2381F57C111}"/>
-              </a:ext>
-            </a:extLst>
-          </p:cNvPr>
-          <p:cNvSpPr txBox="1"/>
-          <p:nvPr/>
-        </p:nvSpPr>
-        <p:spPr>
-          <a:xfrm>
-            <a:off x="808892" y="2635496"/>
-            <a:ext cx="10612316" cy="3416320"/>
-          </a:xfrm>
-          <a:prstGeom prst="rect">
-            <a:avLst/>
-          </a:prstGeom>
-          <a:noFill/>
-        </p:spPr>
-        <p:txBody>
-          <a:bodyPr wrap="square" rtlCol="0">
-            <a:spAutoFit/>
-          </a:bodyPr>
-          <a:lstStyle/>
-          <a:p>
-            <a:pPr marL="285750" indent="-285750">
-              <a:buFont typeface="Arial" panose="020B0604020202020204" pitchFamily="34" charset="0"/>
-              <a:buChar char="•"/>
-            </a:pPr>
-            <a:r>
-              <a:rPr lang="en-CA" dirty="0"/>
-              <a:t>Communication </a:t>
-            </a:r>
-            <a:r>
-              <a:rPr lang="en-CA" dirty="0" err="1"/>
-              <a:t>Moniteur</a:t>
-            </a:r>
-            <a:r>
-              <a:rPr lang="en-CA" dirty="0"/>
-              <a:t> -&gt; </a:t>
-            </a:r>
-            <a:r>
-              <a:rPr lang="en-CA" dirty="0" err="1"/>
-              <a:t>Serveur</a:t>
-            </a:r>
-            <a:r>
-              <a:rPr lang="en-CA" dirty="0"/>
-              <a:t>:</a:t>
-            </a:r>
-          </a:p>
-          <a:p>
-            <a:pPr marL="285750" indent="-285750">
-              <a:buFont typeface="Arial" panose="020B0604020202020204" pitchFamily="34" charset="0"/>
-              <a:buChar char="•"/>
-            </a:pPr>
-            <a:endParaRPr lang="en-CA" dirty="0"/>
-          </a:p>
-          <a:p>
-            <a:pPr marL="285750" indent="-285750">
-              <a:buFont typeface="Arial" panose="020B0604020202020204" pitchFamily="34" charset="0"/>
-              <a:buChar char="•"/>
-            </a:pPr>
-            <a:endParaRPr lang="en-CA" dirty="0"/>
-          </a:p>
-          <a:p>
-            <a:pPr marL="285750" indent="-285750">
-              <a:buFont typeface="Arial" panose="020B0604020202020204" pitchFamily="34" charset="0"/>
-              <a:buChar char="•"/>
-            </a:pPr>
-            <a:endParaRPr lang="en-CA" dirty="0"/>
-          </a:p>
-          <a:p>
-            <a:pPr marL="285750" indent="-285750">
-              <a:buFont typeface="Arial" panose="020B0604020202020204" pitchFamily="34" charset="0"/>
-              <a:buChar char="•"/>
-            </a:pPr>
-            <a:endParaRPr lang="en-CA" dirty="0"/>
-          </a:p>
-          <a:p>
-            <a:pPr marL="285750" indent="-285750">
-              <a:buFont typeface="Arial" panose="020B0604020202020204" pitchFamily="34" charset="0"/>
-              <a:buChar char="•"/>
-            </a:pPr>
-            <a:endParaRPr lang="en-CA" dirty="0"/>
-          </a:p>
-          <a:p>
-            <a:endParaRPr lang="en-CA" dirty="0"/>
-          </a:p>
-          <a:p>
-            <a:pPr marL="285750" indent="-285750">
-              <a:buFont typeface="Arial" panose="020B0604020202020204" pitchFamily="34" charset="0"/>
-              <a:buChar char="•"/>
-            </a:pPr>
-            <a:endParaRPr lang="en-CA" dirty="0"/>
-          </a:p>
-          <a:p>
-            <a:pPr marL="285750" indent="-285750">
-              <a:buFont typeface="Arial" panose="020B0604020202020204" pitchFamily="34" charset="0"/>
-              <a:buChar char="•"/>
-            </a:pPr>
-            <a:r>
-              <a:rPr lang="en-CA" dirty="0"/>
-              <a:t>Communication </a:t>
-            </a:r>
-            <a:r>
-              <a:rPr lang="en-CA" dirty="0" err="1"/>
-              <a:t>Serveur</a:t>
-            </a:r>
-            <a:r>
-              <a:rPr lang="en-CA" dirty="0"/>
-              <a:t> -&gt; </a:t>
-            </a:r>
-            <a:r>
-              <a:rPr lang="en-CA" dirty="0" err="1"/>
-              <a:t>Moniteur</a:t>
-            </a:r>
-            <a:r>
-              <a:rPr lang="en-CA" dirty="0"/>
-              <a:t>:</a:t>
-            </a:r>
-          </a:p>
-          <a:p>
-            <a:pPr marL="285750" indent="-285750">
-              <a:buFont typeface="Arial" panose="020B0604020202020204" pitchFamily="34" charset="0"/>
-              <a:buChar char="•"/>
-            </a:pPr>
-            <a:endParaRPr lang="en-CA" dirty="0"/>
-          </a:p>
-          <a:p>
-            <a:endParaRPr lang="en-CA" dirty="0"/>
-          </a:p>
-          <a:p>
-            <a:pPr marL="285750" indent="-285750">
-              <a:buFont typeface="Arial" panose="020B0604020202020204" pitchFamily="34" charset="0"/>
-              <a:buChar char="•"/>
-            </a:pPr>
+          <a:p>
+            <a:pPr lvl="1"/>
+            <a:r>
+              <a:rPr lang="en-CA" dirty="0"/>
+              <a:t>Une </a:t>
+            </a:r>
+            <a:r>
+              <a:rPr lang="en-CA" dirty="0" err="1"/>
+              <a:t>meilleure</a:t>
+            </a:r>
+            <a:r>
+              <a:rPr lang="en-CA" dirty="0"/>
+              <a:t> implementation de la </a:t>
+            </a:r>
+            <a:r>
+              <a:rPr lang="en-CA" dirty="0" err="1"/>
+              <a:t>gestion</a:t>
+            </a:r>
+            <a:r>
+              <a:rPr lang="en-CA" dirty="0"/>
+              <a:t> </a:t>
+            </a:r>
+            <a:r>
+              <a:rPr lang="en-CA" dirty="0" err="1"/>
+              <a:t>d’erreur</a:t>
+            </a:r>
             <a:endParaRPr lang="en-CA" dirty="0"/>
           </a:p>
         </p:txBody>
@@ -8850,7 +8662,7 @@
     </p:spTree>
     <p:extLst>
       <p:ext uri="{BB962C8B-B14F-4D97-AF65-F5344CB8AC3E}">
-        <p14:creationId xmlns:p14="http://schemas.microsoft.com/office/powerpoint/2010/main" val="233472135"/>
+        <p14:creationId xmlns:p14="http://schemas.microsoft.com/office/powerpoint/2010/main" val="2088409317"/>
       </p:ext>
     </p:extLst>
   </p:cSld>
@@ -9239,6 +9051,247 @@
 </file>
 
 <file path=ppt/slides/slide4.xml><?xml version="1.0" encoding="utf-8"?>
+<p:sld xmlns:a="http://schemas.openxmlformats.org/drawingml/2006/main" xmlns:r="http://schemas.openxmlformats.org/officeDocument/2006/relationships" xmlns:p="http://schemas.openxmlformats.org/presentationml/2006/main">
+  <p:cSld>
+    <p:spTree>
+      <p:nvGrpSpPr>
+        <p:cNvPr id="1" name=""/>
+        <p:cNvGrpSpPr/>
+        <p:nvPr/>
+      </p:nvGrpSpPr>
+      <p:grpSpPr>
+        <a:xfrm>
+          <a:off x="0" y="0"/>
+          <a:ext cx="0" cy="0"/>
+          <a:chOff x="0" y="0"/>
+          <a:chExt cx="0" cy="0"/>
+        </a:xfrm>
+      </p:grpSpPr>
+      <p:sp>
+        <p:nvSpPr>
+          <p:cNvPr id="2" name="Title 1">
+            <a:extLst>
+              <a:ext uri="{FF2B5EF4-FFF2-40B4-BE49-F238E27FC236}">
+                <a16:creationId xmlns:a16="http://schemas.microsoft.com/office/drawing/2014/main" id="{532BB36A-66E0-4644-AB8F-8DCB79605DD1}"/>
+              </a:ext>
+            </a:extLst>
+          </p:cNvPr>
+          <p:cNvSpPr>
+            <a:spLocks noGrp="1"/>
+          </p:cNvSpPr>
+          <p:nvPr>
+            <p:ph type="title"/>
+          </p:nvPr>
+        </p:nvSpPr>
+        <p:spPr/>
+        <p:txBody>
+          <a:bodyPr/>
+          <a:lstStyle/>
+          <a:p>
+            <a:r>
+              <a:rPr lang="en-CA" dirty="0" err="1"/>
+              <a:t>Antennes</a:t>
+            </a:r>
+            <a:r>
+              <a:rPr lang="en-CA" dirty="0"/>
+              <a:t> – 3D</a:t>
+            </a:r>
+          </a:p>
+        </p:txBody>
+      </p:sp>
+      <p:sp>
+        <p:nvSpPr>
+          <p:cNvPr id="3" name="Content Placeholder 2">
+            <a:extLst>
+              <a:ext uri="{FF2B5EF4-FFF2-40B4-BE49-F238E27FC236}">
+                <a16:creationId xmlns:a16="http://schemas.microsoft.com/office/drawing/2014/main" id="{6E8CB243-474A-4A7D-87A0-18D4236EA148}"/>
+              </a:ext>
+            </a:extLst>
+          </p:cNvPr>
+          <p:cNvSpPr>
+            <a:spLocks noGrp="1"/>
+          </p:cNvSpPr>
+          <p:nvPr>
+            <p:ph idx="1"/>
+          </p:nvPr>
+        </p:nvSpPr>
+        <p:spPr>
+          <a:xfrm>
+            <a:off x="1466490" y="1468963"/>
+            <a:ext cx="8915400" cy="3777622"/>
+          </a:xfrm>
+        </p:spPr>
+        <p:txBody>
+          <a:bodyPr/>
+          <a:lstStyle/>
+          <a:p>
+            <a:r>
+              <a:rPr lang="en-CA" dirty="0" err="1"/>
+              <a:t>Trouver</a:t>
+            </a:r>
+            <a:r>
+              <a:rPr lang="en-CA" dirty="0"/>
+              <a:t> documentation </a:t>
+            </a:r>
+            <a:r>
+              <a:rPr lang="en-CA" dirty="0" err="1"/>
+              <a:t>confirmant</a:t>
+            </a:r>
+            <a:r>
+              <a:rPr lang="en-CA" dirty="0"/>
+              <a:t> le design</a:t>
+            </a:r>
+          </a:p>
+          <a:p>
+            <a:r>
+              <a:rPr lang="en-CA" dirty="0" err="1"/>
+              <a:t>Avoir</a:t>
+            </a:r>
+            <a:r>
+              <a:rPr lang="en-CA" dirty="0"/>
+              <a:t> </a:t>
+            </a:r>
+            <a:r>
+              <a:rPr lang="en-CA" dirty="0" err="1"/>
+              <a:t>une</a:t>
+            </a:r>
+            <a:r>
+              <a:rPr lang="en-CA" dirty="0"/>
+              <a:t> </a:t>
+            </a:r>
+            <a:r>
+              <a:rPr lang="en-CA" dirty="0" err="1"/>
+              <a:t>directivité</a:t>
+            </a:r>
+            <a:r>
+              <a:rPr lang="en-CA" dirty="0"/>
+              <a:t> (Ruche </a:t>
+            </a:r>
+            <a:r>
+              <a:rPr lang="en-CA" dirty="0" err="1"/>
+              <a:t>vers</a:t>
+            </a:r>
+            <a:r>
+              <a:rPr lang="en-CA" dirty="0"/>
+              <a:t> </a:t>
+            </a:r>
+            <a:r>
+              <a:rPr lang="en-CA" dirty="0" err="1"/>
+              <a:t>Serveur</a:t>
+            </a:r>
+            <a:r>
+              <a:rPr lang="en-CA" dirty="0"/>
+              <a:t>)</a:t>
+            </a:r>
+          </a:p>
+        </p:txBody>
+      </p:sp>
+      <p:sp>
+        <p:nvSpPr>
+          <p:cNvPr id="16" name="TextBox 15">
+            <a:extLst>
+              <a:ext uri="{FF2B5EF4-FFF2-40B4-BE49-F238E27FC236}">
+                <a16:creationId xmlns:a16="http://schemas.microsoft.com/office/drawing/2014/main" id="{40B4E6AA-80A5-43B7-8A3B-BC40BD2FD27C}"/>
+              </a:ext>
+            </a:extLst>
+          </p:cNvPr>
+          <p:cNvSpPr txBox="1"/>
+          <p:nvPr/>
+        </p:nvSpPr>
+        <p:spPr>
+          <a:xfrm>
+            <a:off x="9069228" y="2589266"/>
+            <a:ext cx="3122772" cy="923330"/>
+          </a:xfrm>
+          <a:prstGeom prst="rect">
+            <a:avLst/>
+          </a:prstGeom>
+          <a:noFill/>
+        </p:spPr>
+        <p:txBody>
+          <a:bodyPr wrap="square" rtlCol="0">
+            <a:spAutoFit/>
+          </a:bodyPr>
+          <a:lstStyle/>
+          <a:p>
+            <a:r>
+              <a:rPr lang="en-CA" dirty="0"/>
+              <a:t>Coefficient de </a:t>
+            </a:r>
+            <a:r>
+              <a:rPr lang="en-CA" dirty="0" err="1"/>
+              <a:t>réflexion</a:t>
+            </a:r>
+            <a:r>
+              <a:rPr lang="en-CA" dirty="0"/>
+              <a:t> la </a:t>
+            </a:r>
+            <a:r>
+              <a:rPr lang="en-CA" dirty="0" err="1"/>
+              <a:t>bande</a:t>
+            </a:r>
+            <a:r>
+              <a:rPr lang="en-CA" dirty="0"/>
+              <a:t> ISM:</a:t>
+            </a:r>
+          </a:p>
+          <a:p>
+            <a:r>
+              <a:rPr lang="en-CA" dirty="0"/>
+              <a:t>de -13,84dB à – 19,77dB</a:t>
+            </a:r>
+          </a:p>
+        </p:txBody>
+      </p:sp>
+      <p:pic>
+        <p:nvPicPr>
+          <p:cNvPr id="6" name="Picture 5">
+            <a:extLst>
+              <a:ext uri="{FF2B5EF4-FFF2-40B4-BE49-F238E27FC236}">
+                <a16:creationId xmlns:a16="http://schemas.microsoft.com/office/drawing/2014/main" id="{018CBFB6-5EAC-4BDF-8539-25333E89EBFA}"/>
+              </a:ext>
+            </a:extLst>
+          </p:cNvPr>
+          <p:cNvPicPr>
+            <a:picLocks noChangeAspect="1"/>
+          </p:cNvPicPr>
+          <p:nvPr/>
+        </p:nvPicPr>
+        <p:blipFill rotWithShape="1">
+          <a:blip r:embed="rId2">
+            <a:extLst>
+              <a:ext uri="{28A0092B-C50C-407E-A947-70E740481C1C}">
+                <a14:useLocalDpi xmlns:a14="http://schemas.microsoft.com/office/drawing/2010/main" val="0"/>
+              </a:ext>
+            </a:extLst>
+          </a:blip>
+          <a:srcRect b="48889"/>
+          <a:stretch/>
+        </p:blipFill>
+        <p:spPr>
+          <a:xfrm>
+            <a:off x="1153825" y="2321169"/>
+            <a:ext cx="7844534" cy="3505200"/>
+          </a:xfrm>
+          <a:prstGeom prst="rect">
+            <a:avLst/>
+          </a:prstGeom>
+        </p:spPr>
+      </p:pic>
+    </p:spTree>
+    <p:extLst>
+      <p:ext uri="{BB962C8B-B14F-4D97-AF65-F5344CB8AC3E}">
+        <p14:creationId xmlns:p14="http://schemas.microsoft.com/office/powerpoint/2010/main" val="2543157408"/>
+      </p:ext>
+    </p:extLst>
+  </p:cSld>
+  <p:clrMapOvr>
+    <a:masterClrMapping/>
+  </p:clrMapOvr>
+</p:sld>
+</file>
+
+<file path=ppt/slides/slide5.xml><?xml version="1.0" encoding="utf-8"?>
 <p:sld xmlns:a="http://schemas.openxmlformats.org/drawingml/2006/main" xmlns:r="http://schemas.openxmlformats.org/officeDocument/2006/relationships" xmlns:p="http://schemas.openxmlformats.org/presentationml/2006/main">
   <p:cSld>
     <p:spTree>
@@ -9709,175 +9762,7 @@
     </p:spTree>
     <p:extLst>
       <p:ext uri="{BB962C8B-B14F-4D97-AF65-F5344CB8AC3E}">
-        <p14:creationId xmlns:p14="http://schemas.microsoft.com/office/powerpoint/2010/main" val="2543157408"/>
-      </p:ext>
-    </p:extLst>
-  </p:cSld>
-  <p:clrMapOvr>
-    <a:masterClrMapping/>
-  </p:clrMapOvr>
-</p:sld>
-</file>
-
-<file path=ppt/slides/slide5.xml><?xml version="1.0" encoding="utf-8"?>
-<p:sld xmlns:a="http://schemas.openxmlformats.org/drawingml/2006/main" xmlns:r="http://schemas.openxmlformats.org/officeDocument/2006/relationships" xmlns:p="http://schemas.openxmlformats.org/presentationml/2006/main">
-  <p:cSld>
-    <p:spTree>
-      <p:nvGrpSpPr>
-        <p:cNvPr id="1" name=""/>
-        <p:cNvGrpSpPr/>
-        <p:nvPr/>
-      </p:nvGrpSpPr>
-      <p:grpSpPr>
-        <a:xfrm>
-          <a:off x="0" y="0"/>
-          <a:ext cx="0" cy="0"/>
-          <a:chOff x="0" y="0"/>
-          <a:chExt cx="0" cy="0"/>
-        </a:xfrm>
-      </p:grpSpPr>
-      <p:sp>
-        <p:nvSpPr>
-          <p:cNvPr id="2" name="Title 1">
-            <a:extLst>
-              <a:ext uri="{FF2B5EF4-FFF2-40B4-BE49-F238E27FC236}">
-                <a16:creationId xmlns:a16="http://schemas.microsoft.com/office/drawing/2014/main" id="{E08F6E75-2A45-4CD7-A89B-35B31D4D478A}"/>
-              </a:ext>
-            </a:extLst>
-          </p:cNvPr>
-          <p:cNvSpPr>
-            <a:spLocks noGrp="1"/>
-          </p:cNvSpPr>
-          <p:nvPr>
-            <p:ph type="title"/>
-          </p:nvPr>
-        </p:nvSpPr>
-        <p:spPr/>
-        <p:txBody>
-          <a:bodyPr/>
-          <a:lstStyle/>
-          <a:p>
-            <a:r>
-              <a:rPr lang="en-CA" dirty="0" err="1"/>
-              <a:t>Antennes</a:t>
-            </a:r>
-            <a:r>
-              <a:rPr lang="en-CA" dirty="0"/>
-              <a:t> - </a:t>
-            </a:r>
-            <a:r>
-              <a:rPr lang="en-CA" dirty="0" err="1"/>
-              <a:t>Planaires</a:t>
-            </a:r>
-            <a:endParaRPr lang="en-CA" dirty="0"/>
-          </a:p>
-        </p:txBody>
-      </p:sp>
-      <p:sp>
-        <p:nvSpPr>
-          <p:cNvPr id="3" name="Content Placeholder 2">
-            <a:extLst>
-              <a:ext uri="{FF2B5EF4-FFF2-40B4-BE49-F238E27FC236}">
-                <a16:creationId xmlns:a16="http://schemas.microsoft.com/office/drawing/2014/main" id="{B415ED72-9909-4FA1-907A-DAF78FD34380}"/>
-              </a:ext>
-            </a:extLst>
-          </p:cNvPr>
-          <p:cNvSpPr>
-            <a:spLocks noGrp="1"/>
-          </p:cNvSpPr>
-          <p:nvPr>
-            <p:ph idx="1"/>
-          </p:nvPr>
-        </p:nvSpPr>
-        <p:spPr/>
-        <p:txBody>
-          <a:bodyPr/>
-          <a:lstStyle/>
-          <a:p>
-            <a:r>
-              <a:rPr lang="en-CA" dirty="0"/>
-              <a:t>APP 2:</a:t>
-            </a:r>
-          </a:p>
-          <a:p>
-            <a:pPr lvl="1"/>
-            <a:r>
-              <a:rPr lang="en-CA" dirty="0" err="1"/>
-              <a:t>Calculs</a:t>
-            </a:r>
-            <a:r>
-              <a:rPr lang="en-CA" dirty="0"/>
-              <a:t> des dimensions </a:t>
-            </a:r>
-            <a:r>
-              <a:rPr lang="en-CA" dirty="0" err="1"/>
-              <a:t>d’une</a:t>
-            </a:r>
-            <a:r>
-              <a:rPr lang="en-CA" dirty="0"/>
-              <a:t> </a:t>
-            </a:r>
-            <a:r>
-              <a:rPr lang="en-CA" dirty="0" err="1"/>
-              <a:t>antenne</a:t>
-            </a:r>
-            <a:r>
-              <a:rPr lang="en-CA" dirty="0"/>
-              <a:t> </a:t>
-            </a:r>
-            <a:r>
-              <a:rPr lang="en-CA" dirty="0" err="1"/>
-              <a:t>planaire</a:t>
-            </a:r>
-            <a:endParaRPr lang="en-CA" dirty="0"/>
-          </a:p>
-          <a:p>
-            <a:pPr lvl="1"/>
-            <a:r>
-              <a:rPr lang="en-CA" dirty="0"/>
-              <a:t>Utilisation </a:t>
-            </a:r>
-            <a:r>
-              <a:rPr lang="en-CA" dirty="0" err="1"/>
-              <a:t>d’ADS</a:t>
-            </a:r>
-            <a:endParaRPr lang="en-CA" dirty="0"/>
-          </a:p>
-          <a:p>
-            <a:r>
-              <a:rPr lang="en-CA" dirty="0"/>
-              <a:t>APP 3:</a:t>
-            </a:r>
-          </a:p>
-          <a:p>
-            <a:pPr lvl="1"/>
-            <a:r>
-              <a:rPr lang="en-CA" dirty="0" err="1"/>
-              <a:t>Lignes</a:t>
-            </a:r>
-            <a:r>
-              <a:rPr lang="en-CA" dirty="0"/>
-              <a:t> de transmission</a:t>
-            </a:r>
-          </a:p>
-          <a:p>
-            <a:pPr lvl="1"/>
-            <a:r>
-              <a:rPr lang="en-CA" dirty="0"/>
-              <a:t>Adaptation </a:t>
-            </a:r>
-            <a:r>
-              <a:rPr lang="en-CA" dirty="0" err="1"/>
-              <a:t>d’impédance</a:t>
-            </a:r>
-            <a:endParaRPr lang="en-CA" dirty="0"/>
-          </a:p>
-        </p:txBody>
-      </p:sp>
-    </p:spTree>
-    <p:extLst>
-      <p:ext uri="{BB962C8B-B14F-4D97-AF65-F5344CB8AC3E}">
-        <p14:creationId xmlns:p14="http://schemas.microsoft.com/office/powerpoint/2010/main" val="1190730998"/>
+        <p14:creationId xmlns:p14="http://schemas.microsoft.com/office/powerpoint/2010/main" val="4228631150"/>
       </p:ext>
     </p:extLst>
   </p:cSld>
@@ -9909,7 +9794,7 @@
           <p:cNvPr id="2" name="Title 1">
             <a:extLst>
               <a:ext uri="{FF2B5EF4-FFF2-40B4-BE49-F238E27FC236}">
-                <a16:creationId xmlns:a16="http://schemas.microsoft.com/office/drawing/2014/main" id="{532BB36A-66E0-4644-AB8F-8DCB79605DD1}"/>
+                <a16:creationId xmlns:a16="http://schemas.microsoft.com/office/drawing/2014/main" id="{E08F6E75-2A45-4CD7-A89B-35B31D4D478A}"/>
               </a:ext>
             </a:extLst>
           </p:cNvPr>
@@ -9927,7 +9812,15 @@
           <a:p>
             <a:r>
               <a:rPr lang="en-CA" dirty="0" err="1"/>
-              <a:t>Antenne</a:t>
+              <a:t>Antennes</a:t>
+            </a:r>
+            <a:r>
+              <a:rPr lang="en-CA" dirty="0"/>
+              <a:t> - </a:t>
+            </a:r>
+            <a:r>
+              <a:rPr lang="en-CA" dirty="0" err="1"/>
+              <a:t>Planaires</a:t>
             </a:r>
             <a:endParaRPr lang="en-CA" dirty="0"/>
           </a:p>
@@ -9938,7 +9831,7 @@
           <p:cNvPr id="3" name="Content Placeholder 2">
             <a:extLst>
               <a:ext uri="{FF2B5EF4-FFF2-40B4-BE49-F238E27FC236}">
-                <a16:creationId xmlns:a16="http://schemas.microsoft.com/office/drawing/2014/main" id="{6E8CB243-474A-4A7D-87A0-18D4236EA148}"/>
+                <a16:creationId xmlns:a16="http://schemas.microsoft.com/office/drawing/2014/main" id="{B415ED72-9909-4FA1-907A-DAF78FD34380}"/>
               </a:ext>
             </a:extLst>
           </p:cNvPr>
@@ -9954,14 +9847,90 @@
           <a:bodyPr/>
           <a:lstStyle/>
           <a:p>
-            <a:endParaRPr lang="en-CA"/>
+            <a:r>
+              <a:rPr lang="en-CA" dirty="0"/>
+              <a:t>APP 2:</a:t>
+            </a:r>
+          </a:p>
+          <a:p>
+            <a:pPr lvl="1"/>
+            <a:r>
+              <a:rPr lang="en-CA" dirty="0" err="1"/>
+              <a:t>Calculs</a:t>
+            </a:r>
+            <a:r>
+              <a:rPr lang="en-CA" dirty="0"/>
+              <a:t> des dimensions </a:t>
+            </a:r>
+            <a:r>
+              <a:rPr lang="en-CA" dirty="0" err="1"/>
+              <a:t>d’une</a:t>
+            </a:r>
+            <a:r>
+              <a:rPr lang="en-CA" dirty="0"/>
+              <a:t> </a:t>
+            </a:r>
+            <a:r>
+              <a:rPr lang="en-CA" dirty="0" err="1"/>
+              <a:t>antenne</a:t>
+            </a:r>
+            <a:r>
+              <a:rPr lang="en-CA" dirty="0"/>
+              <a:t> </a:t>
+            </a:r>
+            <a:r>
+              <a:rPr lang="en-CA" dirty="0" err="1"/>
+              <a:t>planaire</a:t>
+            </a:r>
+            <a:endParaRPr lang="en-CA" dirty="0"/>
+          </a:p>
+          <a:p>
+            <a:pPr lvl="1"/>
+            <a:r>
+              <a:rPr lang="en-CA" dirty="0"/>
+              <a:t>Utilisation </a:t>
+            </a:r>
+            <a:r>
+              <a:rPr lang="en-CA" dirty="0" err="1"/>
+              <a:t>d’ADS</a:t>
+            </a:r>
+            <a:endParaRPr lang="en-CA" dirty="0"/>
+          </a:p>
+          <a:p>
+            <a:r>
+              <a:rPr lang="en-CA" dirty="0"/>
+              <a:t>APP 3:</a:t>
+            </a:r>
+          </a:p>
+          <a:p>
+            <a:pPr lvl="1"/>
+            <a:r>
+              <a:rPr lang="en-CA" dirty="0" err="1"/>
+              <a:t>Lignes</a:t>
+            </a:r>
+            <a:r>
+              <a:rPr lang="en-CA" dirty="0"/>
+              <a:t> de transmission</a:t>
+            </a:r>
+          </a:p>
+          <a:p>
+            <a:pPr lvl="1"/>
+            <a:r>
+              <a:rPr lang="en-CA" dirty="0"/>
+              <a:t>Adaptation </a:t>
+            </a:r>
+            <a:r>
+              <a:rPr lang="en-CA" dirty="0" err="1"/>
+              <a:t>d’impédance</a:t>
+            </a:r>
+            <a:endParaRPr lang="en-CA" dirty="0"/>
           </a:p>
         </p:txBody>
       </p:sp>
     </p:spTree>
     <p:extLst>
       <p:ext uri="{BB962C8B-B14F-4D97-AF65-F5344CB8AC3E}">
-        <p14:creationId xmlns:p14="http://schemas.microsoft.com/office/powerpoint/2010/main" val="1461233970"/>
+        <p14:creationId xmlns:p14="http://schemas.microsoft.com/office/powerpoint/2010/main" val="1190730998"/>
       </p:ext>
     </p:extLst>
   </p:cSld>
@@ -9993,7 +9962,7 @@
           <p:cNvPr id="2" name="Title 1">
             <a:extLst>
               <a:ext uri="{FF2B5EF4-FFF2-40B4-BE49-F238E27FC236}">
-                <a16:creationId xmlns:a16="http://schemas.microsoft.com/office/drawing/2014/main" id="{181B7A1F-D195-4CB6-AF4A-94DB2BC49CEB}"/>
+                <a16:creationId xmlns:a16="http://schemas.microsoft.com/office/drawing/2014/main" id="{532BB36A-66E0-4644-AB8F-8DCB79605DD1}"/>
               </a:ext>
             </a:extLst>
           </p:cNvPr>
@@ -10011,12 +9980,9 @@
           <a:p>
             <a:r>
               <a:rPr lang="en-CA" dirty="0" err="1"/>
-              <a:t>Chaîne</a:t>
-            </a:r>
-            <a:r>
-              <a:rPr lang="en-CA" dirty="0"/>
-              <a:t> RF</a:t>
-            </a:r>
+              <a:t>Antenne</a:t>
+            </a:r>
+            <a:endParaRPr lang="en-CA" dirty="0"/>
           </a:p>
         </p:txBody>
       </p:sp>
@@ -10025,7 +9991,7 @@
           <p:cNvPr id="3" name="Content Placeholder 2">
             <a:extLst>
               <a:ext uri="{FF2B5EF4-FFF2-40B4-BE49-F238E27FC236}">
-                <a16:creationId xmlns:a16="http://schemas.microsoft.com/office/drawing/2014/main" id="{86306AC8-2B44-4495-982C-29052A09B7D8}"/>
+                <a16:creationId xmlns:a16="http://schemas.microsoft.com/office/drawing/2014/main" id="{6E8CB243-474A-4A7D-87A0-18D4236EA148}"/>
               </a:ext>
             </a:extLst>
           </p:cNvPr>
@@ -10048,7 +10014,7 @@
     </p:spTree>
     <p:extLst>
       <p:ext uri="{BB962C8B-B14F-4D97-AF65-F5344CB8AC3E}">
-        <p14:creationId xmlns:p14="http://schemas.microsoft.com/office/powerpoint/2010/main" val="4155299707"/>
+        <p14:creationId xmlns:p14="http://schemas.microsoft.com/office/powerpoint/2010/main" val="1461233970"/>
       </p:ext>
     </p:extLst>
   </p:cSld>
@@ -10080,7 +10046,7 @@
           <p:cNvPr id="2" name="Title 1">
             <a:extLst>
               <a:ext uri="{FF2B5EF4-FFF2-40B4-BE49-F238E27FC236}">
-                <a16:creationId xmlns:a16="http://schemas.microsoft.com/office/drawing/2014/main" id="{CB092671-ACDE-4E64-B487-381F2D0C6C2D}"/>
+                <a16:creationId xmlns:a16="http://schemas.microsoft.com/office/drawing/2014/main" id="{181B7A1F-D195-4CB6-AF4A-94DB2BC49CEB}"/>
               </a:ext>
             </a:extLst>
           </p:cNvPr>
@@ -10097,14 +10063,13 @@
           <a:lstStyle/>
           <a:p>
             <a:r>
-              <a:rPr lang="en-CA" dirty="0"/>
-              <a:t>Modem </a:t>
-            </a:r>
-            <a:r>
-              <a:rPr lang="en-CA" dirty="0" err="1"/>
-              <a:t>Numérique</a:t>
-            </a:r>
-            <a:endParaRPr lang="en-CA" dirty="0"/>
+              <a:rPr lang="en-CA" dirty="0" err="1"/>
+              <a:t>Chaîne</a:t>
+            </a:r>
+            <a:r>
+              <a:rPr lang="en-CA" dirty="0"/>
+              <a:t> RF</a:t>
+            </a:r>
           </a:p>
         </p:txBody>
       </p:sp>
@@ -10113,7 +10078,7 @@
           <p:cNvPr id="3" name="Content Placeholder 2">
             <a:extLst>
               <a:ext uri="{FF2B5EF4-FFF2-40B4-BE49-F238E27FC236}">
-                <a16:creationId xmlns:a16="http://schemas.microsoft.com/office/drawing/2014/main" id="{C98FDD01-A6F3-46B0-A7A5-740763964552}"/>
+                <a16:creationId xmlns:a16="http://schemas.microsoft.com/office/drawing/2014/main" id="{86306AC8-2B44-4495-982C-29052A09B7D8}"/>
               </a:ext>
             </a:extLst>
           </p:cNvPr>
@@ -10136,7 +10101,7 @@
     </p:spTree>
     <p:extLst>
       <p:ext uri="{BB962C8B-B14F-4D97-AF65-F5344CB8AC3E}">
-        <p14:creationId xmlns:p14="http://schemas.microsoft.com/office/powerpoint/2010/main" val="4294789758"/>
+        <p14:creationId xmlns:p14="http://schemas.microsoft.com/office/powerpoint/2010/main" val="4155299707"/>
       </p:ext>
     </p:extLst>
   </p:cSld>
@@ -10168,7 +10133,7 @@
           <p:cNvPr id="2" name="Title 1">
             <a:extLst>
               <a:ext uri="{FF2B5EF4-FFF2-40B4-BE49-F238E27FC236}">
-                <a16:creationId xmlns:a16="http://schemas.microsoft.com/office/drawing/2014/main" id="{E08F6E75-2A45-4CD7-A89B-35B31D4D478A}"/>
+                <a16:creationId xmlns:a16="http://schemas.microsoft.com/office/drawing/2014/main" id="{CB092671-ACDE-4E64-B487-381F2D0C6C2D}"/>
               </a:ext>
             </a:extLst>
           </p:cNvPr>
@@ -10184,7 +10149,15 @@
           <a:bodyPr/>
           <a:lstStyle/>
           <a:p>
-            <a:endParaRPr lang="en-CA"/>
+            <a:r>
+              <a:rPr lang="en-CA" dirty="0"/>
+              <a:t>Modem </a:t>
+            </a:r>
+            <a:r>
+              <a:rPr lang="en-CA" dirty="0" err="1"/>
+              <a:t>Numérique</a:t>
+            </a:r>
+            <a:endParaRPr lang="en-CA" dirty="0"/>
           </a:p>
         </p:txBody>
       </p:sp>
@@ -10193,7 +10166,7 @@
           <p:cNvPr id="3" name="Content Placeholder 2">
             <a:extLst>
               <a:ext uri="{FF2B5EF4-FFF2-40B4-BE49-F238E27FC236}">
-                <a16:creationId xmlns:a16="http://schemas.microsoft.com/office/drawing/2014/main" id="{B415ED72-9909-4FA1-907A-DAF78FD34380}"/>
+                <a16:creationId xmlns:a16="http://schemas.microsoft.com/office/drawing/2014/main" id="{C98FDD01-A6F3-46B0-A7A5-740763964552}"/>
               </a:ext>
             </a:extLst>
           </p:cNvPr>
@@ -10216,7 +10189,7 @@
     </p:spTree>
     <p:extLst>
       <p:ext uri="{BB962C8B-B14F-4D97-AF65-F5344CB8AC3E}">
-        <p14:creationId xmlns:p14="http://schemas.microsoft.com/office/powerpoint/2010/main" val="816399630"/>
+        <p14:creationId xmlns:p14="http://schemas.microsoft.com/office/powerpoint/2010/main" val="4294789758"/>
       </p:ext>
     </p:extLst>
   </p:cSld>

</xml_diff>